<commit_message>
hgbrt added and ppt modified
</commit_message>
<xml_diff>
--- a/Batch_4 IT-G2.pptx
+++ b/Batch_4 IT-G2.pptx
@@ -5,7 +5,7 @@
     <p:sldMasterId id="2147483648" r:id="rId1"/>
   </p:sldMasterIdLst>
   <p:notesMasterIdLst>
-    <p:notesMasterId r:id="rId31"/>
+    <p:notesMasterId r:id="rId30"/>
   </p:notesMasterIdLst>
   <p:sldIdLst>
     <p:sldId id="256" r:id="rId2"/>
@@ -26,29 +26,28 @@
     <p:sldId id="276" r:id="rId17"/>
     <p:sldId id="277" r:id="rId18"/>
     <p:sldId id="278" r:id="rId19"/>
-    <p:sldId id="280" r:id="rId20"/>
-    <p:sldId id="281" r:id="rId21"/>
-    <p:sldId id="282" r:id="rId22"/>
-    <p:sldId id="279" r:id="rId23"/>
-    <p:sldId id="283" r:id="rId24"/>
-    <p:sldId id="284" r:id="rId25"/>
-    <p:sldId id="285" r:id="rId26"/>
-    <p:sldId id="269" r:id="rId27"/>
-    <p:sldId id="270" r:id="rId28"/>
-    <p:sldId id="271" r:id="rId29"/>
-    <p:sldId id="272" r:id="rId30"/>
+    <p:sldId id="281" r:id="rId20"/>
+    <p:sldId id="282" r:id="rId21"/>
+    <p:sldId id="279" r:id="rId22"/>
+    <p:sldId id="283" r:id="rId23"/>
+    <p:sldId id="284" r:id="rId24"/>
+    <p:sldId id="285" r:id="rId25"/>
+    <p:sldId id="269" r:id="rId26"/>
+    <p:sldId id="270" r:id="rId27"/>
+    <p:sldId id="271" r:id="rId28"/>
+    <p:sldId id="272" r:id="rId29"/>
   </p:sldIdLst>
   <p:sldSz cx="18288000" cy="10287000"/>
   <p:notesSz cx="6858000" cy="9144000"/>
   <p:embeddedFontLst>
     <p:embeddedFont>
       <p:font typeface="Times New Roman Bold" panose="02020803070505020304" pitchFamily="18" charset="0"/>
-      <p:regular r:id="rId32"/>
-      <p:bold r:id="rId33"/>
+      <p:regular r:id="rId31"/>
+      <p:bold r:id="rId32"/>
     </p:embeddedFont>
     <p:embeddedFont>
       <p:font typeface="Times New Roman Italics" panose="020B0604020202020204" charset="0"/>
-      <p:regular r:id="rId34"/>
+      <p:regular r:id="rId33"/>
     </p:embeddedFont>
   </p:embeddedFontLst>
   <p:defaultTextStyle>
@@ -178,10 +177,25 @@
   <pc:docChgLst>
     <pc:chgData name="Prithiv Vijai" userId="5d24f1427401153b" providerId="LiveId" clId="{70A2666E-DFD6-444A-A910-CE2623165711}"/>
     <pc:docChg chg="undo custSel addSld delSld modSld">
-      <pc:chgData name="Prithiv Vijai" userId="5d24f1427401153b" providerId="LiveId" clId="{70A2666E-DFD6-444A-A910-CE2623165711}" dt="2024-08-06T15:13:36.598" v="2433" actId="1076"/>
+      <pc:chgData name="Prithiv Vijai" userId="5d24f1427401153b" providerId="LiveId" clId="{70A2666E-DFD6-444A-A910-CE2623165711}" dt="2024-08-06T15:15:38.389" v="2434" actId="20577"/>
       <pc:docMkLst>
         <pc:docMk/>
       </pc:docMkLst>
+      <pc:sldChg chg="modSp mod">
+        <pc:chgData name="Prithiv Vijai" userId="5d24f1427401153b" providerId="LiveId" clId="{70A2666E-DFD6-444A-A910-CE2623165711}" dt="2024-08-06T15:15:38.389" v="2434" actId="20577"/>
+        <pc:sldMkLst>
+          <pc:docMk/>
+          <pc:sldMk cId="0" sldId="259"/>
+        </pc:sldMkLst>
+        <pc:graphicFrameChg chg="modGraphic">
+          <ac:chgData name="Prithiv Vijai" userId="5d24f1427401153b" providerId="LiveId" clId="{70A2666E-DFD6-444A-A910-CE2623165711}" dt="2024-08-06T15:15:38.389" v="2434" actId="20577"/>
+          <ac:graphicFrameMkLst>
+            <pc:docMk/>
+            <pc:sldMk cId="0" sldId="259"/>
+            <ac:graphicFrameMk id="6" creationId="{00000000-0000-0000-0000-000000000000}"/>
+          </ac:graphicFrameMkLst>
+        </pc:graphicFrameChg>
+      </pc:sldChg>
       <pc:sldChg chg="addSp delSp modSp mod">
         <pc:chgData name="Prithiv Vijai" userId="5d24f1427401153b" providerId="LiveId" clId="{70A2666E-DFD6-444A-A910-CE2623165711}" dt="2024-08-04T17:20:54.784" v="1756" actId="1076"/>
         <pc:sldMkLst>
@@ -1214,7 +1228,7 @@
           <a:p>
             <a:fld id="{B7268E1E-0E44-426D-905E-8AD9B19D2182}" type="datetimeFigureOut">
               <a:rPr lang="cs-CZ" smtClean="0"/>
-              <a:t>06.08.2024</a:t>
+              <a:t>07.08.2024</a:t>
             </a:fld>
             <a:endParaRPr lang="cs-CZ"/>
           </a:p>
@@ -1620,7 +1634,7 @@
           <a:bodyPr vert="horz" lIns="91440" tIns="45720" rIns="91440" bIns="45720" rtlCol="0"/>
           <a:lstStyle/>
           <a:p>
-            <a:endParaRPr lang="en-US"/>
+            <a:endParaRPr lang="en-US" dirty="0"/>
           </a:p>
         </p:txBody>
       </p:sp>
@@ -3872,7 +3886,7 @@
     </p:spTree>
     <p:extLst>
       <p:ext uri="{BB962C8B-B14F-4D97-AF65-F5344CB8AC3E}">
-        <p14:creationId xmlns:p14="http://schemas.microsoft.com/office/powerpoint/2010/main" val="198936335"/>
+        <p14:creationId xmlns:p14="http://schemas.microsoft.com/office/powerpoint/2010/main" val="3167092149"/>
       </p:ext>
     </p:extLst>
   </p:cSld>
@@ -4307,7 +4321,7 @@
     </p:spTree>
     <p:extLst>
       <p:ext uri="{BB962C8B-B14F-4D97-AF65-F5344CB8AC3E}">
-        <p14:creationId xmlns:p14="http://schemas.microsoft.com/office/powerpoint/2010/main" val="3167092149"/>
+        <p14:creationId xmlns:p14="http://schemas.microsoft.com/office/powerpoint/2010/main" val="3212725596"/>
       </p:ext>
     </p:extLst>
   </p:cSld>
@@ -4527,7 +4541,7 @@
     </p:spTree>
     <p:extLst>
       <p:ext uri="{BB962C8B-B14F-4D97-AF65-F5344CB8AC3E}">
-        <p14:creationId xmlns:p14="http://schemas.microsoft.com/office/powerpoint/2010/main" val="3212725596"/>
+        <p14:creationId xmlns:p14="http://schemas.microsoft.com/office/powerpoint/2010/main" val="32605038"/>
       </p:ext>
     </p:extLst>
   </p:cSld>
@@ -4747,7 +4761,7 @@
     </p:spTree>
     <p:extLst>
       <p:ext uri="{BB962C8B-B14F-4D97-AF65-F5344CB8AC3E}">
-        <p14:creationId xmlns:p14="http://schemas.microsoft.com/office/powerpoint/2010/main" val="32605038"/>
+        <p14:creationId xmlns:p14="http://schemas.microsoft.com/office/powerpoint/2010/main" val="4069349557"/>
       </p:ext>
     </p:extLst>
   </p:cSld>
@@ -4967,7 +4981,7 @@
     </p:spTree>
     <p:extLst>
       <p:ext uri="{BB962C8B-B14F-4D97-AF65-F5344CB8AC3E}">
-        <p14:creationId xmlns:p14="http://schemas.microsoft.com/office/powerpoint/2010/main" val="4069349557"/>
+        <p14:creationId xmlns:p14="http://schemas.microsoft.com/office/powerpoint/2010/main" val="1017474370"/>
       </p:ext>
     </p:extLst>
   </p:cSld>
@@ -5187,7 +5201,7 @@
     </p:spTree>
     <p:extLst>
       <p:ext uri="{BB962C8B-B14F-4D97-AF65-F5344CB8AC3E}">
-        <p14:creationId xmlns:p14="http://schemas.microsoft.com/office/powerpoint/2010/main" val="1017474370"/>
+        <p14:creationId xmlns:p14="http://schemas.microsoft.com/office/powerpoint/2010/main" val="727281543"/>
       </p:ext>
     </p:extLst>
   </p:cSld>
@@ -5405,11 +5419,6 @@
         </p:txBody>
       </p:sp>
     </p:spTree>
-    <p:extLst>
-      <p:ext uri="{BB962C8B-B14F-4D97-AF65-F5344CB8AC3E}">
-        <p14:creationId xmlns:p14="http://schemas.microsoft.com/office/powerpoint/2010/main" val="727281543"/>
-      </p:ext>
-    </p:extLst>
   </p:cSld>
   <p:clrMapOvr>
     <a:masterClrMapping/>
@@ -5511,8 +5520,8 @@
         </p:nvSpPr>
         <p:spPr>
           <a:xfrm>
-            <a:off x="2290763" y="512763"/>
-            <a:ext cx="4562475" cy="2566987"/>
+            <a:off x="2857500" y="512763"/>
+            <a:ext cx="3429000" cy="2566987"/>
           </a:xfrm>
           <a:prstGeom prst="rect">
             <a:avLst/>
@@ -5848,221 +5857,6 @@
 </file>
 
 <file path=ppt/notesSlides/notesSlide28.xml><?xml version="1.0" encoding="utf-8"?>
-<p:notes xmlns:a="http://schemas.openxmlformats.org/drawingml/2006/main" xmlns:r="http://schemas.openxmlformats.org/officeDocument/2006/relationships" xmlns:p="http://schemas.openxmlformats.org/presentationml/2006/main">
-  <p:cSld>
-    <p:spTree>
-      <p:nvGrpSpPr>
-        <p:cNvPr id="1" name=""/>
-        <p:cNvGrpSpPr/>
-        <p:nvPr/>
-      </p:nvGrpSpPr>
-      <p:grpSpPr>
-        <a:xfrm>
-          <a:off x="0" y="0"/>
-          <a:ext cx="0" cy="0"/>
-          <a:chOff x="0" y="0"/>
-          <a:chExt cx="0" cy="0"/>
-        </a:xfrm>
-      </p:grpSpPr>
-      <p:sp>
-        <p:nvSpPr>
-          <p:cNvPr id="2" name="Header Placeholder 1"/>
-          <p:cNvSpPr>
-            <a:spLocks noGrp="1"/>
-          </p:cNvSpPr>
-          <p:nvPr>
-            <p:ph type="hdr" sz="quarter"/>
-          </p:nvPr>
-        </p:nvSpPr>
-        <p:spPr>
-          <a:xfrm>
-            <a:off x="0" y="0"/>
-            <a:ext cx="3962400" cy="342900"/>
-          </a:xfrm>
-          <a:prstGeom prst="rect">
-            <a:avLst/>
-          </a:prstGeom>
-        </p:spPr>
-        <p:txBody>
-          <a:bodyPr vert="horz" lIns="91440" tIns="45720" rIns="91440" bIns="45720" rtlCol="0"/>
-          <a:lstStyle>
-            <a:lvl1pPr algn="l">
-              <a:defRPr sz="1200"/>
-            </a:lvl1pPr>
-          </a:lstStyle>
-          <a:p>
-            <a:endParaRPr/>
-          </a:p>
-        </p:txBody>
-      </p:sp>
-      <p:sp>
-        <p:nvSpPr>
-          <p:cNvPr id="3" name="Date Placeholder 2"/>
-          <p:cNvSpPr>
-            <a:spLocks noGrp="1"/>
-          </p:cNvSpPr>
-          <p:nvPr>
-            <p:ph type="dt" idx="1"/>
-          </p:nvPr>
-        </p:nvSpPr>
-        <p:spPr>
-          <a:xfrm>
-            <a:off x="5180013" y="0"/>
-            <a:ext cx="3962400" cy="342900"/>
-          </a:xfrm>
-          <a:prstGeom prst="rect">
-            <a:avLst/>
-          </a:prstGeom>
-        </p:spPr>
-        <p:txBody>
-          <a:bodyPr vert="horz" lIns="91440" tIns="45720" rIns="91440" bIns="45720" rtlCol="0"/>
-          <a:lstStyle>
-            <a:lvl1pPr algn="r">
-              <a:defRPr sz="1200"/>
-            </a:lvl1pPr>
-          </a:lstStyle>
-          <a:p>
-            <a:r>
-              <a:rPr lang="cs-CZ"/>
-              <a:t>1.7.2013</a:t>
-            </a:r>
-          </a:p>
-        </p:txBody>
-      </p:sp>
-      <p:sp>
-        <p:nvSpPr>
-          <p:cNvPr id="4" name="Slide Image Placeholder 3"/>
-          <p:cNvSpPr>
-            <a:spLocks noGrp="1" noRot="1" noChangeAspect="1"/>
-          </p:cNvSpPr>
-          <p:nvPr>
-            <p:ph type="sldImg" idx="2"/>
-          </p:nvPr>
-        </p:nvSpPr>
-        <p:spPr>
-          <a:xfrm>
-            <a:off x="2857500" y="512763"/>
-            <a:ext cx="3429000" cy="2566987"/>
-          </a:xfrm>
-          <a:prstGeom prst="rect">
-            <a:avLst/>
-          </a:prstGeom>
-          <a:noFill/>
-          <a:ln w="12700">
-            <a:solidFill>
-              <a:prstClr val="black"/>
-            </a:solidFill>
-          </a:ln>
-        </p:spPr>
-        <p:txBody>
-          <a:bodyPr vert="horz" lIns="91440" tIns="45720" rIns="91440" bIns="45720" rtlCol="0" anchor="ctr"/>
-          <a:lstStyle/>
-          <a:p>
-            <a:endParaRPr/>
-          </a:p>
-        </p:txBody>
-      </p:sp>
-      <p:sp>
-        <p:nvSpPr>
-          <p:cNvPr id="5" name="Notes Placeholder 4"/>
-          <p:cNvSpPr>
-            <a:spLocks noGrp="1"/>
-          </p:cNvSpPr>
-          <p:nvPr>
-            <p:ph type="body" sz="quarter" idx="3"/>
-          </p:nvPr>
-        </p:nvSpPr>
-        <p:spPr>
-          <a:xfrm>
-            <a:off x="914400" y="3251200"/>
-            <a:ext cx="7315200" cy="3081338"/>
-          </a:xfrm>
-          <a:prstGeom prst="rect">
-            <a:avLst/>
-          </a:prstGeom>
-        </p:spPr>
-        <p:txBody>
-          <a:bodyPr vert="horz" lIns="91440" tIns="45720" rIns="91440" bIns="45720" rtlCol="0"/>
-          <a:lstStyle/>
-          <a:p>
-            <a:endParaRPr lang="en-US"/>
-          </a:p>
-        </p:txBody>
-      </p:sp>
-      <p:sp>
-        <p:nvSpPr>
-          <p:cNvPr id="6" name="Footer Placeholder 5"/>
-          <p:cNvSpPr>
-            <a:spLocks noGrp="1"/>
-          </p:cNvSpPr>
-          <p:nvPr>
-            <p:ph type="ftr" sz="quarter" idx="4"/>
-          </p:nvPr>
-        </p:nvSpPr>
-        <p:spPr>
-          <a:xfrm>
-            <a:off x="0" y="6502400"/>
-            <a:ext cx="3962400" cy="341313"/>
-          </a:xfrm>
-          <a:prstGeom prst="rect">
-            <a:avLst/>
-          </a:prstGeom>
-        </p:spPr>
-        <p:txBody>
-          <a:bodyPr vert="horz" lIns="91440" tIns="45720" rIns="91440" bIns="45720" rtlCol="0" anchor="b"/>
-          <a:lstStyle>
-            <a:lvl1pPr algn="l">
-              <a:defRPr sz="1200"/>
-            </a:lvl1pPr>
-          </a:lstStyle>
-          <a:p>
-            <a:endParaRPr/>
-          </a:p>
-        </p:txBody>
-      </p:sp>
-      <p:sp>
-        <p:nvSpPr>
-          <p:cNvPr id="7" name="Slide Number Placeholder 6"/>
-          <p:cNvSpPr>
-            <a:spLocks noGrp="1"/>
-          </p:cNvSpPr>
-          <p:nvPr>
-            <p:ph type="sldNum" sz="quarter" idx="5"/>
-          </p:nvPr>
-        </p:nvSpPr>
-        <p:spPr>
-          <a:xfrm>
-            <a:off x="5180013" y="6502400"/>
-            <a:ext cx="3962400" cy="341313"/>
-          </a:xfrm>
-          <a:prstGeom prst="rect">
-            <a:avLst/>
-          </a:prstGeom>
-        </p:spPr>
-        <p:txBody>
-          <a:bodyPr vert="horz" lIns="91440" tIns="45720" rIns="91440" bIns="45720" rtlCol="0" anchor="b"/>
-          <a:lstStyle>
-            <a:lvl1pPr algn="r">
-              <a:defRPr sz="1200"/>
-            </a:lvl1pPr>
-          </a:lstStyle>
-          <a:p>
-            <a:r>
-              <a:rPr lang="cs-CZ"/>
-              <a:t>‹#›</a:t>
-            </a:r>
-          </a:p>
-        </p:txBody>
-      </p:sp>
-    </p:spTree>
-  </p:cSld>
-  <p:clrMapOvr>
-    <a:masterClrMapping/>
-  </p:clrMapOvr>
-</p:notes>
-</file>
-
-<file path=ppt/notesSlides/notesSlide29.xml><?xml version="1.0" encoding="utf-8"?>
 <p:notes xmlns:a="http://schemas.openxmlformats.org/drawingml/2006/main" xmlns:r="http://schemas.openxmlformats.org/officeDocument/2006/relationships" xmlns:p="http://schemas.openxmlformats.org/presentationml/2006/main">
   <p:cSld>
     <p:spTree>
@@ -7962,7 +7756,7 @@
             <a:fld id="{1D8BD707-D9CF-40AE-B4C6-C98DA3205C09}" type="datetimeFigureOut">
               <a:rPr lang="en-US" smtClean="0"/>
               <a:pPr/>
-              <a:t>8/6/2024</a:t>
+              <a:t>8/7/2024</a:t>
             </a:fld>
             <a:endParaRPr lang="en-US"/>
           </a:p>
@@ -8127,7 +7921,7 @@
             <a:fld id="{1D8BD707-D9CF-40AE-B4C6-C98DA3205C09}" type="datetimeFigureOut">
               <a:rPr lang="en-US" smtClean="0"/>
               <a:pPr/>
-              <a:t>8/6/2024</a:t>
+              <a:t>8/7/2024</a:t>
             </a:fld>
             <a:endParaRPr lang="en-US"/>
           </a:p>
@@ -8302,7 +8096,7 @@
             <a:fld id="{1D8BD707-D9CF-40AE-B4C6-C98DA3205C09}" type="datetimeFigureOut">
               <a:rPr lang="en-US" smtClean="0"/>
               <a:pPr/>
-              <a:t>8/6/2024</a:t>
+              <a:t>8/7/2024</a:t>
             </a:fld>
             <a:endParaRPr lang="en-US"/>
           </a:p>
@@ -8467,7 +8261,7 @@
             <a:fld id="{1D8BD707-D9CF-40AE-B4C6-C98DA3205C09}" type="datetimeFigureOut">
               <a:rPr lang="en-US" smtClean="0"/>
               <a:pPr/>
-              <a:t>8/6/2024</a:t>
+              <a:t>8/7/2024</a:t>
             </a:fld>
             <a:endParaRPr lang="en-US"/>
           </a:p>
@@ -8709,7 +8503,7 @@
             <a:fld id="{1D8BD707-D9CF-40AE-B4C6-C98DA3205C09}" type="datetimeFigureOut">
               <a:rPr lang="en-US" smtClean="0"/>
               <a:pPr/>
-              <a:t>8/6/2024</a:t>
+              <a:t>8/7/2024</a:t>
             </a:fld>
             <a:endParaRPr lang="en-US"/>
           </a:p>
@@ -8991,7 +8785,7 @@
             <a:fld id="{1D8BD707-D9CF-40AE-B4C6-C98DA3205C09}" type="datetimeFigureOut">
               <a:rPr lang="en-US" smtClean="0"/>
               <a:pPr/>
-              <a:t>8/6/2024</a:t>
+              <a:t>8/7/2024</a:t>
             </a:fld>
             <a:endParaRPr lang="en-US"/>
           </a:p>
@@ -9407,7 +9201,7 @@
             <a:fld id="{1D8BD707-D9CF-40AE-B4C6-C98DA3205C09}" type="datetimeFigureOut">
               <a:rPr lang="en-US" smtClean="0"/>
               <a:pPr/>
-              <a:t>8/6/2024</a:t>
+              <a:t>8/7/2024</a:t>
             </a:fld>
             <a:endParaRPr lang="en-US"/>
           </a:p>
@@ -9521,7 +9315,7 @@
             <a:fld id="{1D8BD707-D9CF-40AE-B4C6-C98DA3205C09}" type="datetimeFigureOut">
               <a:rPr lang="en-US" smtClean="0"/>
               <a:pPr/>
-              <a:t>8/6/2024</a:t>
+              <a:t>8/7/2024</a:t>
             </a:fld>
             <a:endParaRPr lang="en-US"/>
           </a:p>
@@ -9613,7 +9407,7 @@
             <a:fld id="{1D8BD707-D9CF-40AE-B4C6-C98DA3205C09}" type="datetimeFigureOut">
               <a:rPr lang="en-US" smtClean="0"/>
               <a:pPr/>
-              <a:t>8/6/2024</a:t>
+              <a:t>8/7/2024</a:t>
             </a:fld>
             <a:endParaRPr lang="en-US"/>
           </a:p>
@@ -9885,7 +9679,7 @@
             <a:fld id="{1D8BD707-D9CF-40AE-B4C6-C98DA3205C09}" type="datetimeFigureOut">
               <a:rPr lang="en-US" smtClean="0"/>
               <a:pPr/>
-              <a:t>8/6/2024</a:t>
+              <a:t>8/7/2024</a:t>
             </a:fld>
             <a:endParaRPr lang="en-US"/>
           </a:p>
@@ -10134,7 +9928,7 @@
             <a:fld id="{1D8BD707-D9CF-40AE-B4C6-C98DA3205C09}" type="datetimeFigureOut">
               <a:rPr lang="en-US" smtClean="0"/>
               <a:pPr/>
-              <a:t>8/6/2024</a:t>
+              <a:t>8/7/2024</a:t>
             </a:fld>
             <a:endParaRPr lang="en-US"/>
           </a:p>
@@ -10342,7 +10136,7 @@
             <a:fld id="{1D8BD707-D9CF-40AE-B4C6-C98DA3205C09}" type="datetimeFigureOut">
               <a:rPr lang="en-US" smtClean="0"/>
               <a:pPr/>
-              <a:t>8/6/2024</a:t>
+              <a:t>8/7/2024</a:t>
             </a:fld>
             <a:endParaRPr lang="en-US"/>
           </a:p>
@@ -11238,7 +11032,7 @@
               </a:lnSpc>
             </a:pPr>
             <a:r>
-              <a:rPr lang="en-US" sz="3600">
+              <a:rPr lang="en-US" sz="3600" dirty="0">
                 <a:solidFill>
                   <a:srgbClr val="FF0000"/>
                 </a:solidFill>
@@ -11256,7 +11050,7 @@
                 <a:spcPts val="4752"/>
               </a:lnSpc>
             </a:pPr>
-            <a:endParaRPr lang="en-US" sz="3600">
+            <a:endParaRPr lang="en-US" sz="3600" dirty="0">
               <a:solidFill>
                 <a:srgbClr val="FF0000"/>
               </a:solidFill>
@@ -11272,7 +11066,7 @@
                 <a:spcPts val="4320"/>
               </a:lnSpc>
             </a:pPr>
-            <a:endParaRPr lang="en-US" sz="3600">
+            <a:endParaRPr lang="en-US" sz="3600" dirty="0">
               <a:solidFill>
                 <a:srgbClr val="FF0000"/>
               </a:solidFill>
@@ -21474,7 +21268,7 @@
         <p:spPr>
           <a:xfrm>
             <a:off x="647625" y="3009900"/>
-            <a:ext cx="5981775" cy="3800528"/>
+            <a:ext cx="6319590" cy="6385851"/>
           </a:xfrm>
           <a:prstGeom prst="rect">
             <a:avLst/>
@@ -21569,7 +21363,55 @@
                 <a:cs typeface="Times New Roman"/>
                 <a:sym typeface="Times New Roman"/>
               </a:rPr>
-              <a:t>Converted values to same units. </a:t>
+              <a:t>Converted </a:t>
+            </a:r>
+            <a:r>
+              <a:rPr lang="en-US" sz="2800" dirty="0" err="1">
+                <a:solidFill>
+                  <a:srgbClr val="000000"/>
+                </a:solidFill>
+                <a:latin typeface="Times New Roman"/>
+                <a:ea typeface="Times New Roman"/>
+                <a:cs typeface="Times New Roman"/>
+                <a:sym typeface="Times New Roman"/>
+              </a:rPr>
+              <a:t>Required_bandwidth</a:t>
+            </a:r>
+            <a:r>
+              <a:rPr lang="en-US" sz="2800" dirty="0">
+                <a:solidFill>
+                  <a:srgbClr val="000000"/>
+                </a:solidFill>
+                <a:latin typeface="Times New Roman"/>
+                <a:ea typeface="Times New Roman"/>
+                <a:cs typeface="Times New Roman"/>
+                <a:sym typeface="Times New Roman"/>
+              </a:rPr>
+              <a:t> , </a:t>
+            </a:r>
+            <a:r>
+              <a:rPr lang="en-US" sz="2800" dirty="0" err="1">
+                <a:solidFill>
+                  <a:srgbClr val="000000"/>
+                </a:solidFill>
+                <a:latin typeface="Times New Roman"/>
+                <a:ea typeface="Times New Roman"/>
+                <a:cs typeface="Times New Roman"/>
+                <a:sym typeface="Times New Roman"/>
+              </a:rPr>
+              <a:t>Allocated_bandwidth</a:t>
+            </a:r>
+            <a:r>
+              <a:rPr lang="en-US" sz="2800" dirty="0">
+                <a:solidFill>
+                  <a:srgbClr val="000000"/>
+                </a:solidFill>
+                <a:latin typeface="Times New Roman"/>
+                <a:ea typeface="Times New Roman"/>
+                <a:cs typeface="Times New Roman"/>
+                <a:sym typeface="Times New Roman"/>
+              </a:rPr>
+              <a:t> to same units. </a:t>
             </a:r>
           </a:p>
           <a:p>
@@ -21590,8 +21432,81 @@
                 <a:cs typeface="Times New Roman"/>
                 <a:sym typeface="Times New Roman"/>
               </a:rPr>
-              <a:t>Removed symbols</a:t>
+              <a:t>Removed ‘%’ , ‘dBm’ , ‘</a:t>
             </a:r>
+            <a:r>
+              <a:rPr lang="en-US" sz="2800" dirty="0" err="1">
+                <a:solidFill>
+                  <a:srgbClr val="000000"/>
+                </a:solidFill>
+                <a:latin typeface="Times New Roman"/>
+                <a:ea typeface="Times New Roman"/>
+                <a:cs typeface="Times New Roman"/>
+                <a:sym typeface="Times New Roman"/>
+              </a:rPr>
+              <a:t>ms</a:t>
+            </a:r>
+            <a:r>
+              <a:rPr lang="en-US" sz="2800" dirty="0">
+                <a:solidFill>
+                  <a:srgbClr val="000000"/>
+                </a:solidFill>
+                <a:latin typeface="Times New Roman"/>
+                <a:ea typeface="Times New Roman"/>
+                <a:cs typeface="Times New Roman"/>
+                <a:sym typeface="Times New Roman"/>
+              </a:rPr>
+              <a:t>’ from respective attributes.</a:t>
+            </a:r>
+          </a:p>
+          <a:p>
+            <a:pPr marL="712470" lvl="1" indent="-356235" algn="l">
+              <a:lnSpc>
+                <a:spcPct val="150000"/>
+              </a:lnSpc>
+              <a:buFont typeface="Arial"/>
+              <a:buChar char="•"/>
+            </a:pPr>
+            <a:r>
+              <a:rPr lang="en-US" sz="2800" dirty="0" err="1">
+                <a:solidFill>
+                  <a:srgbClr val="000000"/>
+                </a:solidFill>
+                <a:latin typeface="Times New Roman"/>
+                <a:ea typeface="Times New Roman"/>
+                <a:cs typeface="Times New Roman"/>
+                <a:sym typeface="Times New Roman"/>
+              </a:rPr>
+              <a:t>User_Id</a:t>
+            </a:r>
+            <a:r>
+              <a:rPr lang="en-US" sz="2800" dirty="0">
+                <a:solidFill>
+                  <a:srgbClr val="000000"/>
+                </a:solidFill>
+                <a:latin typeface="Times New Roman"/>
+                <a:ea typeface="Times New Roman"/>
+                <a:cs typeface="Times New Roman"/>
+                <a:sym typeface="Times New Roman"/>
+              </a:rPr>
+              <a:t> to contain only the ID.</a:t>
+            </a:r>
+          </a:p>
+          <a:p>
+            <a:pPr marL="356235" lvl="1" algn="l">
+              <a:lnSpc>
+                <a:spcPct val="150000"/>
+              </a:lnSpc>
+            </a:pPr>
+            <a:endParaRPr lang="en-US" sz="2800" dirty="0">
+              <a:solidFill>
+                <a:srgbClr val="000000"/>
+              </a:solidFill>
+              <a:latin typeface="Times New Roman"/>
+              <a:ea typeface="Times New Roman"/>
+              <a:cs typeface="Times New Roman"/>
+              <a:sym typeface="Times New Roman"/>
+            </a:endParaRPr>
           </a:p>
           <a:p>
             <a:pPr algn="ctr">
@@ -22142,7 +22057,7 @@
         <p:spPr>
           <a:xfrm>
             <a:off x="714825" y="790975"/>
-            <a:ext cx="16858350" cy="746615"/>
+            <a:ext cx="16858350" cy="1541704"/>
           </a:xfrm>
           <a:prstGeom prst="rect">
             <a:avLst/>
@@ -22183,6 +22098,49 @@
               </a:rPr>
               <a:t>Augmentaion</a:t>
             </a:r>
+            <a:r>
+              <a:rPr lang="en-US" sz="5000" dirty="0">
+                <a:solidFill>
+                  <a:srgbClr val="FF0000"/>
+                </a:solidFill>
+                <a:latin typeface="Times New Roman"/>
+                <a:ea typeface="Times New Roman"/>
+                <a:cs typeface="Times New Roman"/>
+                <a:sym typeface="Times New Roman"/>
+              </a:rPr>
+              <a:t> – </a:t>
+            </a:r>
+            <a:r>
+              <a:rPr lang="en-US" sz="5000" dirty="0" err="1">
+                <a:solidFill>
+                  <a:srgbClr val="FF0000"/>
+                </a:solidFill>
+                <a:latin typeface="Times New Roman"/>
+                <a:ea typeface="Times New Roman"/>
+                <a:cs typeface="Times New Roman"/>
+                <a:sym typeface="Times New Roman"/>
+              </a:rPr>
+              <a:t>Comparitive</a:t>
+            </a:r>
+            <a:r>
+              <a:rPr lang="en-US" sz="5000" dirty="0">
+                <a:solidFill>
+                  <a:srgbClr val="FF0000"/>
+                </a:solidFill>
+                <a:latin typeface="Times New Roman"/>
+                <a:ea typeface="Times New Roman"/>
+                <a:cs typeface="Times New Roman"/>
+                <a:sym typeface="Times New Roman"/>
+              </a:rPr>
+              <a:t> Analysis </a:t>
+            </a:r>
+          </a:p>
+          <a:p>
+            <a:pPr algn="l">
+              <a:lnSpc>
+                <a:spcPts val="6220"/>
+              </a:lnSpc>
+            </a:pPr>
             <a:endParaRPr lang="en-US" sz="5000" dirty="0">
               <a:solidFill>
                 <a:srgbClr val="FF0000"/>
@@ -22471,1012 +22429,6 @@
       </p:grpSp>
       <p:pic>
         <p:nvPicPr>
-          <p:cNvPr id="7" name="Picture 6">
-            <a:extLst>
-              <a:ext uri="{FF2B5EF4-FFF2-40B4-BE49-F238E27FC236}">
-                <a16:creationId xmlns:a16="http://schemas.microsoft.com/office/drawing/2014/main" id="{F03755E3-66DD-1389-32EB-B90903AB5DFE}"/>
-              </a:ext>
-            </a:extLst>
-          </p:cNvPr>
-          <p:cNvPicPr>
-            <a:picLocks noChangeAspect="1"/>
-          </p:cNvPicPr>
-          <p:nvPr/>
-        </p:nvPicPr>
-        <p:blipFill>
-          <a:blip r:embed="rId3">
-            <a:extLst>
-              <a:ext uri="{28A0092B-C50C-407E-A947-70E740481C1C}">
-                <a14:useLocalDpi xmlns:a14="http://schemas.microsoft.com/office/drawing/2010/main" val="0"/>
-              </a:ext>
-            </a:extLst>
-          </a:blip>
-          <a:stretch>
-            <a:fillRect/>
-          </a:stretch>
-        </p:blipFill>
-        <p:spPr>
-          <a:xfrm>
-            <a:off x="2743200" y="3672173"/>
-            <a:ext cx="10820400" cy="4809066"/>
-          </a:xfrm>
-          <a:prstGeom prst="rect">
-            <a:avLst/>
-          </a:prstGeom>
-        </p:spPr>
-      </p:pic>
-    </p:spTree>
-    <p:extLst>
-      <p:ext uri="{BB962C8B-B14F-4D97-AF65-F5344CB8AC3E}">
-        <p14:creationId xmlns:p14="http://schemas.microsoft.com/office/powerpoint/2010/main" val="761492339"/>
-      </p:ext>
-    </p:extLst>
-  </p:cSld>
-  <p:clrMapOvr>
-    <a:masterClrMapping/>
-  </p:clrMapOvr>
-</p:sld>
-</file>
-
-<file path=ppt/slides/slide2.xml><?xml version="1.0" encoding="utf-8"?>
-<p:sld xmlns:a="http://schemas.openxmlformats.org/drawingml/2006/main" xmlns:r="http://schemas.openxmlformats.org/officeDocument/2006/relationships" xmlns:p="http://schemas.openxmlformats.org/presentationml/2006/main">
-  <p:cSld>
-    <p:spTree>
-      <p:nvGrpSpPr>
-        <p:cNvPr id="1" name=""/>
-        <p:cNvGrpSpPr/>
-        <p:nvPr/>
-      </p:nvGrpSpPr>
-      <p:grpSpPr>
-        <a:xfrm>
-          <a:off x="0" y="0"/>
-          <a:ext cx="0" cy="0"/>
-          <a:chOff x="0" y="0"/>
-          <a:chExt cx="0" cy="0"/>
-        </a:xfrm>
-      </p:grpSpPr>
-      <p:sp>
-        <p:nvSpPr>
-          <p:cNvPr id="2" name="TextBox 2"/>
-          <p:cNvSpPr txBox="1"/>
-          <p:nvPr/>
-        </p:nvSpPr>
-        <p:spPr>
-          <a:xfrm>
-            <a:off x="714825" y="886225"/>
-            <a:ext cx="16858352" cy="1057800"/>
-          </a:xfrm>
-          <a:prstGeom prst="rect">
-            <a:avLst/>
-          </a:prstGeom>
-        </p:spPr>
-        <p:txBody>
-          <a:bodyPr lIns="0" tIns="0" rIns="0" bIns="0" rtlCol="0" anchor="t">
-            <a:spAutoFit/>
-          </a:bodyPr>
-          <a:lstStyle/>
-          <a:p>
-            <a:pPr algn="l">
-              <a:lnSpc>
-                <a:spcPts val="6047"/>
-              </a:lnSpc>
-            </a:pPr>
-            <a:r>
-              <a:rPr lang="en-US" sz="5039">
-                <a:solidFill>
-                  <a:srgbClr val="FF0000"/>
-                </a:solidFill>
-                <a:latin typeface="Times New Roman"/>
-                <a:ea typeface="Times New Roman"/>
-                <a:cs typeface="Times New Roman"/>
-                <a:sym typeface="Times New Roman"/>
-              </a:rPr>
-              <a:t>Agenda: -</a:t>
-            </a:r>
-          </a:p>
-          <a:p>
-            <a:pPr algn="l">
-              <a:lnSpc>
-                <a:spcPts val="6047"/>
-              </a:lnSpc>
-            </a:pPr>
-            <a:endParaRPr lang="en-US" sz="5039">
-              <a:solidFill>
-                <a:srgbClr val="FF0000"/>
-              </a:solidFill>
-              <a:latin typeface="Times New Roman"/>
-              <a:ea typeface="Times New Roman"/>
-              <a:cs typeface="Times New Roman"/>
-              <a:sym typeface="Times New Roman"/>
-            </a:endParaRPr>
-          </a:p>
-        </p:txBody>
-      </p:sp>
-      <p:sp>
-        <p:nvSpPr>
-          <p:cNvPr id="3" name="TextBox 3"/>
-          <p:cNvSpPr txBox="1"/>
-          <p:nvPr/>
-        </p:nvSpPr>
-        <p:spPr>
-          <a:xfrm>
-            <a:off x="714825" y="2263025"/>
-            <a:ext cx="16858352" cy="7001084"/>
-          </a:xfrm>
-          <a:prstGeom prst="rect">
-            <a:avLst/>
-          </a:prstGeom>
-        </p:spPr>
-        <p:txBody>
-          <a:bodyPr lIns="0" tIns="0" rIns="0" bIns="0" rtlCol="0" anchor="t">
-            <a:spAutoFit/>
-          </a:bodyPr>
-          <a:lstStyle/>
-          <a:p>
-            <a:pPr marL="1096823" lvl="1" indent="-548411" algn="just">
-              <a:lnSpc>
-                <a:spcPts val="4967"/>
-              </a:lnSpc>
-              <a:buFont typeface="Arial"/>
-              <a:buChar char="•"/>
-            </a:pPr>
-            <a:r>
-              <a:rPr lang="en-US" sz="3600" dirty="0">
-                <a:solidFill>
-                  <a:srgbClr val="000000"/>
-                </a:solidFill>
-                <a:latin typeface="Times New Roman"/>
-                <a:ea typeface="Times New Roman"/>
-                <a:cs typeface="Times New Roman"/>
-                <a:sym typeface="Times New Roman"/>
-              </a:rPr>
-              <a:t>Abstract</a:t>
-            </a:r>
-          </a:p>
-          <a:p>
-            <a:pPr marL="1097280" lvl="1" indent="-548640" algn="just">
-              <a:lnSpc>
-                <a:spcPts val="4967"/>
-              </a:lnSpc>
-              <a:buFont typeface="Arial"/>
-              <a:buChar char="•"/>
-            </a:pPr>
-            <a:r>
-              <a:rPr lang="en-US" sz="3600" dirty="0">
-                <a:solidFill>
-                  <a:srgbClr val="000000"/>
-                </a:solidFill>
-                <a:latin typeface="Times New Roman"/>
-                <a:ea typeface="Times New Roman"/>
-                <a:cs typeface="Times New Roman"/>
-                <a:sym typeface="Times New Roman"/>
-              </a:rPr>
-              <a:t>Literature Survey</a:t>
-            </a:r>
-          </a:p>
-          <a:p>
-            <a:pPr marL="1097280" lvl="1" indent="-548640" algn="just">
-              <a:lnSpc>
-                <a:spcPts val="4967"/>
-              </a:lnSpc>
-              <a:buFont typeface="Arial"/>
-              <a:buChar char="•"/>
-            </a:pPr>
-            <a:r>
-              <a:rPr lang="en-US" sz="3600" dirty="0">
-                <a:solidFill>
-                  <a:srgbClr val="000000"/>
-                </a:solidFill>
-                <a:latin typeface="Times New Roman"/>
-                <a:ea typeface="Times New Roman"/>
-                <a:cs typeface="Times New Roman"/>
-                <a:sym typeface="Times New Roman"/>
-              </a:rPr>
-              <a:t>Drawbacks of existing system</a:t>
-            </a:r>
-          </a:p>
-          <a:p>
-            <a:pPr marL="1096823" lvl="1" indent="-548411" algn="just">
-              <a:lnSpc>
-                <a:spcPts val="4967"/>
-              </a:lnSpc>
-              <a:buFont typeface="Arial"/>
-              <a:buChar char="•"/>
-            </a:pPr>
-            <a:r>
-              <a:rPr lang="en-US" sz="3600" dirty="0">
-                <a:solidFill>
-                  <a:srgbClr val="000000"/>
-                </a:solidFill>
-                <a:latin typeface="Times New Roman"/>
-                <a:ea typeface="Times New Roman"/>
-                <a:cs typeface="Times New Roman"/>
-                <a:sym typeface="Times New Roman"/>
-              </a:rPr>
-              <a:t>Proposed Methodology</a:t>
-            </a:r>
-          </a:p>
-          <a:p>
-            <a:pPr marL="1096823" lvl="1" indent="-548411" algn="just">
-              <a:lnSpc>
-                <a:spcPts val="4967"/>
-              </a:lnSpc>
-              <a:buFont typeface="Arial"/>
-              <a:buChar char="•"/>
-            </a:pPr>
-            <a:r>
-              <a:rPr lang="en-US" sz="3600" dirty="0">
-                <a:solidFill>
-                  <a:srgbClr val="000000"/>
-                </a:solidFill>
-                <a:latin typeface="Times New Roman"/>
-                <a:ea typeface="Times New Roman"/>
-                <a:cs typeface="Times New Roman"/>
-                <a:sym typeface="Times New Roman"/>
-              </a:rPr>
-              <a:t>Dataset</a:t>
-            </a:r>
-          </a:p>
-          <a:p>
-            <a:pPr marL="1096823" lvl="1" indent="-548411" algn="just">
-              <a:lnSpc>
-                <a:spcPts val="4967"/>
-              </a:lnSpc>
-              <a:buFont typeface="Arial"/>
-              <a:buChar char="•"/>
-            </a:pPr>
-            <a:r>
-              <a:rPr lang="en-US" sz="3600" dirty="0">
-                <a:solidFill>
-                  <a:srgbClr val="000000"/>
-                </a:solidFill>
-                <a:latin typeface="Times New Roman"/>
-                <a:ea typeface="Times New Roman"/>
-                <a:cs typeface="Times New Roman"/>
-                <a:sym typeface="Times New Roman"/>
-              </a:rPr>
-              <a:t>Block Diagram</a:t>
-            </a:r>
-          </a:p>
-          <a:p>
-            <a:pPr marL="1096823" lvl="1" indent="-548411" algn="just">
-              <a:lnSpc>
-                <a:spcPts val="4967"/>
-              </a:lnSpc>
-              <a:buFont typeface="Arial"/>
-              <a:buChar char="•"/>
-            </a:pPr>
-            <a:r>
-              <a:rPr lang="en-US" sz="3600" dirty="0">
-                <a:solidFill>
-                  <a:srgbClr val="000000"/>
-                </a:solidFill>
-                <a:latin typeface="Times New Roman"/>
-                <a:ea typeface="Times New Roman"/>
-                <a:cs typeface="Times New Roman"/>
-                <a:sym typeface="Times New Roman"/>
-              </a:rPr>
-              <a:t>Algorithm</a:t>
-            </a:r>
-          </a:p>
-          <a:p>
-            <a:pPr marL="1096823" lvl="1" indent="-548411" algn="just">
-              <a:lnSpc>
-                <a:spcPts val="4967"/>
-              </a:lnSpc>
-              <a:buFont typeface="Arial"/>
-              <a:buChar char="•"/>
-            </a:pPr>
-            <a:r>
-              <a:rPr lang="en-US" sz="3600" dirty="0">
-                <a:solidFill>
-                  <a:srgbClr val="000000"/>
-                </a:solidFill>
-                <a:latin typeface="Times New Roman"/>
-                <a:ea typeface="Times New Roman"/>
-                <a:cs typeface="Times New Roman"/>
-                <a:sym typeface="Times New Roman"/>
-              </a:rPr>
-              <a:t>Requirements</a:t>
-            </a:r>
-          </a:p>
-          <a:p>
-            <a:pPr marL="1097280" lvl="1" indent="-548640" algn="just">
-              <a:lnSpc>
-                <a:spcPts val="4967"/>
-              </a:lnSpc>
-              <a:buFont typeface="Arial"/>
-              <a:buChar char="•"/>
-            </a:pPr>
-            <a:r>
-              <a:rPr lang="en-US" sz="3600" dirty="0">
-                <a:solidFill>
-                  <a:srgbClr val="000000"/>
-                </a:solidFill>
-                <a:latin typeface="Times New Roman"/>
-                <a:ea typeface="Times New Roman"/>
-                <a:cs typeface="Times New Roman"/>
-                <a:sym typeface="Times New Roman"/>
-              </a:rPr>
-              <a:t>Timeline</a:t>
-            </a:r>
-          </a:p>
-          <a:p>
-            <a:pPr marL="1097280" lvl="1" indent="-548640" algn="just">
-              <a:lnSpc>
-                <a:spcPts val="4967"/>
-              </a:lnSpc>
-              <a:buFont typeface="Arial"/>
-              <a:buChar char="•"/>
-            </a:pPr>
-            <a:r>
-              <a:rPr lang="en-US" sz="3600" dirty="0">
-                <a:solidFill>
-                  <a:srgbClr val="000000"/>
-                </a:solidFill>
-                <a:latin typeface="Times New Roman"/>
-                <a:ea typeface="Times New Roman"/>
-                <a:cs typeface="Times New Roman"/>
-                <a:sym typeface="Times New Roman"/>
-              </a:rPr>
-              <a:t>References</a:t>
-            </a:r>
-          </a:p>
-          <a:p>
-            <a:pPr marL="1097280" lvl="1" indent="-548640" algn="just">
-              <a:lnSpc>
-                <a:spcPts val="4967"/>
-              </a:lnSpc>
-            </a:pPr>
-            <a:endParaRPr lang="en-US" sz="3600" dirty="0">
-              <a:solidFill>
-                <a:srgbClr val="000000"/>
-              </a:solidFill>
-              <a:latin typeface="Times New Roman"/>
-              <a:ea typeface="Times New Roman"/>
-              <a:cs typeface="Times New Roman"/>
-              <a:sym typeface="Times New Roman"/>
-            </a:endParaRPr>
-          </a:p>
-        </p:txBody>
-      </p:sp>
-      <p:grpSp>
-        <p:nvGrpSpPr>
-          <p:cNvPr id="4" name="Group 4"/>
-          <p:cNvGrpSpPr/>
-          <p:nvPr/>
-        </p:nvGrpSpPr>
-        <p:grpSpPr>
-          <a:xfrm>
-            <a:off x="647623" y="2012475"/>
-            <a:ext cx="17026652" cy="52650"/>
-            <a:chOff x="0" y="0"/>
-            <a:chExt cx="22702203" cy="70200"/>
-          </a:xfrm>
-        </p:grpSpPr>
-        <p:sp>
-          <p:nvSpPr>
-            <p:cNvPr id="5" name="Freeform 5"/>
-            <p:cNvSpPr/>
-            <p:nvPr/>
-          </p:nvSpPr>
-          <p:spPr>
-            <a:xfrm>
-              <a:off x="12700" y="12700"/>
-              <a:ext cx="22676865" cy="44831"/>
-            </a:xfrm>
-            <a:custGeom>
-              <a:avLst/>
-              <a:gdLst/>
-              <a:ahLst/>
-              <a:cxnLst/>
-              <a:rect l="l" t="t" r="r" b="b"/>
-              <a:pathLst>
-                <a:path w="22676865" h="44831">
-                  <a:moveTo>
-                    <a:pt x="0" y="0"/>
-                  </a:moveTo>
-                  <a:lnTo>
-                    <a:pt x="22676865" y="0"/>
-                  </a:lnTo>
-                  <a:lnTo>
-                    <a:pt x="22676865" y="44831"/>
-                  </a:lnTo>
-                  <a:lnTo>
-                    <a:pt x="0" y="44831"/>
-                  </a:lnTo>
-                  <a:close/>
-                </a:path>
-              </a:pathLst>
-            </a:custGeom>
-            <a:solidFill>
-              <a:srgbClr val="000000"/>
-            </a:solidFill>
-          </p:spPr>
-        </p:sp>
-        <p:sp>
-          <p:nvSpPr>
-            <p:cNvPr id="6" name="Freeform 6"/>
-            <p:cNvSpPr/>
-            <p:nvPr/>
-          </p:nvSpPr>
-          <p:spPr>
-            <a:xfrm>
-              <a:off x="0" y="0"/>
-              <a:ext cx="22702265" cy="70231"/>
-            </a:xfrm>
-            <a:custGeom>
-              <a:avLst/>
-              <a:gdLst/>
-              <a:ahLst/>
-              <a:cxnLst/>
-              <a:rect l="l" t="t" r="r" b="b"/>
-              <a:pathLst>
-                <a:path w="22702265" h="70231">
-                  <a:moveTo>
-                    <a:pt x="12700" y="0"/>
-                  </a:moveTo>
-                  <a:lnTo>
-                    <a:pt x="22689565" y="0"/>
-                  </a:lnTo>
-                  <a:cubicBezTo>
-                    <a:pt x="22696551" y="0"/>
-                    <a:pt x="22702265" y="5715"/>
-                    <a:pt x="22702265" y="12700"/>
-                  </a:cubicBezTo>
-                  <a:lnTo>
-                    <a:pt x="22702265" y="57531"/>
-                  </a:lnTo>
-                  <a:cubicBezTo>
-                    <a:pt x="22702265" y="64516"/>
-                    <a:pt x="22696551" y="70231"/>
-                    <a:pt x="22689565" y="70231"/>
-                  </a:cubicBezTo>
-                  <a:lnTo>
-                    <a:pt x="12700" y="70231"/>
-                  </a:lnTo>
-                  <a:cubicBezTo>
-                    <a:pt x="5715" y="70231"/>
-                    <a:pt x="0" y="64516"/>
-                    <a:pt x="0" y="57531"/>
-                  </a:cubicBezTo>
-                  <a:lnTo>
-                    <a:pt x="0" y="12700"/>
-                  </a:lnTo>
-                  <a:cubicBezTo>
-                    <a:pt x="0" y="5715"/>
-                    <a:pt x="5715" y="0"/>
-                    <a:pt x="12700" y="0"/>
-                  </a:cubicBezTo>
-                  <a:moveTo>
-                    <a:pt x="12700" y="25400"/>
-                  </a:moveTo>
-                  <a:lnTo>
-                    <a:pt x="12700" y="12700"/>
-                  </a:lnTo>
-                  <a:lnTo>
-                    <a:pt x="25400" y="12700"/>
-                  </a:lnTo>
-                  <a:lnTo>
-                    <a:pt x="25400" y="57531"/>
-                  </a:lnTo>
-                  <a:lnTo>
-                    <a:pt x="12700" y="57531"/>
-                  </a:lnTo>
-                  <a:lnTo>
-                    <a:pt x="12700" y="44831"/>
-                  </a:lnTo>
-                  <a:lnTo>
-                    <a:pt x="22689565" y="44831"/>
-                  </a:lnTo>
-                  <a:lnTo>
-                    <a:pt x="22689565" y="57531"/>
-                  </a:lnTo>
-                  <a:lnTo>
-                    <a:pt x="22676865" y="57531"/>
-                  </a:lnTo>
-                  <a:lnTo>
-                    <a:pt x="22676865" y="12700"/>
-                  </a:lnTo>
-                  <a:lnTo>
-                    <a:pt x="22689565" y="12700"/>
-                  </a:lnTo>
-                  <a:lnTo>
-                    <a:pt x="22689565" y="25400"/>
-                  </a:lnTo>
-                  <a:lnTo>
-                    <a:pt x="12700" y="25400"/>
-                  </a:lnTo>
-                  <a:close/>
-                </a:path>
-              </a:pathLst>
-            </a:custGeom>
-            <a:solidFill>
-              <a:srgbClr val="595959"/>
-            </a:solidFill>
-          </p:spPr>
-        </p:sp>
-      </p:grpSp>
-      <p:grpSp>
-        <p:nvGrpSpPr>
-          <p:cNvPr id="7" name="Group 7"/>
-          <p:cNvGrpSpPr/>
-          <p:nvPr/>
-        </p:nvGrpSpPr>
-        <p:grpSpPr>
-          <a:xfrm>
-            <a:off x="295499" y="284250"/>
-            <a:ext cx="17730900" cy="9718500"/>
-            <a:chOff x="0" y="0"/>
-            <a:chExt cx="23641200" cy="12958000"/>
-          </a:xfrm>
-        </p:grpSpPr>
-        <p:sp>
-          <p:nvSpPr>
-            <p:cNvPr id="8" name="Freeform 8"/>
-            <p:cNvSpPr/>
-            <p:nvPr/>
-          </p:nvSpPr>
-          <p:spPr>
-            <a:xfrm>
-              <a:off x="0" y="0"/>
-              <a:ext cx="23641177" cy="12957937"/>
-            </a:xfrm>
-            <a:custGeom>
-              <a:avLst/>
-              <a:gdLst/>
-              <a:ahLst/>
-              <a:cxnLst/>
-              <a:rect l="l" t="t" r="r" b="b"/>
-              <a:pathLst>
-                <a:path w="23641177" h="12957937">
-                  <a:moveTo>
-                    <a:pt x="25400" y="0"/>
-                  </a:moveTo>
-                  <a:lnTo>
-                    <a:pt x="23615777" y="0"/>
-                  </a:lnTo>
-                  <a:cubicBezTo>
-                    <a:pt x="23629747" y="0"/>
-                    <a:pt x="23641177" y="11430"/>
-                    <a:pt x="23641177" y="25400"/>
-                  </a:cubicBezTo>
-                  <a:lnTo>
-                    <a:pt x="23641177" y="12932537"/>
-                  </a:lnTo>
-                  <a:cubicBezTo>
-                    <a:pt x="23641177" y="12946507"/>
-                    <a:pt x="23629747" y="12957937"/>
-                    <a:pt x="23615777" y="12957937"/>
-                  </a:cubicBezTo>
-                  <a:lnTo>
-                    <a:pt x="25400" y="12957937"/>
-                  </a:lnTo>
-                  <a:cubicBezTo>
-                    <a:pt x="11430" y="12957937"/>
-                    <a:pt x="0" y="12946507"/>
-                    <a:pt x="0" y="12932537"/>
-                  </a:cubicBezTo>
-                  <a:lnTo>
-                    <a:pt x="0" y="25400"/>
-                  </a:lnTo>
-                  <a:cubicBezTo>
-                    <a:pt x="0" y="11430"/>
-                    <a:pt x="11430" y="0"/>
-                    <a:pt x="25400" y="0"/>
-                  </a:cubicBezTo>
-                  <a:moveTo>
-                    <a:pt x="25400" y="50800"/>
-                  </a:moveTo>
-                  <a:lnTo>
-                    <a:pt x="25400" y="25400"/>
-                  </a:lnTo>
-                  <a:lnTo>
-                    <a:pt x="50800" y="25400"/>
-                  </a:lnTo>
-                  <a:lnTo>
-                    <a:pt x="50800" y="12932537"/>
-                  </a:lnTo>
-                  <a:lnTo>
-                    <a:pt x="25400" y="12932537"/>
-                  </a:lnTo>
-                  <a:lnTo>
-                    <a:pt x="25400" y="12907137"/>
-                  </a:lnTo>
-                  <a:lnTo>
-                    <a:pt x="23615777" y="12907137"/>
-                  </a:lnTo>
-                  <a:lnTo>
-                    <a:pt x="23615777" y="12932537"/>
-                  </a:lnTo>
-                  <a:lnTo>
-                    <a:pt x="23590377" y="12932537"/>
-                  </a:lnTo>
-                  <a:lnTo>
-                    <a:pt x="23590377" y="25400"/>
-                  </a:lnTo>
-                  <a:lnTo>
-                    <a:pt x="23615777" y="25400"/>
-                  </a:lnTo>
-                  <a:lnTo>
-                    <a:pt x="23615777" y="50800"/>
-                  </a:lnTo>
-                  <a:lnTo>
-                    <a:pt x="25400" y="50800"/>
-                  </a:lnTo>
-                  <a:close/>
-                </a:path>
-              </a:pathLst>
-            </a:custGeom>
-            <a:solidFill>
-              <a:srgbClr val="000000"/>
-            </a:solidFill>
-          </p:spPr>
-        </p:sp>
-      </p:grpSp>
-    </p:spTree>
-  </p:cSld>
-  <p:clrMapOvr>
-    <a:masterClrMapping/>
-  </p:clrMapOvr>
-</p:sld>
-</file>
-
-<file path=ppt/slides/slide20.xml><?xml version="1.0" encoding="utf-8"?>
-<p:sld xmlns:a="http://schemas.openxmlformats.org/drawingml/2006/main" xmlns:r="http://schemas.openxmlformats.org/officeDocument/2006/relationships" xmlns:p="http://schemas.openxmlformats.org/presentationml/2006/main">
-  <p:cSld>
-    <p:spTree>
-      <p:nvGrpSpPr>
-        <p:cNvPr id="1" name=""/>
-        <p:cNvGrpSpPr/>
-        <p:nvPr/>
-      </p:nvGrpSpPr>
-      <p:grpSpPr>
-        <a:xfrm>
-          <a:off x="0" y="0"/>
-          <a:ext cx="0" cy="0"/>
-          <a:chOff x="0" y="0"/>
-          <a:chExt cx="0" cy="0"/>
-        </a:xfrm>
-      </p:grpSpPr>
-      <p:sp>
-        <p:nvSpPr>
-          <p:cNvPr id="2" name="TextBox 2"/>
-          <p:cNvSpPr txBox="1"/>
-          <p:nvPr/>
-        </p:nvSpPr>
-        <p:spPr>
-          <a:xfrm>
-            <a:off x="714825" y="790975"/>
-            <a:ext cx="16858350" cy="746615"/>
-          </a:xfrm>
-          <a:prstGeom prst="rect">
-            <a:avLst/>
-          </a:prstGeom>
-        </p:spPr>
-        <p:txBody>
-          <a:bodyPr lIns="0" tIns="0" rIns="0" bIns="0" rtlCol="0" anchor="t">
-            <a:spAutoFit/>
-          </a:bodyPr>
-          <a:lstStyle/>
-          <a:p>
-            <a:pPr algn="l">
-              <a:lnSpc>
-                <a:spcPts val="6220"/>
-              </a:lnSpc>
-            </a:pPr>
-            <a:r>
-              <a:rPr lang="en-US" sz="5000" dirty="0">
-                <a:solidFill>
-                  <a:srgbClr val="FF0000"/>
-                </a:solidFill>
-                <a:latin typeface="Times New Roman"/>
-                <a:ea typeface="Times New Roman"/>
-                <a:cs typeface="Times New Roman"/>
-                <a:sym typeface="Times New Roman"/>
-              </a:rPr>
-              <a:t>Data </a:t>
-            </a:r>
-            <a:r>
-              <a:rPr lang="en-US" sz="5000" dirty="0" err="1">
-                <a:solidFill>
-                  <a:srgbClr val="FF0000"/>
-                </a:solidFill>
-                <a:latin typeface="Times New Roman"/>
-                <a:ea typeface="Times New Roman"/>
-                <a:cs typeface="Times New Roman"/>
-                <a:sym typeface="Times New Roman"/>
-              </a:rPr>
-              <a:t>Augmentaion</a:t>
-            </a:r>
-            <a:endParaRPr lang="en-US" sz="5000" dirty="0">
-              <a:solidFill>
-                <a:srgbClr val="FF0000"/>
-              </a:solidFill>
-              <a:latin typeface="Times New Roman"/>
-              <a:ea typeface="Times New Roman"/>
-              <a:cs typeface="Times New Roman"/>
-              <a:sym typeface="Times New Roman"/>
-            </a:endParaRPr>
-          </a:p>
-        </p:txBody>
-      </p:sp>
-      <p:grpSp>
-        <p:nvGrpSpPr>
-          <p:cNvPr id="4" name="Group 4"/>
-          <p:cNvGrpSpPr/>
-          <p:nvPr/>
-        </p:nvGrpSpPr>
-        <p:grpSpPr>
-          <a:xfrm>
-            <a:off x="647625" y="2012475"/>
-            <a:ext cx="17026650" cy="52650"/>
-            <a:chOff x="0" y="0"/>
-            <a:chExt cx="22702200" cy="70200"/>
-          </a:xfrm>
-        </p:grpSpPr>
-        <p:sp>
-          <p:nvSpPr>
-            <p:cNvPr id="5" name="Freeform 5"/>
-            <p:cNvSpPr/>
-            <p:nvPr/>
-          </p:nvSpPr>
-          <p:spPr>
-            <a:xfrm>
-              <a:off x="12700" y="12700"/>
-              <a:ext cx="22676738" cy="44831"/>
-            </a:xfrm>
-            <a:custGeom>
-              <a:avLst/>
-              <a:gdLst/>
-              <a:ahLst/>
-              <a:cxnLst/>
-              <a:rect l="l" t="t" r="r" b="b"/>
-              <a:pathLst>
-                <a:path w="22676738" h="44831">
-                  <a:moveTo>
-                    <a:pt x="0" y="0"/>
-                  </a:moveTo>
-                  <a:lnTo>
-                    <a:pt x="22676738" y="0"/>
-                  </a:lnTo>
-                  <a:lnTo>
-                    <a:pt x="22676738" y="44831"/>
-                  </a:lnTo>
-                  <a:lnTo>
-                    <a:pt x="0" y="44831"/>
-                  </a:lnTo>
-                  <a:close/>
-                </a:path>
-              </a:pathLst>
-            </a:custGeom>
-            <a:solidFill>
-              <a:srgbClr val="000000"/>
-            </a:solidFill>
-          </p:spPr>
-        </p:sp>
-        <p:sp>
-          <p:nvSpPr>
-            <p:cNvPr id="6" name="Freeform 6"/>
-            <p:cNvSpPr/>
-            <p:nvPr/>
-          </p:nvSpPr>
-          <p:spPr>
-            <a:xfrm>
-              <a:off x="0" y="0"/>
-              <a:ext cx="22702138" cy="70231"/>
-            </a:xfrm>
-            <a:custGeom>
-              <a:avLst/>
-              <a:gdLst/>
-              <a:ahLst/>
-              <a:cxnLst/>
-              <a:rect l="l" t="t" r="r" b="b"/>
-              <a:pathLst>
-                <a:path w="22702138" h="70231">
-                  <a:moveTo>
-                    <a:pt x="12700" y="0"/>
-                  </a:moveTo>
-                  <a:lnTo>
-                    <a:pt x="22689438" y="0"/>
-                  </a:lnTo>
-                  <a:cubicBezTo>
-                    <a:pt x="22696424" y="0"/>
-                    <a:pt x="22702138" y="5715"/>
-                    <a:pt x="22702138" y="12700"/>
-                  </a:cubicBezTo>
-                  <a:lnTo>
-                    <a:pt x="22702138" y="57531"/>
-                  </a:lnTo>
-                  <a:cubicBezTo>
-                    <a:pt x="22702138" y="64516"/>
-                    <a:pt x="22696424" y="70231"/>
-                    <a:pt x="22689438" y="70231"/>
-                  </a:cubicBezTo>
-                  <a:lnTo>
-                    <a:pt x="12700" y="70231"/>
-                  </a:lnTo>
-                  <a:cubicBezTo>
-                    <a:pt x="5715" y="70231"/>
-                    <a:pt x="0" y="64516"/>
-                    <a:pt x="0" y="57531"/>
-                  </a:cubicBezTo>
-                  <a:lnTo>
-                    <a:pt x="0" y="12700"/>
-                  </a:lnTo>
-                  <a:cubicBezTo>
-                    <a:pt x="0" y="5715"/>
-                    <a:pt x="5715" y="0"/>
-                    <a:pt x="12700" y="0"/>
-                  </a:cubicBezTo>
-                  <a:moveTo>
-                    <a:pt x="12700" y="25400"/>
-                  </a:moveTo>
-                  <a:lnTo>
-                    <a:pt x="12700" y="12700"/>
-                  </a:lnTo>
-                  <a:lnTo>
-                    <a:pt x="25400" y="12700"/>
-                  </a:lnTo>
-                  <a:lnTo>
-                    <a:pt x="25400" y="57531"/>
-                  </a:lnTo>
-                  <a:lnTo>
-                    <a:pt x="12700" y="57531"/>
-                  </a:lnTo>
-                  <a:lnTo>
-                    <a:pt x="12700" y="44831"/>
-                  </a:lnTo>
-                  <a:lnTo>
-                    <a:pt x="22689438" y="44831"/>
-                  </a:lnTo>
-                  <a:lnTo>
-                    <a:pt x="22689438" y="57531"/>
-                  </a:lnTo>
-                  <a:lnTo>
-                    <a:pt x="22676738" y="57531"/>
-                  </a:lnTo>
-                  <a:lnTo>
-                    <a:pt x="22676738" y="12700"/>
-                  </a:lnTo>
-                  <a:lnTo>
-                    <a:pt x="22689438" y="12700"/>
-                  </a:lnTo>
-                  <a:lnTo>
-                    <a:pt x="22689438" y="25400"/>
-                  </a:lnTo>
-                  <a:lnTo>
-                    <a:pt x="12700" y="25400"/>
-                  </a:lnTo>
-                  <a:close/>
-                </a:path>
-              </a:pathLst>
-            </a:custGeom>
-            <a:solidFill>
-              <a:srgbClr val="595959"/>
-            </a:solidFill>
-          </p:spPr>
-        </p:sp>
-      </p:grpSp>
-      <p:grpSp>
-        <p:nvGrpSpPr>
-          <p:cNvPr id="8" name="Group 8"/>
-          <p:cNvGrpSpPr/>
-          <p:nvPr/>
-        </p:nvGrpSpPr>
-        <p:grpSpPr>
-          <a:xfrm>
-            <a:off x="295499" y="284250"/>
-            <a:ext cx="17730900" cy="9718500"/>
-            <a:chOff x="0" y="0"/>
-            <a:chExt cx="23641200" cy="12958000"/>
-          </a:xfrm>
-        </p:grpSpPr>
-        <p:sp>
-          <p:nvSpPr>
-            <p:cNvPr id="9" name="Freeform 9"/>
-            <p:cNvSpPr/>
-            <p:nvPr/>
-          </p:nvSpPr>
-          <p:spPr>
-            <a:xfrm>
-              <a:off x="0" y="0"/>
-              <a:ext cx="23641177" cy="12957937"/>
-            </a:xfrm>
-            <a:custGeom>
-              <a:avLst/>
-              <a:gdLst/>
-              <a:ahLst/>
-              <a:cxnLst/>
-              <a:rect l="l" t="t" r="r" b="b"/>
-              <a:pathLst>
-                <a:path w="23641177" h="12957937">
-                  <a:moveTo>
-                    <a:pt x="25400" y="0"/>
-                  </a:moveTo>
-                  <a:lnTo>
-                    <a:pt x="23615777" y="0"/>
-                  </a:lnTo>
-                  <a:cubicBezTo>
-                    <a:pt x="23629747" y="0"/>
-                    <a:pt x="23641177" y="11430"/>
-                    <a:pt x="23641177" y="25400"/>
-                  </a:cubicBezTo>
-                  <a:lnTo>
-                    <a:pt x="23641177" y="12932537"/>
-                  </a:lnTo>
-                  <a:cubicBezTo>
-                    <a:pt x="23641177" y="12946507"/>
-                    <a:pt x="23629747" y="12957937"/>
-                    <a:pt x="23615777" y="12957937"/>
-                  </a:cubicBezTo>
-                  <a:lnTo>
-                    <a:pt x="25400" y="12957937"/>
-                  </a:lnTo>
-                  <a:cubicBezTo>
-                    <a:pt x="11430" y="12957937"/>
-                    <a:pt x="0" y="12946507"/>
-                    <a:pt x="0" y="12932537"/>
-                  </a:cubicBezTo>
-                  <a:lnTo>
-                    <a:pt x="0" y="25400"/>
-                  </a:lnTo>
-                  <a:cubicBezTo>
-                    <a:pt x="0" y="11430"/>
-                    <a:pt x="11430" y="0"/>
-                    <a:pt x="25400" y="0"/>
-                  </a:cubicBezTo>
-                  <a:moveTo>
-                    <a:pt x="25400" y="50800"/>
-                  </a:moveTo>
-                  <a:lnTo>
-                    <a:pt x="25400" y="25400"/>
-                  </a:lnTo>
-                  <a:lnTo>
-                    <a:pt x="50800" y="25400"/>
-                  </a:lnTo>
-                  <a:lnTo>
-                    <a:pt x="50800" y="12932537"/>
-                  </a:lnTo>
-                  <a:lnTo>
-                    <a:pt x="25400" y="12932537"/>
-                  </a:lnTo>
-                  <a:lnTo>
-                    <a:pt x="25400" y="12907137"/>
-                  </a:lnTo>
-                  <a:lnTo>
-                    <a:pt x="23615777" y="12907137"/>
-                  </a:lnTo>
-                  <a:lnTo>
-                    <a:pt x="23615777" y="12932537"/>
-                  </a:lnTo>
-                  <a:lnTo>
-                    <a:pt x="23590377" y="12932537"/>
-                  </a:lnTo>
-                  <a:lnTo>
-                    <a:pt x="23590377" y="25400"/>
-                  </a:lnTo>
-                  <a:lnTo>
-                    <a:pt x="23615777" y="25400"/>
-                  </a:lnTo>
-                  <a:lnTo>
-                    <a:pt x="23615777" y="50800"/>
-                  </a:lnTo>
-                  <a:lnTo>
-                    <a:pt x="25400" y="50800"/>
-                  </a:lnTo>
-                  <a:close/>
-                </a:path>
-              </a:pathLst>
-            </a:custGeom>
-            <a:solidFill>
-              <a:srgbClr val="000000"/>
-            </a:solidFill>
-          </p:spPr>
-        </p:sp>
-      </p:grpSp>
-      <p:pic>
-        <p:nvPicPr>
           <p:cNvPr id="10" name="Picture 9">
             <a:extLst>
               <a:ext uri="{FF2B5EF4-FFF2-40B4-BE49-F238E27FC236}">
@@ -23503,8 +22455,8 @@
         </p:blipFill>
         <p:spPr>
           <a:xfrm>
-            <a:off x="684924" y="6070601"/>
-            <a:ext cx="8001017" cy="3556008"/>
+            <a:off x="786463" y="5993135"/>
+            <a:ext cx="8281337" cy="3680595"/>
           </a:xfrm>
           <a:prstGeom prst="rect">
             <a:avLst/>
@@ -23575,8 +22527,44 @@
         </p:blipFill>
         <p:spPr>
           <a:xfrm>
-            <a:off x="9067800" y="2397841"/>
+            <a:off x="9315435" y="2397841"/>
             <a:ext cx="8058165" cy="3581407"/>
+          </a:xfrm>
+          <a:prstGeom prst="rect">
+            <a:avLst/>
+          </a:prstGeom>
+        </p:spPr>
+      </p:pic>
+      <p:pic>
+        <p:nvPicPr>
+          <p:cNvPr id="7" name="Picture 6">
+            <a:extLst>
+              <a:ext uri="{FF2B5EF4-FFF2-40B4-BE49-F238E27FC236}">
+                <a16:creationId xmlns:a16="http://schemas.microsoft.com/office/drawing/2014/main" id="{F03755E3-66DD-1389-32EB-B90903AB5DFE}"/>
+              </a:ext>
+            </a:extLst>
+          </p:cNvPr>
+          <p:cNvPicPr>
+            <a:picLocks noChangeAspect="1"/>
+          </p:cNvPicPr>
+          <p:nvPr/>
+        </p:nvPicPr>
+        <p:blipFill>
+          <a:blip r:embed="rId6">
+            <a:extLst>
+              <a:ext uri="{28A0092B-C50C-407E-A947-70E740481C1C}">
+                <a14:useLocalDpi xmlns:a14="http://schemas.microsoft.com/office/drawing/2010/main" val="0"/>
+              </a:ext>
+            </a:extLst>
+          </a:blip>
+          <a:stretch>
+            <a:fillRect/>
+          </a:stretch>
+        </p:blipFill>
+        <p:spPr>
+          <a:xfrm>
+            <a:off x="990600" y="2324100"/>
+            <a:ext cx="7924800" cy="3522133"/>
           </a:xfrm>
           <a:prstGeom prst="rect">
             <a:avLst/>
@@ -23587,6 +22575,990 @@
     <p:extLst>
       <p:ext uri="{BB962C8B-B14F-4D97-AF65-F5344CB8AC3E}">
         <p14:creationId xmlns:p14="http://schemas.microsoft.com/office/powerpoint/2010/main" val="3337668691"/>
+      </p:ext>
+    </p:extLst>
+  </p:cSld>
+  <p:clrMapOvr>
+    <a:masterClrMapping/>
+  </p:clrMapOvr>
+</p:sld>
+</file>
+
+<file path=ppt/slides/slide2.xml><?xml version="1.0" encoding="utf-8"?>
+<p:sld xmlns:a="http://schemas.openxmlformats.org/drawingml/2006/main" xmlns:r="http://schemas.openxmlformats.org/officeDocument/2006/relationships" xmlns:p="http://schemas.openxmlformats.org/presentationml/2006/main">
+  <p:cSld>
+    <p:spTree>
+      <p:nvGrpSpPr>
+        <p:cNvPr id="1" name=""/>
+        <p:cNvGrpSpPr/>
+        <p:nvPr/>
+      </p:nvGrpSpPr>
+      <p:grpSpPr>
+        <a:xfrm>
+          <a:off x="0" y="0"/>
+          <a:ext cx="0" cy="0"/>
+          <a:chOff x="0" y="0"/>
+          <a:chExt cx="0" cy="0"/>
+        </a:xfrm>
+      </p:grpSpPr>
+      <p:sp>
+        <p:nvSpPr>
+          <p:cNvPr id="2" name="TextBox 2"/>
+          <p:cNvSpPr txBox="1"/>
+          <p:nvPr/>
+        </p:nvSpPr>
+        <p:spPr>
+          <a:xfrm>
+            <a:off x="714825" y="886225"/>
+            <a:ext cx="16858352" cy="1057800"/>
+          </a:xfrm>
+          <a:prstGeom prst="rect">
+            <a:avLst/>
+          </a:prstGeom>
+        </p:spPr>
+        <p:txBody>
+          <a:bodyPr lIns="0" tIns="0" rIns="0" bIns="0" rtlCol="0" anchor="t">
+            <a:spAutoFit/>
+          </a:bodyPr>
+          <a:lstStyle/>
+          <a:p>
+            <a:pPr algn="l">
+              <a:lnSpc>
+                <a:spcPts val="6047"/>
+              </a:lnSpc>
+            </a:pPr>
+            <a:r>
+              <a:rPr lang="en-US" sz="5039">
+                <a:solidFill>
+                  <a:srgbClr val="FF0000"/>
+                </a:solidFill>
+                <a:latin typeface="Times New Roman"/>
+                <a:ea typeface="Times New Roman"/>
+                <a:cs typeface="Times New Roman"/>
+                <a:sym typeface="Times New Roman"/>
+              </a:rPr>
+              <a:t>Agenda: -</a:t>
+            </a:r>
+          </a:p>
+          <a:p>
+            <a:pPr algn="l">
+              <a:lnSpc>
+                <a:spcPts val="6047"/>
+              </a:lnSpc>
+            </a:pPr>
+            <a:endParaRPr lang="en-US" sz="5039">
+              <a:solidFill>
+                <a:srgbClr val="FF0000"/>
+              </a:solidFill>
+              <a:latin typeface="Times New Roman"/>
+              <a:ea typeface="Times New Roman"/>
+              <a:cs typeface="Times New Roman"/>
+              <a:sym typeface="Times New Roman"/>
+            </a:endParaRPr>
+          </a:p>
+        </p:txBody>
+      </p:sp>
+      <p:sp>
+        <p:nvSpPr>
+          <p:cNvPr id="3" name="TextBox 3"/>
+          <p:cNvSpPr txBox="1"/>
+          <p:nvPr/>
+        </p:nvSpPr>
+        <p:spPr>
+          <a:xfrm>
+            <a:off x="714825" y="2263025"/>
+            <a:ext cx="16858352" cy="7001084"/>
+          </a:xfrm>
+          <a:prstGeom prst="rect">
+            <a:avLst/>
+          </a:prstGeom>
+        </p:spPr>
+        <p:txBody>
+          <a:bodyPr lIns="0" tIns="0" rIns="0" bIns="0" rtlCol="0" anchor="t">
+            <a:spAutoFit/>
+          </a:bodyPr>
+          <a:lstStyle/>
+          <a:p>
+            <a:pPr marL="1096823" lvl="1" indent="-548411" algn="just">
+              <a:lnSpc>
+                <a:spcPts val="4967"/>
+              </a:lnSpc>
+              <a:buFont typeface="Arial"/>
+              <a:buChar char="•"/>
+            </a:pPr>
+            <a:r>
+              <a:rPr lang="en-US" sz="3600" dirty="0">
+                <a:solidFill>
+                  <a:srgbClr val="000000"/>
+                </a:solidFill>
+                <a:latin typeface="Times New Roman"/>
+                <a:ea typeface="Times New Roman"/>
+                <a:cs typeface="Times New Roman"/>
+                <a:sym typeface="Times New Roman"/>
+              </a:rPr>
+              <a:t>Abstract</a:t>
+            </a:r>
+          </a:p>
+          <a:p>
+            <a:pPr marL="1097280" lvl="1" indent="-548640" algn="just">
+              <a:lnSpc>
+                <a:spcPts val="4967"/>
+              </a:lnSpc>
+              <a:buFont typeface="Arial"/>
+              <a:buChar char="•"/>
+            </a:pPr>
+            <a:r>
+              <a:rPr lang="en-US" sz="3600" dirty="0">
+                <a:solidFill>
+                  <a:srgbClr val="000000"/>
+                </a:solidFill>
+                <a:latin typeface="Times New Roman"/>
+                <a:ea typeface="Times New Roman"/>
+                <a:cs typeface="Times New Roman"/>
+                <a:sym typeface="Times New Roman"/>
+              </a:rPr>
+              <a:t>Literature Survey</a:t>
+            </a:r>
+          </a:p>
+          <a:p>
+            <a:pPr marL="1097280" lvl="1" indent="-548640" algn="just">
+              <a:lnSpc>
+                <a:spcPts val="4967"/>
+              </a:lnSpc>
+              <a:buFont typeface="Arial"/>
+              <a:buChar char="•"/>
+            </a:pPr>
+            <a:r>
+              <a:rPr lang="en-US" sz="3600" dirty="0">
+                <a:solidFill>
+                  <a:srgbClr val="000000"/>
+                </a:solidFill>
+                <a:latin typeface="Times New Roman"/>
+                <a:ea typeface="Times New Roman"/>
+                <a:cs typeface="Times New Roman"/>
+                <a:sym typeface="Times New Roman"/>
+              </a:rPr>
+              <a:t>Drawbacks of existing system</a:t>
+            </a:r>
+          </a:p>
+          <a:p>
+            <a:pPr marL="1096823" lvl="1" indent="-548411" algn="just">
+              <a:lnSpc>
+                <a:spcPts val="4967"/>
+              </a:lnSpc>
+              <a:buFont typeface="Arial"/>
+              <a:buChar char="•"/>
+            </a:pPr>
+            <a:r>
+              <a:rPr lang="en-US" sz="3600" dirty="0">
+                <a:solidFill>
+                  <a:srgbClr val="000000"/>
+                </a:solidFill>
+                <a:latin typeface="Times New Roman"/>
+                <a:ea typeface="Times New Roman"/>
+                <a:cs typeface="Times New Roman"/>
+                <a:sym typeface="Times New Roman"/>
+              </a:rPr>
+              <a:t>Proposed Methodology</a:t>
+            </a:r>
+          </a:p>
+          <a:p>
+            <a:pPr marL="1096823" lvl="1" indent="-548411" algn="just">
+              <a:lnSpc>
+                <a:spcPts val="4967"/>
+              </a:lnSpc>
+              <a:buFont typeface="Arial"/>
+              <a:buChar char="•"/>
+            </a:pPr>
+            <a:r>
+              <a:rPr lang="en-US" sz="3600" dirty="0">
+                <a:solidFill>
+                  <a:srgbClr val="000000"/>
+                </a:solidFill>
+                <a:latin typeface="Times New Roman"/>
+                <a:ea typeface="Times New Roman"/>
+                <a:cs typeface="Times New Roman"/>
+                <a:sym typeface="Times New Roman"/>
+              </a:rPr>
+              <a:t>Dataset</a:t>
+            </a:r>
+          </a:p>
+          <a:p>
+            <a:pPr marL="1096823" lvl="1" indent="-548411" algn="just">
+              <a:lnSpc>
+                <a:spcPts val="4967"/>
+              </a:lnSpc>
+              <a:buFont typeface="Arial"/>
+              <a:buChar char="•"/>
+            </a:pPr>
+            <a:r>
+              <a:rPr lang="en-US" sz="3600" dirty="0">
+                <a:solidFill>
+                  <a:srgbClr val="000000"/>
+                </a:solidFill>
+                <a:latin typeface="Times New Roman"/>
+                <a:ea typeface="Times New Roman"/>
+                <a:cs typeface="Times New Roman"/>
+                <a:sym typeface="Times New Roman"/>
+              </a:rPr>
+              <a:t>Block Diagram</a:t>
+            </a:r>
+          </a:p>
+          <a:p>
+            <a:pPr marL="1096823" lvl="1" indent="-548411" algn="just">
+              <a:lnSpc>
+                <a:spcPts val="4967"/>
+              </a:lnSpc>
+              <a:buFont typeface="Arial"/>
+              <a:buChar char="•"/>
+            </a:pPr>
+            <a:r>
+              <a:rPr lang="en-US" sz="3600" dirty="0">
+                <a:solidFill>
+                  <a:srgbClr val="000000"/>
+                </a:solidFill>
+                <a:latin typeface="Times New Roman"/>
+                <a:ea typeface="Times New Roman"/>
+                <a:cs typeface="Times New Roman"/>
+                <a:sym typeface="Times New Roman"/>
+              </a:rPr>
+              <a:t>Algorithm</a:t>
+            </a:r>
+          </a:p>
+          <a:p>
+            <a:pPr marL="1096823" lvl="1" indent="-548411" algn="just">
+              <a:lnSpc>
+                <a:spcPts val="4967"/>
+              </a:lnSpc>
+              <a:buFont typeface="Arial"/>
+              <a:buChar char="•"/>
+            </a:pPr>
+            <a:r>
+              <a:rPr lang="en-US" sz="3600" dirty="0">
+                <a:solidFill>
+                  <a:srgbClr val="000000"/>
+                </a:solidFill>
+                <a:latin typeface="Times New Roman"/>
+                <a:ea typeface="Times New Roman"/>
+                <a:cs typeface="Times New Roman"/>
+                <a:sym typeface="Times New Roman"/>
+              </a:rPr>
+              <a:t>Requirements</a:t>
+            </a:r>
+          </a:p>
+          <a:p>
+            <a:pPr marL="1097280" lvl="1" indent="-548640" algn="just">
+              <a:lnSpc>
+                <a:spcPts val="4967"/>
+              </a:lnSpc>
+              <a:buFont typeface="Arial"/>
+              <a:buChar char="•"/>
+            </a:pPr>
+            <a:r>
+              <a:rPr lang="en-US" sz="3600" dirty="0">
+                <a:solidFill>
+                  <a:srgbClr val="000000"/>
+                </a:solidFill>
+                <a:latin typeface="Times New Roman"/>
+                <a:ea typeface="Times New Roman"/>
+                <a:cs typeface="Times New Roman"/>
+                <a:sym typeface="Times New Roman"/>
+              </a:rPr>
+              <a:t>Timeline</a:t>
+            </a:r>
+          </a:p>
+          <a:p>
+            <a:pPr marL="1097280" lvl="1" indent="-548640" algn="just">
+              <a:lnSpc>
+                <a:spcPts val="4967"/>
+              </a:lnSpc>
+              <a:buFont typeface="Arial"/>
+              <a:buChar char="•"/>
+            </a:pPr>
+            <a:r>
+              <a:rPr lang="en-US" sz="3600" dirty="0">
+                <a:solidFill>
+                  <a:srgbClr val="000000"/>
+                </a:solidFill>
+                <a:latin typeface="Times New Roman"/>
+                <a:ea typeface="Times New Roman"/>
+                <a:cs typeface="Times New Roman"/>
+                <a:sym typeface="Times New Roman"/>
+              </a:rPr>
+              <a:t>References</a:t>
+            </a:r>
+          </a:p>
+          <a:p>
+            <a:pPr marL="1097280" lvl="1" indent="-548640" algn="just">
+              <a:lnSpc>
+                <a:spcPts val="4967"/>
+              </a:lnSpc>
+            </a:pPr>
+            <a:endParaRPr lang="en-US" sz="3600" dirty="0">
+              <a:solidFill>
+                <a:srgbClr val="000000"/>
+              </a:solidFill>
+              <a:latin typeface="Times New Roman"/>
+              <a:ea typeface="Times New Roman"/>
+              <a:cs typeface="Times New Roman"/>
+              <a:sym typeface="Times New Roman"/>
+            </a:endParaRPr>
+          </a:p>
+        </p:txBody>
+      </p:sp>
+      <p:grpSp>
+        <p:nvGrpSpPr>
+          <p:cNvPr id="4" name="Group 4"/>
+          <p:cNvGrpSpPr/>
+          <p:nvPr/>
+        </p:nvGrpSpPr>
+        <p:grpSpPr>
+          <a:xfrm>
+            <a:off x="647623" y="2012475"/>
+            <a:ext cx="17026652" cy="52650"/>
+            <a:chOff x="0" y="0"/>
+            <a:chExt cx="22702203" cy="70200"/>
+          </a:xfrm>
+        </p:grpSpPr>
+        <p:sp>
+          <p:nvSpPr>
+            <p:cNvPr id="5" name="Freeform 5"/>
+            <p:cNvSpPr/>
+            <p:nvPr/>
+          </p:nvSpPr>
+          <p:spPr>
+            <a:xfrm>
+              <a:off x="12700" y="12700"/>
+              <a:ext cx="22676865" cy="44831"/>
+            </a:xfrm>
+            <a:custGeom>
+              <a:avLst/>
+              <a:gdLst/>
+              <a:ahLst/>
+              <a:cxnLst/>
+              <a:rect l="l" t="t" r="r" b="b"/>
+              <a:pathLst>
+                <a:path w="22676865" h="44831">
+                  <a:moveTo>
+                    <a:pt x="0" y="0"/>
+                  </a:moveTo>
+                  <a:lnTo>
+                    <a:pt x="22676865" y="0"/>
+                  </a:lnTo>
+                  <a:lnTo>
+                    <a:pt x="22676865" y="44831"/>
+                  </a:lnTo>
+                  <a:lnTo>
+                    <a:pt x="0" y="44831"/>
+                  </a:lnTo>
+                  <a:close/>
+                </a:path>
+              </a:pathLst>
+            </a:custGeom>
+            <a:solidFill>
+              <a:srgbClr val="000000"/>
+            </a:solidFill>
+          </p:spPr>
+        </p:sp>
+        <p:sp>
+          <p:nvSpPr>
+            <p:cNvPr id="6" name="Freeform 6"/>
+            <p:cNvSpPr/>
+            <p:nvPr/>
+          </p:nvSpPr>
+          <p:spPr>
+            <a:xfrm>
+              <a:off x="0" y="0"/>
+              <a:ext cx="22702265" cy="70231"/>
+            </a:xfrm>
+            <a:custGeom>
+              <a:avLst/>
+              <a:gdLst/>
+              <a:ahLst/>
+              <a:cxnLst/>
+              <a:rect l="l" t="t" r="r" b="b"/>
+              <a:pathLst>
+                <a:path w="22702265" h="70231">
+                  <a:moveTo>
+                    <a:pt x="12700" y="0"/>
+                  </a:moveTo>
+                  <a:lnTo>
+                    <a:pt x="22689565" y="0"/>
+                  </a:lnTo>
+                  <a:cubicBezTo>
+                    <a:pt x="22696551" y="0"/>
+                    <a:pt x="22702265" y="5715"/>
+                    <a:pt x="22702265" y="12700"/>
+                  </a:cubicBezTo>
+                  <a:lnTo>
+                    <a:pt x="22702265" y="57531"/>
+                  </a:lnTo>
+                  <a:cubicBezTo>
+                    <a:pt x="22702265" y="64516"/>
+                    <a:pt x="22696551" y="70231"/>
+                    <a:pt x="22689565" y="70231"/>
+                  </a:cubicBezTo>
+                  <a:lnTo>
+                    <a:pt x="12700" y="70231"/>
+                  </a:lnTo>
+                  <a:cubicBezTo>
+                    <a:pt x="5715" y="70231"/>
+                    <a:pt x="0" y="64516"/>
+                    <a:pt x="0" y="57531"/>
+                  </a:cubicBezTo>
+                  <a:lnTo>
+                    <a:pt x="0" y="12700"/>
+                  </a:lnTo>
+                  <a:cubicBezTo>
+                    <a:pt x="0" y="5715"/>
+                    <a:pt x="5715" y="0"/>
+                    <a:pt x="12700" y="0"/>
+                  </a:cubicBezTo>
+                  <a:moveTo>
+                    <a:pt x="12700" y="25400"/>
+                  </a:moveTo>
+                  <a:lnTo>
+                    <a:pt x="12700" y="12700"/>
+                  </a:lnTo>
+                  <a:lnTo>
+                    <a:pt x="25400" y="12700"/>
+                  </a:lnTo>
+                  <a:lnTo>
+                    <a:pt x="25400" y="57531"/>
+                  </a:lnTo>
+                  <a:lnTo>
+                    <a:pt x="12700" y="57531"/>
+                  </a:lnTo>
+                  <a:lnTo>
+                    <a:pt x="12700" y="44831"/>
+                  </a:lnTo>
+                  <a:lnTo>
+                    <a:pt x="22689565" y="44831"/>
+                  </a:lnTo>
+                  <a:lnTo>
+                    <a:pt x="22689565" y="57531"/>
+                  </a:lnTo>
+                  <a:lnTo>
+                    <a:pt x="22676865" y="57531"/>
+                  </a:lnTo>
+                  <a:lnTo>
+                    <a:pt x="22676865" y="12700"/>
+                  </a:lnTo>
+                  <a:lnTo>
+                    <a:pt x="22689565" y="12700"/>
+                  </a:lnTo>
+                  <a:lnTo>
+                    <a:pt x="22689565" y="25400"/>
+                  </a:lnTo>
+                  <a:lnTo>
+                    <a:pt x="12700" y="25400"/>
+                  </a:lnTo>
+                  <a:close/>
+                </a:path>
+              </a:pathLst>
+            </a:custGeom>
+            <a:solidFill>
+              <a:srgbClr val="595959"/>
+            </a:solidFill>
+          </p:spPr>
+        </p:sp>
+      </p:grpSp>
+      <p:grpSp>
+        <p:nvGrpSpPr>
+          <p:cNvPr id="7" name="Group 7"/>
+          <p:cNvGrpSpPr/>
+          <p:nvPr/>
+        </p:nvGrpSpPr>
+        <p:grpSpPr>
+          <a:xfrm>
+            <a:off x="295499" y="284250"/>
+            <a:ext cx="17730900" cy="9718500"/>
+            <a:chOff x="0" y="0"/>
+            <a:chExt cx="23641200" cy="12958000"/>
+          </a:xfrm>
+        </p:grpSpPr>
+        <p:sp>
+          <p:nvSpPr>
+            <p:cNvPr id="8" name="Freeform 8"/>
+            <p:cNvSpPr/>
+            <p:nvPr/>
+          </p:nvSpPr>
+          <p:spPr>
+            <a:xfrm>
+              <a:off x="0" y="0"/>
+              <a:ext cx="23641177" cy="12957937"/>
+            </a:xfrm>
+            <a:custGeom>
+              <a:avLst/>
+              <a:gdLst/>
+              <a:ahLst/>
+              <a:cxnLst/>
+              <a:rect l="l" t="t" r="r" b="b"/>
+              <a:pathLst>
+                <a:path w="23641177" h="12957937">
+                  <a:moveTo>
+                    <a:pt x="25400" y="0"/>
+                  </a:moveTo>
+                  <a:lnTo>
+                    <a:pt x="23615777" y="0"/>
+                  </a:lnTo>
+                  <a:cubicBezTo>
+                    <a:pt x="23629747" y="0"/>
+                    <a:pt x="23641177" y="11430"/>
+                    <a:pt x="23641177" y="25400"/>
+                  </a:cubicBezTo>
+                  <a:lnTo>
+                    <a:pt x="23641177" y="12932537"/>
+                  </a:lnTo>
+                  <a:cubicBezTo>
+                    <a:pt x="23641177" y="12946507"/>
+                    <a:pt x="23629747" y="12957937"/>
+                    <a:pt x="23615777" y="12957937"/>
+                  </a:cubicBezTo>
+                  <a:lnTo>
+                    <a:pt x="25400" y="12957937"/>
+                  </a:lnTo>
+                  <a:cubicBezTo>
+                    <a:pt x="11430" y="12957937"/>
+                    <a:pt x="0" y="12946507"/>
+                    <a:pt x="0" y="12932537"/>
+                  </a:cubicBezTo>
+                  <a:lnTo>
+                    <a:pt x="0" y="25400"/>
+                  </a:lnTo>
+                  <a:cubicBezTo>
+                    <a:pt x="0" y="11430"/>
+                    <a:pt x="11430" y="0"/>
+                    <a:pt x="25400" y="0"/>
+                  </a:cubicBezTo>
+                  <a:moveTo>
+                    <a:pt x="25400" y="50800"/>
+                  </a:moveTo>
+                  <a:lnTo>
+                    <a:pt x="25400" y="25400"/>
+                  </a:lnTo>
+                  <a:lnTo>
+                    <a:pt x="50800" y="25400"/>
+                  </a:lnTo>
+                  <a:lnTo>
+                    <a:pt x="50800" y="12932537"/>
+                  </a:lnTo>
+                  <a:lnTo>
+                    <a:pt x="25400" y="12932537"/>
+                  </a:lnTo>
+                  <a:lnTo>
+                    <a:pt x="25400" y="12907137"/>
+                  </a:lnTo>
+                  <a:lnTo>
+                    <a:pt x="23615777" y="12907137"/>
+                  </a:lnTo>
+                  <a:lnTo>
+                    <a:pt x="23615777" y="12932537"/>
+                  </a:lnTo>
+                  <a:lnTo>
+                    <a:pt x="23590377" y="12932537"/>
+                  </a:lnTo>
+                  <a:lnTo>
+                    <a:pt x="23590377" y="25400"/>
+                  </a:lnTo>
+                  <a:lnTo>
+                    <a:pt x="23615777" y="25400"/>
+                  </a:lnTo>
+                  <a:lnTo>
+                    <a:pt x="23615777" y="50800"/>
+                  </a:lnTo>
+                  <a:lnTo>
+                    <a:pt x="25400" y="50800"/>
+                  </a:lnTo>
+                  <a:close/>
+                </a:path>
+              </a:pathLst>
+            </a:custGeom>
+            <a:solidFill>
+              <a:srgbClr val="000000"/>
+            </a:solidFill>
+          </p:spPr>
+        </p:sp>
+      </p:grpSp>
+    </p:spTree>
+  </p:cSld>
+  <p:clrMapOvr>
+    <a:masterClrMapping/>
+  </p:clrMapOvr>
+</p:sld>
+</file>
+
+<file path=ppt/slides/slide20.xml><?xml version="1.0" encoding="utf-8"?>
+<p:sld xmlns:a="http://schemas.openxmlformats.org/drawingml/2006/main" xmlns:r="http://schemas.openxmlformats.org/officeDocument/2006/relationships" xmlns:p="http://schemas.openxmlformats.org/presentationml/2006/main">
+  <p:cSld>
+    <p:spTree>
+      <p:nvGrpSpPr>
+        <p:cNvPr id="1" name=""/>
+        <p:cNvGrpSpPr/>
+        <p:nvPr/>
+      </p:nvGrpSpPr>
+      <p:grpSpPr>
+        <a:xfrm>
+          <a:off x="0" y="0"/>
+          <a:ext cx="0" cy="0"/>
+          <a:chOff x="0" y="0"/>
+          <a:chExt cx="0" cy="0"/>
+        </a:xfrm>
+      </p:grpSpPr>
+      <p:sp>
+        <p:nvSpPr>
+          <p:cNvPr id="2" name="TextBox 2"/>
+          <p:cNvSpPr txBox="1"/>
+          <p:nvPr/>
+        </p:nvSpPr>
+        <p:spPr>
+          <a:xfrm>
+            <a:off x="714825" y="790975"/>
+            <a:ext cx="16858350" cy="746615"/>
+          </a:xfrm>
+          <a:prstGeom prst="rect">
+            <a:avLst/>
+          </a:prstGeom>
+        </p:spPr>
+        <p:txBody>
+          <a:bodyPr lIns="0" tIns="0" rIns="0" bIns="0" rtlCol="0" anchor="t">
+            <a:spAutoFit/>
+          </a:bodyPr>
+          <a:lstStyle/>
+          <a:p>
+            <a:pPr algn="l">
+              <a:lnSpc>
+                <a:spcPts val="6220"/>
+              </a:lnSpc>
+            </a:pPr>
+            <a:r>
+              <a:rPr lang="en-US" sz="5000" dirty="0">
+                <a:solidFill>
+                  <a:srgbClr val="FF0000"/>
+                </a:solidFill>
+                <a:latin typeface="Times New Roman"/>
+                <a:ea typeface="Times New Roman"/>
+                <a:cs typeface="Times New Roman"/>
+                <a:sym typeface="Times New Roman"/>
+              </a:rPr>
+              <a:t>Data Augmentation – Correlation Comparison</a:t>
+            </a:r>
+          </a:p>
+        </p:txBody>
+      </p:sp>
+      <p:grpSp>
+        <p:nvGrpSpPr>
+          <p:cNvPr id="4" name="Group 4"/>
+          <p:cNvGrpSpPr/>
+          <p:nvPr/>
+        </p:nvGrpSpPr>
+        <p:grpSpPr>
+          <a:xfrm>
+            <a:off x="647625" y="2012475"/>
+            <a:ext cx="17026650" cy="52650"/>
+            <a:chOff x="0" y="0"/>
+            <a:chExt cx="22702200" cy="70200"/>
+          </a:xfrm>
+        </p:grpSpPr>
+        <p:sp>
+          <p:nvSpPr>
+            <p:cNvPr id="5" name="Freeform 5"/>
+            <p:cNvSpPr/>
+            <p:nvPr/>
+          </p:nvSpPr>
+          <p:spPr>
+            <a:xfrm>
+              <a:off x="12700" y="12700"/>
+              <a:ext cx="22676738" cy="44831"/>
+            </a:xfrm>
+            <a:custGeom>
+              <a:avLst/>
+              <a:gdLst/>
+              <a:ahLst/>
+              <a:cxnLst/>
+              <a:rect l="l" t="t" r="r" b="b"/>
+              <a:pathLst>
+                <a:path w="22676738" h="44831">
+                  <a:moveTo>
+                    <a:pt x="0" y="0"/>
+                  </a:moveTo>
+                  <a:lnTo>
+                    <a:pt x="22676738" y="0"/>
+                  </a:lnTo>
+                  <a:lnTo>
+                    <a:pt x="22676738" y="44831"/>
+                  </a:lnTo>
+                  <a:lnTo>
+                    <a:pt x="0" y="44831"/>
+                  </a:lnTo>
+                  <a:close/>
+                </a:path>
+              </a:pathLst>
+            </a:custGeom>
+            <a:solidFill>
+              <a:srgbClr val="000000"/>
+            </a:solidFill>
+          </p:spPr>
+        </p:sp>
+        <p:sp>
+          <p:nvSpPr>
+            <p:cNvPr id="6" name="Freeform 6"/>
+            <p:cNvSpPr/>
+            <p:nvPr/>
+          </p:nvSpPr>
+          <p:spPr>
+            <a:xfrm>
+              <a:off x="0" y="0"/>
+              <a:ext cx="22702138" cy="70231"/>
+            </a:xfrm>
+            <a:custGeom>
+              <a:avLst/>
+              <a:gdLst/>
+              <a:ahLst/>
+              <a:cxnLst/>
+              <a:rect l="l" t="t" r="r" b="b"/>
+              <a:pathLst>
+                <a:path w="22702138" h="70231">
+                  <a:moveTo>
+                    <a:pt x="12700" y="0"/>
+                  </a:moveTo>
+                  <a:lnTo>
+                    <a:pt x="22689438" y="0"/>
+                  </a:lnTo>
+                  <a:cubicBezTo>
+                    <a:pt x="22696424" y="0"/>
+                    <a:pt x="22702138" y="5715"/>
+                    <a:pt x="22702138" y="12700"/>
+                  </a:cubicBezTo>
+                  <a:lnTo>
+                    <a:pt x="22702138" y="57531"/>
+                  </a:lnTo>
+                  <a:cubicBezTo>
+                    <a:pt x="22702138" y="64516"/>
+                    <a:pt x="22696424" y="70231"/>
+                    <a:pt x="22689438" y="70231"/>
+                  </a:cubicBezTo>
+                  <a:lnTo>
+                    <a:pt x="12700" y="70231"/>
+                  </a:lnTo>
+                  <a:cubicBezTo>
+                    <a:pt x="5715" y="70231"/>
+                    <a:pt x="0" y="64516"/>
+                    <a:pt x="0" y="57531"/>
+                  </a:cubicBezTo>
+                  <a:lnTo>
+                    <a:pt x="0" y="12700"/>
+                  </a:lnTo>
+                  <a:cubicBezTo>
+                    <a:pt x="0" y="5715"/>
+                    <a:pt x="5715" y="0"/>
+                    <a:pt x="12700" y="0"/>
+                  </a:cubicBezTo>
+                  <a:moveTo>
+                    <a:pt x="12700" y="25400"/>
+                  </a:moveTo>
+                  <a:lnTo>
+                    <a:pt x="12700" y="12700"/>
+                  </a:lnTo>
+                  <a:lnTo>
+                    <a:pt x="25400" y="12700"/>
+                  </a:lnTo>
+                  <a:lnTo>
+                    <a:pt x="25400" y="57531"/>
+                  </a:lnTo>
+                  <a:lnTo>
+                    <a:pt x="12700" y="57531"/>
+                  </a:lnTo>
+                  <a:lnTo>
+                    <a:pt x="12700" y="44831"/>
+                  </a:lnTo>
+                  <a:lnTo>
+                    <a:pt x="22689438" y="44831"/>
+                  </a:lnTo>
+                  <a:lnTo>
+                    <a:pt x="22689438" y="57531"/>
+                  </a:lnTo>
+                  <a:lnTo>
+                    <a:pt x="22676738" y="57531"/>
+                  </a:lnTo>
+                  <a:lnTo>
+                    <a:pt x="22676738" y="12700"/>
+                  </a:lnTo>
+                  <a:lnTo>
+                    <a:pt x="22689438" y="12700"/>
+                  </a:lnTo>
+                  <a:lnTo>
+                    <a:pt x="22689438" y="25400"/>
+                  </a:lnTo>
+                  <a:lnTo>
+                    <a:pt x="12700" y="25400"/>
+                  </a:lnTo>
+                  <a:close/>
+                </a:path>
+              </a:pathLst>
+            </a:custGeom>
+            <a:solidFill>
+              <a:srgbClr val="595959"/>
+            </a:solidFill>
+          </p:spPr>
+        </p:sp>
+      </p:grpSp>
+      <p:grpSp>
+        <p:nvGrpSpPr>
+          <p:cNvPr id="8" name="Group 8"/>
+          <p:cNvGrpSpPr/>
+          <p:nvPr/>
+        </p:nvGrpSpPr>
+        <p:grpSpPr>
+          <a:xfrm>
+            <a:off x="295499" y="284250"/>
+            <a:ext cx="17730900" cy="9718500"/>
+            <a:chOff x="0" y="0"/>
+            <a:chExt cx="23641200" cy="12958000"/>
+          </a:xfrm>
+        </p:grpSpPr>
+        <p:sp>
+          <p:nvSpPr>
+            <p:cNvPr id="9" name="Freeform 9"/>
+            <p:cNvSpPr/>
+            <p:nvPr/>
+          </p:nvSpPr>
+          <p:spPr>
+            <a:xfrm>
+              <a:off x="0" y="0"/>
+              <a:ext cx="23641177" cy="12957937"/>
+            </a:xfrm>
+            <a:custGeom>
+              <a:avLst/>
+              <a:gdLst/>
+              <a:ahLst/>
+              <a:cxnLst/>
+              <a:rect l="l" t="t" r="r" b="b"/>
+              <a:pathLst>
+                <a:path w="23641177" h="12957937">
+                  <a:moveTo>
+                    <a:pt x="25400" y="0"/>
+                  </a:moveTo>
+                  <a:lnTo>
+                    <a:pt x="23615777" y="0"/>
+                  </a:lnTo>
+                  <a:cubicBezTo>
+                    <a:pt x="23629747" y="0"/>
+                    <a:pt x="23641177" y="11430"/>
+                    <a:pt x="23641177" y="25400"/>
+                  </a:cubicBezTo>
+                  <a:lnTo>
+                    <a:pt x="23641177" y="12932537"/>
+                  </a:lnTo>
+                  <a:cubicBezTo>
+                    <a:pt x="23641177" y="12946507"/>
+                    <a:pt x="23629747" y="12957937"/>
+                    <a:pt x="23615777" y="12957937"/>
+                  </a:cubicBezTo>
+                  <a:lnTo>
+                    <a:pt x="25400" y="12957937"/>
+                  </a:lnTo>
+                  <a:cubicBezTo>
+                    <a:pt x="11430" y="12957937"/>
+                    <a:pt x="0" y="12946507"/>
+                    <a:pt x="0" y="12932537"/>
+                  </a:cubicBezTo>
+                  <a:lnTo>
+                    <a:pt x="0" y="25400"/>
+                  </a:lnTo>
+                  <a:cubicBezTo>
+                    <a:pt x="0" y="11430"/>
+                    <a:pt x="11430" y="0"/>
+                    <a:pt x="25400" y="0"/>
+                  </a:cubicBezTo>
+                  <a:moveTo>
+                    <a:pt x="25400" y="50800"/>
+                  </a:moveTo>
+                  <a:lnTo>
+                    <a:pt x="25400" y="25400"/>
+                  </a:lnTo>
+                  <a:lnTo>
+                    <a:pt x="50800" y="25400"/>
+                  </a:lnTo>
+                  <a:lnTo>
+                    <a:pt x="50800" y="12932537"/>
+                  </a:lnTo>
+                  <a:lnTo>
+                    <a:pt x="25400" y="12932537"/>
+                  </a:lnTo>
+                  <a:lnTo>
+                    <a:pt x="25400" y="12907137"/>
+                  </a:lnTo>
+                  <a:lnTo>
+                    <a:pt x="23615777" y="12907137"/>
+                  </a:lnTo>
+                  <a:lnTo>
+                    <a:pt x="23615777" y="12932537"/>
+                  </a:lnTo>
+                  <a:lnTo>
+                    <a:pt x="23590377" y="12932537"/>
+                  </a:lnTo>
+                  <a:lnTo>
+                    <a:pt x="23590377" y="25400"/>
+                  </a:lnTo>
+                  <a:lnTo>
+                    <a:pt x="23615777" y="25400"/>
+                  </a:lnTo>
+                  <a:lnTo>
+                    <a:pt x="23615777" y="50800"/>
+                  </a:lnTo>
+                  <a:lnTo>
+                    <a:pt x="25400" y="50800"/>
+                  </a:lnTo>
+                  <a:close/>
+                </a:path>
+              </a:pathLst>
+            </a:custGeom>
+            <a:solidFill>
+              <a:srgbClr val="000000"/>
+            </a:solidFill>
+          </p:spPr>
+        </p:sp>
+      </p:grpSp>
+      <p:pic>
+        <p:nvPicPr>
+          <p:cNvPr id="7" name="Picture 6">
+            <a:extLst>
+              <a:ext uri="{FF2B5EF4-FFF2-40B4-BE49-F238E27FC236}">
+                <a16:creationId xmlns:a16="http://schemas.microsoft.com/office/drawing/2014/main" id="{D4BA1BDF-93E5-59E9-11E5-F270120AD96D}"/>
+              </a:ext>
+            </a:extLst>
+          </p:cNvPr>
+          <p:cNvPicPr>
+            <a:picLocks noChangeAspect="1"/>
+          </p:cNvPicPr>
+          <p:nvPr/>
+        </p:nvPicPr>
+        <p:blipFill rotWithShape="1">
+          <a:blip r:embed="rId3">
+            <a:extLst>
+              <a:ext uri="{28A0092B-C50C-407E-A947-70E740481C1C}">
+                <a14:useLocalDpi xmlns:a14="http://schemas.microsoft.com/office/drawing/2010/main" val="0"/>
+              </a:ext>
+            </a:extLst>
+          </a:blip>
+          <a:srcRect l="575" r="2657"/>
+          <a:stretch/>
+        </p:blipFill>
+        <p:spPr>
+          <a:xfrm>
+            <a:off x="838200" y="2292291"/>
+            <a:ext cx="16424792" cy="7543800"/>
+          </a:xfrm>
+          <a:prstGeom prst="rect">
+            <a:avLst/>
+          </a:prstGeom>
+        </p:spPr>
+      </p:pic>
+    </p:spTree>
+    <p:extLst>
+      <p:ext uri="{BB962C8B-B14F-4D97-AF65-F5344CB8AC3E}">
+        <p14:creationId xmlns:p14="http://schemas.microsoft.com/office/powerpoint/2010/main" val="4060776674"/>
       </p:ext>
     </p:extLst>
   </p:cSld>
@@ -23649,7 +23621,7 @@
                 <a:cs typeface="Times New Roman"/>
                 <a:sym typeface="Times New Roman"/>
               </a:rPr>
-              <a:t>Data Augmentation</a:t>
+              <a:t>Model Comparison</a:t>
             </a:r>
           </a:p>
         </p:txBody>
@@ -23928,45 +23900,414 @@
           </p:spPr>
         </p:sp>
       </p:grpSp>
-      <p:pic>
-        <p:nvPicPr>
-          <p:cNvPr id="7" name="Picture 6">
+      <p:sp>
+        <p:nvSpPr>
+          <p:cNvPr id="3" name="TextBox 7">
             <a:extLst>
               <a:ext uri="{FF2B5EF4-FFF2-40B4-BE49-F238E27FC236}">
-                <a16:creationId xmlns:a16="http://schemas.microsoft.com/office/drawing/2014/main" id="{D4BA1BDF-93E5-59E9-11E5-F270120AD96D}"/>
+                <a16:creationId xmlns:a16="http://schemas.microsoft.com/office/drawing/2014/main" id="{62FA5441-5544-AF7F-ECA8-E56B5E8D0889}"/>
               </a:ext>
             </a:extLst>
           </p:cNvPr>
-          <p:cNvPicPr>
-            <a:picLocks noChangeAspect="1"/>
-          </p:cNvPicPr>
+          <p:cNvSpPr txBox="1"/>
           <p:nvPr/>
-        </p:nvPicPr>
-        <p:blipFill rotWithShape="1">
-          <a:blip r:embed="rId3">
-            <a:extLst>
-              <a:ext uri="{28A0092B-C50C-407E-A947-70E740481C1C}">
-                <a14:useLocalDpi xmlns:a14="http://schemas.microsoft.com/office/drawing/2010/main" val="0"/>
-              </a:ext>
-            </a:extLst>
-          </a:blip>
-          <a:srcRect l="575" r="2657"/>
-          <a:stretch/>
-        </p:blipFill>
+        </p:nvSpPr>
         <p:spPr>
           <a:xfrm>
-            <a:off x="2438400" y="2933700"/>
-            <a:ext cx="12820944" cy="5888576"/>
+            <a:off x="1600200" y="3009900"/>
+            <a:ext cx="7543800" cy="6385851"/>
           </a:xfrm>
           <a:prstGeom prst="rect">
             <a:avLst/>
           </a:prstGeom>
         </p:spPr>
-      </p:pic>
+        <p:txBody>
+          <a:bodyPr wrap="square" lIns="0" tIns="0" rIns="0" bIns="0" rtlCol="0" anchor="t">
+            <a:spAutoFit/>
+          </a:bodyPr>
+          <a:lstStyle/>
+          <a:p>
+            <a:pPr marL="356235" lvl="1" algn="l">
+              <a:lnSpc>
+                <a:spcPct val="150000"/>
+              </a:lnSpc>
+            </a:pPr>
+            <a:r>
+              <a:rPr lang="en-US" sz="2800" b="1" dirty="0">
+                <a:solidFill>
+                  <a:srgbClr val="000000"/>
+                </a:solidFill>
+                <a:latin typeface="Times New Roman"/>
+                <a:ea typeface="Times New Roman"/>
+                <a:cs typeface="Times New Roman"/>
+                <a:sym typeface="Times New Roman"/>
+              </a:rPr>
+              <a:t>Regression models used :</a:t>
+            </a:r>
+          </a:p>
+          <a:p>
+            <a:pPr marL="870585" lvl="1" indent="-514350" algn="l">
+              <a:lnSpc>
+                <a:spcPct val="150000"/>
+              </a:lnSpc>
+              <a:buFont typeface="+mj-lt"/>
+              <a:buAutoNum type="arabicPeriod"/>
+            </a:pPr>
+            <a:r>
+              <a:rPr lang="en-US" sz="2800" dirty="0">
+                <a:solidFill>
+                  <a:srgbClr val="000000"/>
+                </a:solidFill>
+                <a:latin typeface="Times New Roman"/>
+                <a:ea typeface="Times New Roman"/>
+                <a:cs typeface="Times New Roman"/>
+                <a:sym typeface="Times New Roman"/>
+              </a:rPr>
+              <a:t>Liner regression</a:t>
+            </a:r>
+          </a:p>
+          <a:p>
+            <a:pPr marL="870585" lvl="1" indent="-514350" algn="l">
+              <a:lnSpc>
+                <a:spcPct val="150000"/>
+              </a:lnSpc>
+              <a:buFont typeface="+mj-lt"/>
+              <a:buAutoNum type="arabicPeriod"/>
+            </a:pPr>
+            <a:r>
+              <a:rPr lang="en-US" sz="2800" dirty="0">
+                <a:solidFill>
+                  <a:srgbClr val="000000"/>
+                </a:solidFill>
+                <a:latin typeface="Times New Roman"/>
+                <a:ea typeface="Times New Roman"/>
+                <a:cs typeface="Times New Roman"/>
+                <a:sym typeface="Times New Roman"/>
+              </a:rPr>
+              <a:t>Lasso regression</a:t>
+            </a:r>
+          </a:p>
+          <a:p>
+            <a:pPr marL="870585" lvl="1" indent="-514350" algn="l">
+              <a:lnSpc>
+                <a:spcPct val="150000"/>
+              </a:lnSpc>
+              <a:buFont typeface="+mj-lt"/>
+              <a:buAutoNum type="arabicPeriod"/>
+            </a:pPr>
+            <a:r>
+              <a:rPr lang="en-US" sz="2800" dirty="0">
+                <a:solidFill>
+                  <a:srgbClr val="000000"/>
+                </a:solidFill>
+                <a:latin typeface="Times New Roman"/>
+                <a:ea typeface="Times New Roman"/>
+                <a:cs typeface="Times New Roman"/>
+                <a:sym typeface="Times New Roman"/>
+              </a:rPr>
+              <a:t>Ridge regression</a:t>
+            </a:r>
+          </a:p>
+          <a:p>
+            <a:pPr marL="870585" lvl="1" indent="-514350" algn="l">
+              <a:lnSpc>
+                <a:spcPct val="150000"/>
+              </a:lnSpc>
+              <a:buFont typeface="+mj-lt"/>
+              <a:buAutoNum type="arabicPeriod"/>
+            </a:pPr>
+            <a:r>
+              <a:rPr lang="en-US" sz="2800" dirty="0">
+                <a:solidFill>
+                  <a:srgbClr val="000000"/>
+                </a:solidFill>
+                <a:latin typeface="Times New Roman"/>
+                <a:ea typeface="Times New Roman"/>
+                <a:cs typeface="Times New Roman"/>
+                <a:sym typeface="Times New Roman"/>
+              </a:rPr>
+              <a:t>Decision tree</a:t>
+            </a:r>
+          </a:p>
+          <a:p>
+            <a:pPr marL="870585" lvl="1" indent="-514350" algn="l">
+              <a:lnSpc>
+                <a:spcPct val="150000"/>
+              </a:lnSpc>
+              <a:buFont typeface="+mj-lt"/>
+              <a:buAutoNum type="arabicPeriod"/>
+            </a:pPr>
+            <a:r>
+              <a:rPr lang="en-US" sz="2800" dirty="0">
+                <a:solidFill>
+                  <a:srgbClr val="000000"/>
+                </a:solidFill>
+                <a:latin typeface="Times New Roman"/>
+                <a:ea typeface="Times New Roman"/>
+                <a:cs typeface="Times New Roman"/>
+                <a:sym typeface="Times New Roman"/>
+              </a:rPr>
+              <a:t>Random forest</a:t>
+            </a:r>
+          </a:p>
+          <a:p>
+            <a:pPr marL="870585" lvl="1" indent="-514350" algn="l">
+              <a:lnSpc>
+                <a:spcPct val="150000"/>
+              </a:lnSpc>
+              <a:buFont typeface="+mj-lt"/>
+              <a:buAutoNum type="arabicPeriod"/>
+            </a:pPr>
+            <a:r>
+              <a:rPr lang="en-US" sz="2800" dirty="0">
+                <a:solidFill>
+                  <a:srgbClr val="000000"/>
+                </a:solidFill>
+                <a:latin typeface="Times New Roman"/>
+                <a:ea typeface="Times New Roman"/>
+                <a:cs typeface="Times New Roman"/>
+                <a:sym typeface="Times New Roman"/>
+              </a:rPr>
+              <a:t>Gradient boosting</a:t>
+            </a:r>
+          </a:p>
+          <a:p>
+            <a:pPr marL="870585" lvl="1" indent="-514350" algn="l">
+              <a:lnSpc>
+                <a:spcPct val="150000"/>
+              </a:lnSpc>
+              <a:buFont typeface="+mj-lt"/>
+              <a:buAutoNum type="arabicPeriod"/>
+            </a:pPr>
+            <a:r>
+              <a:rPr lang="en-US" sz="2800" dirty="0">
+                <a:solidFill>
+                  <a:srgbClr val="000000"/>
+                </a:solidFill>
+                <a:latin typeface="Times New Roman"/>
+                <a:ea typeface="Times New Roman"/>
+                <a:cs typeface="Times New Roman"/>
+                <a:sym typeface="Times New Roman"/>
+              </a:rPr>
+              <a:t>Support vector machine</a:t>
+            </a:r>
+          </a:p>
+          <a:p>
+            <a:pPr marL="870585" lvl="1" indent="-514350" algn="l">
+              <a:lnSpc>
+                <a:spcPct val="150000"/>
+              </a:lnSpc>
+              <a:buFont typeface="+mj-lt"/>
+              <a:buAutoNum type="arabicPeriod"/>
+            </a:pPr>
+            <a:r>
+              <a:rPr lang="en-US" sz="2800" dirty="0">
+                <a:solidFill>
+                  <a:srgbClr val="000000"/>
+                </a:solidFill>
+                <a:latin typeface="Times New Roman"/>
+                <a:ea typeface="Times New Roman"/>
+                <a:cs typeface="Times New Roman"/>
+                <a:sym typeface="Times New Roman"/>
+              </a:rPr>
+              <a:t>Polynomial regression</a:t>
+            </a:r>
+          </a:p>
+          <a:p>
+            <a:pPr algn="ctr">
+              <a:lnSpc>
+                <a:spcPct val="150000"/>
+              </a:lnSpc>
+            </a:pPr>
+            <a:endParaRPr lang="en-US" sz="2800" dirty="0">
+              <a:solidFill>
+                <a:srgbClr val="000000"/>
+              </a:solidFill>
+              <a:latin typeface="Times New Roman"/>
+              <a:ea typeface="Times New Roman"/>
+              <a:cs typeface="Times New Roman"/>
+              <a:sym typeface="Times New Roman"/>
+            </a:endParaRPr>
+          </a:p>
+        </p:txBody>
+      </p:sp>
+      <p:sp>
+        <p:nvSpPr>
+          <p:cNvPr id="7" name="TextBox 7">
+            <a:extLst>
+              <a:ext uri="{FF2B5EF4-FFF2-40B4-BE49-F238E27FC236}">
+                <a16:creationId xmlns:a16="http://schemas.microsoft.com/office/drawing/2014/main" id="{0AA4883A-F585-FC40-94E8-ABFEF1794BC2}"/>
+              </a:ext>
+            </a:extLst>
+          </p:cNvPr>
+          <p:cNvSpPr txBox="1"/>
+          <p:nvPr/>
+        </p:nvSpPr>
+        <p:spPr>
+          <a:xfrm>
+            <a:off x="9813291" y="3086100"/>
+            <a:ext cx="7543800" cy="4446858"/>
+          </a:xfrm>
+          <a:prstGeom prst="rect">
+            <a:avLst/>
+          </a:prstGeom>
+        </p:spPr>
+        <p:txBody>
+          <a:bodyPr wrap="square" lIns="0" tIns="0" rIns="0" bIns="0" rtlCol="0" anchor="t">
+            <a:spAutoFit/>
+          </a:bodyPr>
+          <a:lstStyle/>
+          <a:p>
+            <a:pPr marL="356235" lvl="1" algn="l">
+              <a:lnSpc>
+                <a:spcPct val="150000"/>
+              </a:lnSpc>
+            </a:pPr>
+            <a:r>
+              <a:rPr lang="en-US" sz="2800" b="1" dirty="0">
+                <a:solidFill>
+                  <a:srgbClr val="000000"/>
+                </a:solidFill>
+                <a:latin typeface="Times New Roman"/>
+                <a:ea typeface="Times New Roman"/>
+                <a:cs typeface="Times New Roman"/>
+                <a:sym typeface="Times New Roman"/>
+              </a:rPr>
+              <a:t>Metrics compared:</a:t>
+            </a:r>
+          </a:p>
+          <a:p>
+            <a:pPr marL="870585" lvl="1" indent="-514350" algn="l">
+              <a:lnSpc>
+                <a:spcPct val="150000"/>
+              </a:lnSpc>
+              <a:buFont typeface="+mj-lt"/>
+              <a:buAutoNum type="arabicPeriod"/>
+            </a:pPr>
+            <a:r>
+              <a:rPr lang="en-US" sz="2800" dirty="0">
+                <a:solidFill>
+                  <a:srgbClr val="000000"/>
+                </a:solidFill>
+                <a:latin typeface="Times New Roman"/>
+                <a:ea typeface="Times New Roman"/>
+                <a:cs typeface="Times New Roman"/>
+                <a:sym typeface="Times New Roman"/>
+              </a:rPr>
+              <a:t>MSE: Mean Squared Error</a:t>
+            </a:r>
+          </a:p>
+          <a:p>
+            <a:pPr marL="870585" lvl="1" indent="-514350" algn="l">
+              <a:lnSpc>
+                <a:spcPct val="150000"/>
+              </a:lnSpc>
+              <a:buFont typeface="+mj-lt"/>
+              <a:buAutoNum type="arabicPeriod"/>
+            </a:pPr>
+            <a:r>
+              <a:rPr lang="en-US" sz="2800" dirty="0">
+                <a:solidFill>
+                  <a:srgbClr val="000000"/>
+                </a:solidFill>
+                <a:latin typeface="Times New Roman"/>
+                <a:ea typeface="Times New Roman"/>
+                <a:cs typeface="Times New Roman"/>
+                <a:sym typeface="Times New Roman"/>
+              </a:rPr>
+              <a:t>RMSE: Root Mean Squared Error</a:t>
+            </a:r>
+          </a:p>
+          <a:p>
+            <a:pPr marL="870585" lvl="1" indent="-514350" algn="l">
+              <a:lnSpc>
+                <a:spcPct val="150000"/>
+              </a:lnSpc>
+              <a:buFont typeface="+mj-lt"/>
+              <a:buAutoNum type="arabicPeriod"/>
+            </a:pPr>
+            <a:r>
+              <a:rPr lang="en-US" sz="2800" dirty="0">
+                <a:solidFill>
+                  <a:srgbClr val="000000"/>
+                </a:solidFill>
+                <a:latin typeface="Times New Roman"/>
+                <a:ea typeface="Times New Roman"/>
+                <a:cs typeface="Times New Roman"/>
+                <a:sym typeface="Times New Roman"/>
+              </a:rPr>
+              <a:t>R2: R-Squared</a:t>
+            </a:r>
+          </a:p>
+          <a:p>
+            <a:pPr marL="870585" lvl="1" indent="-514350" algn="l">
+              <a:lnSpc>
+                <a:spcPct val="150000"/>
+              </a:lnSpc>
+              <a:buFont typeface="+mj-lt"/>
+              <a:buAutoNum type="arabicPeriod"/>
+            </a:pPr>
+            <a:r>
+              <a:rPr lang="en-US" sz="2800" dirty="0">
+                <a:solidFill>
+                  <a:srgbClr val="000000"/>
+                </a:solidFill>
+                <a:latin typeface="Times New Roman"/>
+                <a:ea typeface="Times New Roman"/>
+                <a:cs typeface="Times New Roman"/>
+                <a:sym typeface="Times New Roman"/>
+              </a:rPr>
+              <a:t>Adjusted R2: Adjusted R-Squared</a:t>
+            </a:r>
+          </a:p>
+          <a:p>
+            <a:pPr marL="870585" lvl="1" indent="-514350" algn="l">
+              <a:lnSpc>
+                <a:spcPct val="150000"/>
+              </a:lnSpc>
+              <a:buFont typeface="+mj-lt"/>
+              <a:buAutoNum type="arabicPeriod"/>
+            </a:pPr>
+            <a:r>
+              <a:rPr lang="en-US" sz="2800" dirty="0">
+                <a:solidFill>
+                  <a:srgbClr val="000000"/>
+                </a:solidFill>
+                <a:latin typeface="Times New Roman"/>
+                <a:ea typeface="Times New Roman"/>
+                <a:cs typeface="Times New Roman"/>
+                <a:sym typeface="Times New Roman"/>
+              </a:rPr>
+              <a:t>MAPE: Mean Absolute Percentage Error</a:t>
+            </a:r>
+          </a:p>
+          <a:p>
+            <a:pPr marL="870585" lvl="1" indent="-514350" algn="l">
+              <a:lnSpc>
+                <a:spcPct val="150000"/>
+              </a:lnSpc>
+              <a:buFont typeface="+mj-lt"/>
+              <a:buAutoNum type="arabicPeriod"/>
+            </a:pPr>
+            <a:r>
+              <a:rPr lang="en-US" sz="2800" dirty="0">
+                <a:solidFill>
+                  <a:srgbClr val="000000"/>
+                </a:solidFill>
+                <a:latin typeface="Times New Roman"/>
+                <a:ea typeface="Times New Roman"/>
+                <a:cs typeface="Times New Roman"/>
+                <a:sym typeface="Times New Roman"/>
+              </a:rPr>
+              <a:t>MAE: Mean Absolute Error</a:t>
+            </a:r>
+          </a:p>
+        </p:txBody>
+      </p:sp>
     </p:spTree>
     <p:extLst>
       <p:ext uri="{BB962C8B-B14F-4D97-AF65-F5344CB8AC3E}">
-        <p14:creationId xmlns:p14="http://schemas.microsoft.com/office/powerpoint/2010/main" val="4060776674"/>
+        <p14:creationId xmlns:p14="http://schemas.microsoft.com/office/powerpoint/2010/main" val="3426263962"/>
       </p:ext>
     </p:extLst>
   </p:cSld>
@@ -24029,7 +24370,7 @@
                 <a:cs typeface="Times New Roman"/>
                 <a:sym typeface="Times New Roman"/>
               </a:rPr>
-              <a:t>Model Comparison</a:t>
+              <a:t>Model Comparison – Actual vs Predicted</a:t>
             </a:r>
           </a:p>
         </p:txBody>
@@ -24308,10 +24649,46 @@
           </p:spPr>
         </p:sp>
       </p:grpSp>
+      <p:pic>
+        <p:nvPicPr>
+          <p:cNvPr id="13" name="Picture 12">
+            <a:extLst>
+              <a:ext uri="{FF2B5EF4-FFF2-40B4-BE49-F238E27FC236}">
+                <a16:creationId xmlns:a16="http://schemas.microsoft.com/office/drawing/2014/main" id="{CFE1C020-3E64-3BAE-088F-FE2CDAC0C07B}"/>
+              </a:ext>
+            </a:extLst>
+          </p:cNvPr>
+          <p:cNvPicPr>
+            <a:picLocks noChangeAspect="1"/>
+          </p:cNvPicPr>
+          <p:nvPr/>
+        </p:nvPicPr>
+        <p:blipFill>
+          <a:blip r:embed="rId3">
+            <a:extLst>
+              <a:ext uri="{28A0092B-C50C-407E-A947-70E740481C1C}">
+                <a14:useLocalDpi xmlns:a14="http://schemas.microsoft.com/office/drawing/2010/main" val="0"/>
+              </a:ext>
+            </a:extLst>
+          </a:blip>
+          <a:stretch>
+            <a:fillRect/>
+          </a:stretch>
+        </p:blipFill>
+        <p:spPr>
+          <a:xfrm>
+            <a:off x="1219200" y="2154421"/>
+            <a:ext cx="15468600" cy="7734300"/>
+          </a:xfrm>
+          <a:prstGeom prst="rect">
+            <a:avLst/>
+          </a:prstGeom>
+        </p:spPr>
+      </p:pic>
     </p:spTree>
     <p:extLst>
       <p:ext uri="{BB962C8B-B14F-4D97-AF65-F5344CB8AC3E}">
-        <p14:creationId xmlns:p14="http://schemas.microsoft.com/office/powerpoint/2010/main" val="3426263962"/>
+        <p14:creationId xmlns:p14="http://schemas.microsoft.com/office/powerpoint/2010/main" val="3510780241"/>
       </p:ext>
     </p:extLst>
   </p:cSld>
@@ -24338,6 +24715,42 @@
           <a:chExt cx="0" cy="0"/>
         </a:xfrm>
       </p:grpSpPr>
+      <p:pic>
+        <p:nvPicPr>
+          <p:cNvPr id="12" name="Picture 11">
+            <a:extLst>
+              <a:ext uri="{FF2B5EF4-FFF2-40B4-BE49-F238E27FC236}">
+                <a16:creationId xmlns:a16="http://schemas.microsoft.com/office/drawing/2014/main" id="{0F2C762C-ADEE-66F7-FB0D-AD31B9251A47}"/>
+              </a:ext>
+            </a:extLst>
+          </p:cNvPr>
+          <p:cNvPicPr>
+            <a:picLocks noChangeAspect="1"/>
+          </p:cNvPicPr>
+          <p:nvPr/>
+        </p:nvPicPr>
+        <p:blipFill>
+          <a:blip r:embed="rId3">
+            <a:extLst>
+              <a:ext uri="{28A0092B-C50C-407E-A947-70E740481C1C}">
+                <a14:useLocalDpi xmlns:a14="http://schemas.microsoft.com/office/drawing/2010/main" val="0"/>
+              </a:ext>
+            </a:extLst>
+          </a:blip>
+          <a:stretch>
+            <a:fillRect/>
+          </a:stretch>
+        </p:blipFill>
+        <p:spPr>
+          <a:xfrm>
+            <a:off x="304800" y="2110637"/>
+            <a:ext cx="17724931" cy="7385388"/>
+          </a:xfrm>
+          <a:prstGeom prst="rect">
+            <a:avLst/>
+          </a:prstGeom>
+        </p:spPr>
+      </p:pic>
       <p:sp>
         <p:nvSpPr>
           <p:cNvPr id="2" name="TextBox 2"/>
@@ -24374,7 +24787,7 @@
                 <a:cs typeface="Times New Roman"/>
                 <a:sym typeface="Times New Roman"/>
               </a:rPr>
-              <a:t>Model Comparison</a:t>
+              <a:t>Model Comparison – Metrics Comparison</a:t>
             </a:r>
           </a:p>
         </p:txBody>
@@ -24653,46 +25066,10 @@
           </p:spPr>
         </p:sp>
       </p:grpSp>
-      <p:pic>
-        <p:nvPicPr>
-          <p:cNvPr id="13" name="Picture 12">
-            <a:extLst>
-              <a:ext uri="{FF2B5EF4-FFF2-40B4-BE49-F238E27FC236}">
-                <a16:creationId xmlns:a16="http://schemas.microsoft.com/office/drawing/2014/main" id="{CFE1C020-3E64-3BAE-088F-FE2CDAC0C07B}"/>
-              </a:ext>
-            </a:extLst>
-          </p:cNvPr>
-          <p:cNvPicPr>
-            <a:picLocks noChangeAspect="1"/>
-          </p:cNvPicPr>
-          <p:nvPr/>
-        </p:nvPicPr>
-        <p:blipFill>
-          <a:blip r:embed="rId3">
-            <a:extLst>
-              <a:ext uri="{28A0092B-C50C-407E-A947-70E740481C1C}">
-                <a14:useLocalDpi xmlns:a14="http://schemas.microsoft.com/office/drawing/2010/main" val="0"/>
-              </a:ext>
-            </a:extLst>
-          </a:blip>
-          <a:stretch>
-            <a:fillRect/>
-          </a:stretch>
-        </p:blipFill>
-        <p:spPr>
-          <a:xfrm>
-            <a:off x="2057400" y="2324099"/>
-            <a:ext cx="14677454" cy="7338727"/>
-          </a:xfrm>
-          <a:prstGeom prst="rect">
-            <a:avLst/>
-          </a:prstGeom>
-        </p:spPr>
-      </p:pic>
     </p:spTree>
     <p:extLst>
       <p:ext uri="{BB962C8B-B14F-4D97-AF65-F5344CB8AC3E}">
-        <p14:creationId xmlns:p14="http://schemas.microsoft.com/office/powerpoint/2010/main" val="3510780241"/>
+        <p14:creationId xmlns:p14="http://schemas.microsoft.com/office/powerpoint/2010/main" val="3257773676"/>
       </p:ext>
     </p:extLst>
   </p:cSld>
@@ -24755,7 +25132,7 @@
                 <a:cs typeface="Times New Roman"/>
                 <a:sym typeface="Times New Roman"/>
               </a:rPr>
-              <a:t>Model Comparison</a:t>
+              <a:t>Model Comparison – Best performance</a:t>
             </a:r>
           </a:p>
         </p:txBody>
@@ -25036,387 +25413,6 @@
       </p:grpSp>
       <p:pic>
         <p:nvPicPr>
-          <p:cNvPr id="12" name="Picture 11">
-            <a:extLst>
-              <a:ext uri="{FF2B5EF4-FFF2-40B4-BE49-F238E27FC236}">
-                <a16:creationId xmlns:a16="http://schemas.microsoft.com/office/drawing/2014/main" id="{0F2C762C-ADEE-66F7-FB0D-AD31B9251A47}"/>
-              </a:ext>
-            </a:extLst>
-          </p:cNvPr>
-          <p:cNvPicPr>
-            <a:picLocks noChangeAspect="1"/>
-          </p:cNvPicPr>
-          <p:nvPr/>
-        </p:nvPicPr>
-        <p:blipFill>
-          <a:blip r:embed="rId3">
-            <a:extLst>
-              <a:ext uri="{28A0092B-C50C-407E-A947-70E740481C1C}">
-                <a14:useLocalDpi xmlns:a14="http://schemas.microsoft.com/office/drawing/2010/main" val="0"/>
-              </a:ext>
-            </a:extLst>
-          </a:blip>
-          <a:stretch>
-            <a:fillRect/>
-          </a:stretch>
-        </p:blipFill>
-        <p:spPr>
-          <a:xfrm>
-            <a:off x="509459" y="2295231"/>
-            <a:ext cx="17269082" cy="7195451"/>
-          </a:xfrm>
-          <a:prstGeom prst="rect">
-            <a:avLst/>
-          </a:prstGeom>
-        </p:spPr>
-      </p:pic>
-    </p:spTree>
-    <p:extLst>
-      <p:ext uri="{BB962C8B-B14F-4D97-AF65-F5344CB8AC3E}">
-        <p14:creationId xmlns:p14="http://schemas.microsoft.com/office/powerpoint/2010/main" val="3257773676"/>
-      </p:ext>
-    </p:extLst>
-  </p:cSld>
-  <p:clrMapOvr>
-    <a:masterClrMapping/>
-  </p:clrMapOvr>
-</p:sld>
-</file>
-
-<file path=ppt/slides/slide25.xml><?xml version="1.0" encoding="utf-8"?>
-<p:sld xmlns:a="http://schemas.openxmlformats.org/drawingml/2006/main" xmlns:r="http://schemas.openxmlformats.org/officeDocument/2006/relationships" xmlns:p="http://schemas.openxmlformats.org/presentationml/2006/main">
-  <p:cSld>
-    <p:spTree>
-      <p:nvGrpSpPr>
-        <p:cNvPr id="1" name=""/>
-        <p:cNvGrpSpPr/>
-        <p:nvPr/>
-      </p:nvGrpSpPr>
-      <p:grpSpPr>
-        <a:xfrm>
-          <a:off x="0" y="0"/>
-          <a:ext cx="0" cy="0"/>
-          <a:chOff x="0" y="0"/>
-          <a:chExt cx="0" cy="0"/>
-        </a:xfrm>
-      </p:grpSpPr>
-      <p:sp>
-        <p:nvSpPr>
-          <p:cNvPr id="2" name="TextBox 2"/>
-          <p:cNvSpPr txBox="1"/>
-          <p:nvPr/>
-        </p:nvSpPr>
-        <p:spPr>
-          <a:xfrm>
-            <a:off x="714825" y="790975"/>
-            <a:ext cx="16858350" cy="746615"/>
-          </a:xfrm>
-          <a:prstGeom prst="rect">
-            <a:avLst/>
-          </a:prstGeom>
-        </p:spPr>
-        <p:txBody>
-          <a:bodyPr lIns="0" tIns="0" rIns="0" bIns="0" rtlCol="0" anchor="t">
-            <a:spAutoFit/>
-          </a:bodyPr>
-          <a:lstStyle/>
-          <a:p>
-            <a:pPr algn="l">
-              <a:lnSpc>
-                <a:spcPts val="6220"/>
-              </a:lnSpc>
-            </a:pPr>
-            <a:r>
-              <a:rPr lang="en-US" sz="5000" dirty="0">
-                <a:solidFill>
-                  <a:srgbClr val="FF0000"/>
-                </a:solidFill>
-                <a:latin typeface="Times New Roman"/>
-                <a:ea typeface="Times New Roman"/>
-                <a:cs typeface="Times New Roman"/>
-                <a:sym typeface="Times New Roman"/>
-              </a:rPr>
-              <a:t>Model Comparison</a:t>
-            </a:r>
-          </a:p>
-        </p:txBody>
-      </p:sp>
-      <p:grpSp>
-        <p:nvGrpSpPr>
-          <p:cNvPr id="4" name="Group 4"/>
-          <p:cNvGrpSpPr/>
-          <p:nvPr/>
-        </p:nvGrpSpPr>
-        <p:grpSpPr>
-          <a:xfrm>
-            <a:off x="647625" y="2012475"/>
-            <a:ext cx="17026650" cy="52650"/>
-            <a:chOff x="0" y="0"/>
-            <a:chExt cx="22702200" cy="70200"/>
-          </a:xfrm>
-        </p:grpSpPr>
-        <p:sp>
-          <p:nvSpPr>
-            <p:cNvPr id="5" name="Freeform 5"/>
-            <p:cNvSpPr/>
-            <p:nvPr/>
-          </p:nvSpPr>
-          <p:spPr>
-            <a:xfrm>
-              <a:off x="12700" y="12700"/>
-              <a:ext cx="22676738" cy="44831"/>
-            </a:xfrm>
-            <a:custGeom>
-              <a:avLst/>
-              <a:gdLst/>
-              <a:ahLst/>
-              <a:cxnLst/>
-              <a:rect l="l" t="t" r="r" b="b"/>
-              <a:pathLst>
-                <a:path w="22676738" h="44831">
-                  <a:moveTo>
-                    <a:pt x="0" y="0"/>
-                  </a:moveTo>
-                  <a:lnTo>
-                    <a:pt x="22676738" y="0"/>
-                  </a:lnTo>
-                  <a:lnTo>
-                    <a:pt x="22676738" y="44831"/>
-                  </a:lnTo>
-                  <a:lnTo>
-                    <a:pt x="0" y="44831"/>
-                  </a:lnTo>
-                  <a:close/>
-                </a:path>
-              </a:pathLst>
-            </a:custGeom>
-            <a:solidFill>
-              <a:srgbClr val="000000"/>
-            </a:solidFill>
-          </p:spPr>
-        </p:sp>
-        <p:sp>
-          <p:nvSpPr>
-            <p:cNvPr id="6" name="Freeform 6"/>
-            <p:cNvSpPr/>
-            <p:nvPr/>
-          </p:nvSpPr>
-          <p:spPr>
-            <a:xfrm>
-              <a:off x="0" y="0"/>
-              <a:ext cx="22702138" cy="70231"/>
-            </a:xfrm>
-            <a:custGeom>
-              <a:avLst/>
-              <a:gdLst/>
-              <a:ahLst/>
-              <a:cxnLst/>
-              <a:rect l="l" t="t" r="r" b="b"/>
-              <a:pathLst>
-                <a:path w="22702138" h="70231">
-                  <a:moveTo>
-                    <a:pt x="12700" y="0"/>
-                  </a:moveTo>
-                  <a:lnTo>
-                    <a:pt x="22689438" y="0"/>
-                  </a:lnTo>
-                  <a:cubicBezTo>
-                    <a:pt x="22696424" y="0"/>
-                    <a:pt x="22702138" y="5715"/>
-                    <a:pt x="22702138" y="12700"/>
-                  </a:cubicBezTo>
-                  <a:lnTo>
-                    <a:pt x="22702138" y="57531"/>
-                  </a:lnTo>
-                  <a:cubicBezTo>
-                    <a:pt x="22702138" y="64516"/>
-                    <a:pt x="22696424" y="70231"/>
-                    <a:pt x="22689438" y="70231"/>
-                  </a:cubicBezTo>
-                  <a:lnTo>
-                    <a:pt x="12700" y="70231"/>
-                  </a:lnTo>
-                  <a:cubicBezTo>
-                    <a:pt x="5715" y="70231"/>
-                    <a:pt x="0" y="64516"/>
-                    <a:pt x="0" y="57531"/>
-                  </a:cubicBezTo>
-                  <a:lnTo>
-                    <a:pt x="0" y="12700"/>
-                  </a:lnTo>
-                  <a:cubicBezTo>
-                    <a:pt x="0" y="5715"/>
-                    <a:pt x="5715" y="0"/>
-                    <a:pt x="12700" y="0"/>
-                  </a:cubicBezTo>
-                  <a:moveTo>
-                    <a:pt x="12700" y="25400"/>
-                  </a:moveTo>
-                  <a:lnTo>
-                    <a:pt x="12700" y="12700"/>
-                  </a:lnTo>
-                  <a:lnTo>
-                    <a:pt x="25400" y="12700"/>
-                  </a:lnTo>
-                  <a:lnTo>
-                    <a:pt x="25400" y="57531"/>
-                  </a:lnTo>
-                  <a:lnTo>
-                    <a:pt x="12700" y="57531"/>
-                  </a:lnTo>
-                  <a:lnTo>
-                    <a:pt x="12700" y="44831"/>
-                  </a:lnTo>
-                  <a:lnTo>
-                    <a:pt x="22689438" y="44831"/>
-                  </a:lnTo>
-                  <a:lnTo>
-                    <a:pt x="22689438" y="57531"/>
-                  </a:lnTo>
-                  <a:lnTo>
-                    <a:pt x="22676738" y="57531"/>
-                  </a:lnTo>
-                  <a:lnTo>
-                    <a:pt x="22676738" y="12700"/>
-                  </a:lnTo>
-                  <a:lnTo>
-                    <a:pt x="22689438" y="12700"/>
-                  </a:lnTo>
-                  <a:lnTo>
-                    <a:pt x="22689438" y="25400"/>
-                  </a:lnTo>
-                  <a:lnTo>
-                    <a:pt x="12700" y="25400"/>
-                  </a:lnTo>
-                  <a:close/>
-                </a:path>
-              </a:pathLst>
-            </a:custGeom>
-            <a:solidFill>
-              <a:srgbClr val="595959"/>
-            </a:solidFill>
-          </p:spPr>
-        </p:sp>
-      </p:grpSp>
-      <p:grpSp>
-        <p:nvGrpSpPr>
-          <p:cNvPr id="8" name="Group 8"/>
-          <p:cNvGrpSpPr/>
-          <p:nvPr/>
-        </p:nvGrpSpPr>
-        <p:grpSpPr>
-          <a:xfrm>
-            <a:off x="295499" y="284250"/>
-            <a:ext cx="17730900" cy="9718500"/>
-            <a:chOff x="0" y="0"/>
-            <a:chExt cx="23641200" cy="12958000"/>
-          </a:xfrm>
-        </p:grpSpPr>
-        <p:sp>
-          <p:nvSpPr>
-            <p:cNvPr id="9" name="Freeform 9"/>
-            <p:cNvSpPr/>
-            <p:nvPr/>
-          </p:nvSpPr>
-          <p:spPr>
-            <a:xfrm>
-              <a:off x="0" y="0"/>
-              <a:ext cx="23641177" cy="12957937"/>
-            </a:xfrm>
-            <a:custGeom>
-              <a:avLst/>
-              <a:gdLst/>
-              <a:ahLst/>
-              <a:cxnLst/>
-              <a:rect l="l" t="t" r="r" b="b"/>
-              <a:pathLst>
-                <a:path w="23641177" h="12957937">
-                  <a:moveTo>
-                    <a:pt x="25400" y="0"/>
-                  </a:moveTo>
-                  <a:lnTo>
-                    <a:pt x="23615777" y="0"/>
-                  </a:lnTo>
-                  <a:cubicBezTo>
-                    <a:pt x="23629747" y="0"/>
-                    <a:pt x="23641177" y="11430"/>
-                    <a:pt x="23641177" y="25400"/>
-                  </a:cubicBezTo>
-                  <a:lnTo>
-                    <a:pt x="23641177" y="12932537"/>
-                  </a:lnTo>
-                  <a:cubicBezTo>
-                    <a:pt x="23641177" y="12946507"/>
-                    <a:pt x="23629747" y="12957937"/>
-                    <a:pt x="23615777" y="12957937"/>
-                  </a:cubicBezTo>
-                  <a:lnTo>
-                    <a:pt x="25400" y="12957937"/>
-                  </a:lnTo>
-                  <a:cubicBezTo>
-                    <a:pt x="11430" y="12957937"/>
-                    <a:pt x="0" y="12946507"/>
-                    <a:pt x="0" y="12932537"/>
-                  </a:cubicBezTo>
-                  <a:lnTo>
-                    <a:pt x="0" y="25400"/>
-                  </a:lnTo>
-                  <a:cubicBezTo>
-                    <a:pt x="0" y="11430"/>
-                    <a:pt x="11430" y="0"/>
-                    <a:pt x="25400" y="0"/>
-                  </a:cubicBezTo>
-                  <a:moveTo>
-                    <a:pt x="25400" y="50800"/>
-                  </a:moveTo>
-                  <a:lnTo>
-                    <a:pt x="25400" y="25400"/>
-                  </a:lnTo>
-                  <a:lnTo>
-                    <a:pt x="50800" y="25400"/>
-                  </a:lnTo>
-                  <a:lnTo>
-                    <a:pt x="50800" y="12932537"/>
-                  </a:lnTo>
-                  <a:lnTo>
-                    <a:pt x="25400" y="12932537"/>
-                  </a:lnTo>
-                  <a:lnTo>
-                    <a:pt x="25400" y="12907137"/>
-                  </a:lnTo>
-                  <a:lnTo>
-                    <a:pt x="23615777" y="12907137"/>
-                  </a:lnTo>
-                  <a:lnTo>
-                    <a:pt x="23615777" y="12932537"/>
-                  </a:lnTo>
-                  <a:lnTo>
-                    <a:pt x="23590377" y="12932537"/>
-                  </a:lnTo>
-                  <a:lnTo>
-                    <a:pt x="23590377" y="25400"/>
-                  </a:lnTo>
-                  <a:lnTo>
-                    <a:pt x="23615777" y="25400"/>
-                  </a:lnTo>
-                  <a:lnTo>
-                    <a:pt x="23615777" y="50800"/>
-                  </a:lnTo>
-                  <a:lnTo>
-                    <a:pt x="25400" y="50800"/>
-                  </a:lnTo>
-                  <a:close/>
-                </a:path>
-              </a:pathLst>
-            </a:custGeom>
-            <a:solidFill>
-              <a:srgbClr val="000000"/>
-            </a:solidFill>
-          </p:spPr>
-        </p:sp>
-      </p:grpSp>
-      <p:pic>
-        <p:nvPicPr>
           <p:cNvPr id="7" name="Picture 6">
             <a:extLst>
               <a:ext uri="{FF2B5EF4-FFF2-40B4-BE49-F238E27FC236}">
@@ -25443,8 +25439,8 @@
         </p:blipFill>
         <p:spPr>
           <a:xfrm>
-            <a:off x="2971800" y="2857500"/>
-            <a:ext cx="11966412" cy="6248400"/>
+            <a:off x="2362200" y="2310819"/>
+            <a:ext cx="13743456" cy="7176304"/>
           </a:xfrm>
           <a:prstGeom prst="rect">
             <a:avLst/>
@@ -25464,7 +25460,7 @@
 </p:sld>
 </file>
 
-<file path=ppt/slides/slide26.xml><?xml version="1.0" encoding="utf-8"?>
+<file path=ppt/slides/slide25.xml><?xml version="1.0" encoding="utf-8"?>
 <p:sld xmlns:a="http://schemas.openxmlformats.org/drawingml/2006/main" xmlns:r="http://schemas.openxmlformats.org/officeDocument/2006/relationships" xmlns:p="http://schemas.openxmlformats.org/presentationml/2006/main">
   <p:cSld>
     <p:spTree>
@@ -26427,7 +26423,7 @@
 </p:sld>
 </file>
 
-<file path=ppt/slides/slide27.xml><?xml version="1.0" encoding="utf-8"?>
+<file path=ppt/slides/slide26.xml><?xml version="1.0" encoding="utf-8"?>
 <p:sld xmlns:a="http://schemas.openxmlformats.org/drawingml/2006/main" xmlns:r="http://schemas.openxmlformats.org/officeDocument/2006/relationships" xmlns:p="http://schemas.openxmlformats.org/presentationml/2006/main">
   <p:cSld>
     <p:spTree>
@@ -26822,7 +26818,7 @@
 </p:sld>
 </file>
 
-<file path=ppt/slides/slide28.xml><?xml version="1.0" encoding="utf-8"?>
+<file path=ppt/slides/slide27.xml><?xml version="1.0" encoding="utf-8"?>
 <p:sld xmlns:a="http://schemas.openxmlformats.org/drawingml/2006/main" xmlns:r="http://schemas.openxmlformats.org/officeDocument/2006/relationships" xmlns:p="http://schemas.openxmlformats.org/presentationml/2006/main">
   <p:cSld>
     <p:spTree>
@@ -27229,7 +27225,7 @@
 </p:sld>
 </file>
 
-<file path=ppt/slides/slide29.xml><?xml version="1.0" encoding="utf-8"?>
+<file path=ppt/slides/slide28.xml><?xml version="1.0" encoding="utf-8"?>
 <p:sld xmlns:a="http://schemas.openxmlformats.org/drawingml/2006/main" xmlns:r="http://schemas.openxmlformats.org/officeDocument/2006/relationships" xmlns:p="http://schemas.openxmlformats.org/presentationml/2006/main">
   <p:cSld>
     <p:spTree>
@@ -27960,7 +27956,7 @@
           <p:nvPr>
             <p:extLst>
               <p:ext uri="{D42A27DB-BD31-4B8C-83A1-F6EECF244321}">
-                <p14:modId xmlns:p14="http://schemas.microsoft.com/office/powerpoint/2010/main" val="1135115964"/>
+                <p14:modId xmlns:p14="http://schemas.microsoft.com/office/powerpoint/2010/main" val="3296685255"/>
               </p:ext>
             </p:extLst>
           </p:nvPr>
@@ -28597,6 +28593,18 @@
                         <a:defRPr/>
                       </a:pPr>
                       <a:r>
+                        <a:rPr lang="en-US" sz="2200" dirty="0">
+                          <a:solidFill>
+                            <a:srgbClr val="000000"/>
+                          </a:solidFill>
+                          <a:latin typeface="Times New Roman"/>
+                          <a:ea typeface="Times New Roman"/>
+                          <a:cs typeface="Times New Roman"/>
+                          <a:sym typeface="Times New Roman"/>
+                        </a:rPr>
+                        <a:t>This paper introduces an SLSTM model for predicting 5G network traffic, which adapts its </a:t>
+                      </a:r>
+                      <a:r>
                         <a:rPr lang="en-US" sz="2200">
                           <a:solidFill>
                             <a:srgbClr val="000000"/>
@@ -28606,9 +28614,21 @@
                           <a:cs typeface="Times New Roman"/>
                           <a:sym typeface="Times New Roman"/>
                         </a:rPr>
-                        <a:t>This paper introduces an SLSTM model for predicting 5G network traffic, which adapts its complexity dynamically and stabilizes output sequences, showing significant improvements over traditional methods.</a:t>
+                        <a:t>complexity and </a:t>
                       </a:r>
-                      <a:endParaRPr lang="en-US" sz="1100"/>
+                      <a:r>
+                        <a:rPr lang="en-US" sz="2200" dirty="0">
+                          <a:solidFill>
+                            <a:srgbClr val="000000"/>
+                          </a:solidFill>
+                          <a:latin typeface="Times New Roman"/>
+                          <a:ea typeface="Times New Roman"/>
+                          <a:cs typeface="Times New Roman"/>
+                          <a:sym typeface="Times New Roman"/>
+                        </a:rPr>
+                        <a:t>stabilizes output sequences, showing significant improvements over traditional methods.</a:t>
+                      </a:r>
+                      <a:endParaRPr lang="en-US" sz="1100" dirty="0"/>
                     </a:p>
                   </a:txBody>
                   <a:tcPr marL="91426" marR="91426" marT="91426" marB="91426" anchor="ctr">

</xml_diff>

<commit_message>
change augmentation and added gan as combined dataset
</commit_message>
<xml_diff>
--- a/Batch_4 IT-G2.pptx
+++ b/Batch_4 IT-G2.pptx
@@ -5,7 +5,7 @@
     <p:sldMasterId id="2147483648" r:id="rId1"/>
   </p:sldMasterIdLst>
   <p:notesMasterIdLst>
-    <p:notesMasterId r:id="rId30"/>
+    <p:notesMasterId r:id="rId31"/>
   </p:notesMasterIdLst>
   <p:sldIdLst>
     <p:sldId id="256" r:id="rId2"/>
@@ -32,22 +32,23 @@
     <p:sldId id="283" r:id="rId23"/>
     <p:sldId id="284" r:id="rId24"/>
     <p:sldId id="285" r:id="rId25"/>
-    <p:sldId id="269" r:id="rId26"/>
-    <p:sldId id="270" r:id="rId27"/>
-    <p:sldId id="271" r:id="rId28"/>
-    <p:sldId id="272" r:id="rId29"/>
+    <p:sldId id="286" r:id="rId26"/>
+    <p:sldId id="269" r:id="rId27"/>
+    <p:sldId id="270" r:id="rId28"/>
+    <p:sldId id="271" r:id="rId29"/>
+    <p:sldId id="272" r:id="rId30"/>
   </p:sldIdLst>
   <p:sldSz cx="18288000" cy="10287000"/>
   <p:notesSz cx="6858000" cy="9144000"/>
   <p:embeddedFontLst>
     <p:embeddedFont>
       <p:font typeface="Times New Roman Bold" panose="02020803070505020304" pitchFamily="18" charset="0"/>
-      <p:regular r:id="rId31"/>
-      <p:bold r:id="rId32"/>
+      <p:regular r:id="rId32"/>
+      <p:bold r:id="rId33"/>
     </p:embeddedFont>
     <p:embeddedFont>
       <p:font typeface="Times New Roman Italics" panose="020B0604020202020204" charset="0"/>
-      <p:regular r:id="rId33"/>
+      <p:regular r:id="rId34"/>
     </p:embeddedFont>
   </p:embeddedFontLst>
   <p:defaultTextStyle>
@@ -167,7 +168,7 @@
 <file path=ppt/revisionInfo.xml><?xml version="1.0" encoding="utf-8"?>
 <p1510:revInfo xmlns:a="http://schemas.openxmlformats.org/drawingml/2006/main" xmlns:r="http://schemas.openxmlformats.org/officeDocument/2006/relationships" xmlns:p1510="http://schemas.microsoft.com/office/powerpoint/2015/10/main">
   <p1510:revLst>
-    <p1510:client id="{70A2666E-DFD6-444A-A910-CE2623165711}" v="46" dt="2024-08-06T15:09:54.778"/>
+    <p1510:client id="{70A2666E-DFD6-444A-A910-CE2623165711}" v="47" dt="2024-08-07T17:34:31.083"/>
   </p1510:revLst>
 </p1510:revInfo>
 </file>
@@ -177,7 +178,7 @@
   <pc:docChgLst>
     <pc:chgData name="Prithiv Vijai" userId="5d24f1427401153b" providerId="LiveId" clId="{70A2666E-DFD6-444A-A910-CE2623165711}"/>
     <pc:docChg chg="undo custSel addSld delSld modSld">
-      <pc:chgData name="Prithiv Vijai" userId="5d24f1427401153b" providerId="LiveId" clId="{70A2666E-DFD6-444A-A910-CE2623165711}" dt="2024-08-06T15:15:38.389" v="2434" actId="20577"/>
+      <pc:chgData name="Prithiv Vijai" userId="5d24f1427401153b" providerId="LiveId" clId="{70A2666E-DFD6-444A-A910-CE2623165711}" dt="2024-08-07T17:37:43.542" v="2960" actId="5793"/>
       <pc:docMkLst>
         <pc:docMk/>
       </pc:docMkLst>
@@ -580,7 +581,7 @@
         </pc:picChg>
       </pc:sldChg>
       <pc:sldChg chg="addSp delSp modSp add mod">
-        <pc:chgData name="Prithiv Vijai" userId="5d24f1427401153b" providerId="LiveId" clId="{70A2666E-DFD6-444A-A910-CE2623165711}" dt="2024-08-06T15:00:37.595" v="2338" actId="478"/>
+        <pc:chgData name="Prithiv Vijai" userId="5d24f1427401153b" providerId="LiveId" clId="{70A2666E-DFD6-444A-A910-CE2623165711}" dt="2024-08-07T17:37:43.542" v="2960" actId="5793"/>
         <pc:sldMkLst>
           <pc:docMk/>
           <pc:sldMk cId="1962121734" sldId="278"/>
@@ -599,6 +600,14 @@
             <pc:docMk/>
             <pc:sldMk cId="1962121734" sldId="278"/>
             <ac:spMk id="3" creationId="{90C10FBA-7DEE-82C5-FAE2-F328E9937335}"/>
+          </ac:spMkLst>
+        </pc:spChg>
+        <pc:spChg chg="add mod">
+          <ac:chgData name="Prithiv Vijai" userId="5d24f1427401153b" providerId="LiveId" clId="{70A2666E-DFD6-444A-A910-CE2623165711}" dt="2024-08-07T17:37:43.542" v="2960" actId="5793"/>
+          <ac:spMkLst>
+            <pc:docMk/>
+            <pc:sldMk cId="1962121734" sldId="278"/>
+            <ac:spMk id="3" creationId="{C2931E5B-8253-01B5-6BC3-DEC92A6DD2CE}"/>
           </ac:spMkLst>
         </pc:spChg>
         <pc:graphicFrameChg chg="del">
@@ -1141,6 +1150,29 @@
           </ac:picMkLst>
         </pc:picChg>
       </pc:sldChg>
+      <pc:sldChg chg="delSp modSp add mod">
+        <pc:chgData name="Prithiv Vijai" userId="5d24f1427401153b" providerId="LiveId" clId="{70A2666E-DFD6-444A-A910-CE2623165711}" dt="2024-08-07T17:33:27.536" v="2447" actId="20577"/>
+        <pc:sldMkLst>
+          <pc:docMk/>
+          <pc:sldMk cId="321612107" sldId="286"/>
+        </pc:sldMkLst>
+        <pc:spChg chg="mod">
+          <ac:chgData name="Prithiv Vijai" userId="5d24f1427401153b" providerId="LiveId" clId="{70A2666E-DFD6-444A-A910-CE2623165711}" dt="2024-08-07T17:33:27.536" v="2447" actId="20577"/>
+          <ac:spMkLst>
+            <pc:docMk/>
+            <pc:sldMk cId="321612107" sldId="286"/>
+            <ac:spMk id="2" creationId="{00000000-0000-0000-0000-000000000000}"/>
+          </ac:spMkLst>
+        </pc:spChg>
+        <pc:picChg chg="del">
+          <ac:chgData name="Prithiv Vijai" userId="5d24f1427401153b" providerId="LiveId" clId="{70A2666E-DFD6-444A-A910-CE2623165711}" dt="2024-08-07T14:55:49.337" v="2436" actId="478"/>
+          <ac:picMkLst>
+            <pc:docMk/>
+            <pc:sldMk cId="321612107" sldId="286"/>
+            <ac:picMk id="7" creationId="{BD92570C-D608-E3CB-9834-22B25AE17F18}"/>
+          </ac:picMkLst>
+        </pc:picChg>
+      </pc:sldChg>
     </pc:docChg>
   </pc:docChgLst>
 </pc:chgInfo>
@@ -5419,6 +5451,11 @@
         </p:txBody>
       </p:sp>
     </p:spTree>
+    <p:extLst>
+      <p:ext uri="{BB962C8B-B14F-4D97-AF65-F5344CB8AC3E}">
+        <p14:creationId xmlns:p14="http://schemas.microsoft.com/office/powerpoint/2010/main" val="1746343275"/>
+      </p:ext>
+    </p:extLst>
   </p:cSld>
   <p:clrMapOvr>
     <a:masterClrMapping/>
@@ -5520,8 +5557,8 @@
         </p:nvSpPr>
         <p:spPr>
           <a:xfrm>
-            <a:off x="2857500" y="512763"/>
-            <a:ext cx="3429000" cy="2566987"/>
+            <a:off x="2290763" y="512763"/>
+            <a:ext cx="4562475" cy="2566987"/>
           </a:xfrm>
           <a:prstGeom prst="rect">
             <a:avLst/>
@@ -5857,6 +5894,221 @@
 </file>
 
 <file path=ppt/notesSlides/notesSlide28.xml><?xml version="1.0" encoding="utf-8"?>
+<p:notes xmlns:a="http://schemas.openxmlformats.org/drawingml/2006/main" xmlns:r="http://schemas.openxmlformats.org/officeDocument/2006/relationships" xmlns:p="http://schemas.openxmlformats.org/presentationml/2006/main">
+  <p:cSld>
+    <p:spTree>
+      <p:nvGrpSpPr>
+        <p:cNvPr id="1" name=""/>
+        <p:cNvGrpSpPr/>
+        <p:nvPr/>
+      </p:nvGrpSpPr>
+      <p:grpSpPr>
+        <a:xfrm>
+          <a:off x="0" y="0"/>
+          <a:ext cx="0" cy="0"/>
+          <a:chOff x="0" y="0"/>
+          <a:chExt cx="0" cy="0"/>
+        </a:xfrm>
+      </p:grpSpPr>
+      <p:sp>
+        <p:nvSpPr>
+          <p:cNvPr id="2" name="Header Placeholder 1"/>
+          <p:cNvSpPr>
+            <a:spLocks noGrp="1"/>
+          </p:cNvSpPr>
+          <p:nvPr>
+            <p:ph type="hdr" sz="quarter"/>
+          </p:nvPr>
+        </p:nvSpPr>
+        <p:spPr>
+          <a:xfrm>
+            <a:off x="0" y="0"/>
+            <a:ext cx="3962400" cy="342900"/>
+          </a:xfrm>
+          <a:prstGeom prst="rect">
+            <a:avLst/>
+          </a:prstGeom>
+        </p:spPr>
+        <p:txBody>
+          <a:bodyPr vert="horz" lIns="91440" tIns="45720" rIns="91440" bIns="45720" rtlCol="0"/>
+          <a:lstStyle>
+            <a:lvl1pPr algn="l">
+              <a:defRPr sz="1200"/>
+            </a:lvl1pPr>
+          </a:lstStyle>
+          <a:p>
+            <a:endParaRPr/>
+          </a:p>
+        </p:txBody>
+      </p:sp>
+      <p:sp>
+        <p:nvSpPr>
+          <p:cNvPr id="3" name="Date Placeholder 2"/>
+          <p:cNvSpPr>
+            <a:spLocks noGrp="1"/>
+          </p:cNvSpPr>
+          <p:nvPr>
+            <p:ph type="dt" idx="1"/>
+          </p:nvPr>
+        </p:nvSpPr>
+        <p:spPr>
+          <a:xfrm>
+            <a:off x="5180013" y="0"/>
+            <a:ext cx="3962400" cy="342900"/>
+          </a:xfrm>
+          <a:prstGeom prst="rect">
+            <a:avLst/>
+          </a:prstGeom>
+        </p:spPr>
+        <p:txBody>
+          <a:bodyPr vert="horz" lIns="91440" tIns="45720" rIns="91440" bIns="45720" rtlCol="0"/>
+          <a:lstStyle>
+            <a:lvl1pPr algn="r">
+              <a:defRPr sz="1200"/>
+            </a:lvl1pPr>
+          </a:lstStyle>
+          <a:p>
+            <a:r>
+              <a:rPr lang="cs-CZ"/>
+              <a:t>1.7.2013</a:t>
+            </a:r>
+          </a:p>
+        </p:txBody>
+      </p:sp>
+      <p:sp>
+        <p:nvSpPr>
+          <p:cNvPr id="4" name="Slide Image Placeholder 3"/>
+          <p:cNvSpPr>
+            <a:spLocks noGrp="1" noRot="1" noChangeAspect="1"/>
+          </p:cNvSpPr>
+          <p:nvPr>
+            <p:ph type="sldImg" idx="2"/>
+          </p:nvPr>
+        </p:nvSpPr>
+        <p:spPr>
+          <a:xfrm>
+            <a:off x="2857500" y="512763"/>
+            <a:ext cx="3429000" cy="2566987"/>
+          </a:xfrm>
+          <a:prstGeom prst="rect">
+            <a:avLst/>
+          </a:prstGeom>
+          <a:noFill/>
+          <a:ln w="12700">
+            <a:solidFill>
+              <a:prstClr val="black"/>
+            </a:solidFill>
+          </a:ln>
+        </p:spPr>
+        <p:txBody>
+          <a:bodyPr vert="horz" lIns="91440" tIns="45720" rIns="91440" bIns="45720" rtlCol="0" anchor="ctr"/>
+          <a:lstStyle/>
+          <a:p>
+            <a:endParaRPr/>
+          </a:p>
+        </p:txBody>
+      </p:sp>
+      <p:sp>
+        <p:nvSpPr>
+          <p:cNvPr id="5" name="Notes Placeholder 4"/>
+          <p:cNvSpPr>
+            <a:spLocks noGrp="1"/>
+          </p:cNvSpPr>
+          <p:nvPr>
+            <p:ph type="body" sz="quarter" idx="3"/>
+          </p:nvPr>
+        </p:nvSpPr>
+        <p:spPr>
+          <a:xfrm>
+            <a:off x="914400" y="3251200"/>
+            <a:ext cx="7315200" cy="3081338"/>
+          </a:xfrm>
+          <a:prstGeom prst="rect">
+            <a:avLst/>
+          </a:prstGeom>
+        </p:spPr>
+        <p:txBody>
+          <a:bodyPr vert="horz" lIns="91440" tIns="45720" rIns="91440" bIns="45720" rtlCol="0"/>
+          <a:lstStyle/>
+          <a:p>
+            <a:endParaRPr lang="en-US"/>
+          </a:p>
+        </p:txBody>
+      </p:sp>
+      <p:sp>
+        <p:nvSpPr>
+          <p:cNvPr id="6" name="Footer Placeholder 5"/>
+          <p:cNvSpPr>
+            <a:spLocks noGrp="1"/>
+          </p:cNvSpPr>
+          <p:nvPr>
+            <p:ph type="ftr" sz="quarter" idx="4"/>
+          </p:nvPr>
+        </p:nvSpPr>
+        <p:spPr>
+          <a:xfrm>
+            <a:off x="0" y="6502400"/>
+            <a:ext cx="3962400" cy="341313"/>
+          </a:xfrm>
+          <a:prstGeom prst="rect">
+            <a:avLst/>
+          </a:prstGeom>
+        </p:spPr>
+        <p:txBody>
+          <a:bodyPr vert="horz" lIns="91440" tIns="45720" rIns="91440" bIns="45720" rtlCol="0" anchor="b"/>
+          <a:lstStyle>
+            <a:lvl1pPr algn="l">
+              <a:defRPr sz="1200"/>
+            </a:lvl1pPr>
+          </a:lstStyle>
+          <a:p>
+            <a:endParaRPr/>
+          </a:p>
+        </p:txBody>
+      </p:sp>
+      <p:sp>
+        <p:nvSpPr>
+          <p:cNvPr id="7" name="Slide Number Placeholder 6"/>
+          <p:cNvSpPr>
+            <a:spLocks noGrp="1"/>
+          </p:cNvSpPr>
+          <p:nvPr>
+            <p:ph type="sldNum" sz="quarter" idx="5"/>
+          </p:nvPr>
+        </p:nvSpPr>
+        <p:spPr>
+          <a:xfrm>
+            <a:off x="5180013" y="6502400"/>
+            <a:ext cx="3962400" cy="341313"/>
+          </a:xfrm>
+          <a:prstGeom prst="rect">
+            <a:avLst/>
+          </a:prstGeom>
+        </p:spPr>
+        <p:txBody>
+          <a:bodyPr vert="horz" lIns="91440" tIns="45720" rIns="91440" bIns="45720" rtlCol="0" anchor="b"/>
+          <a:lstStyle>
+            <a:lvl1pPr algn="r">
+              <a:defRPr sz="1200"/>
+            </a:lvl1pPr>
+          </a:lstStyle>
+          <a:p>
+            <a:r>
+              <a:rPr lang="cs-CZ"/>
+              <a:t>‹#›</a:t>
+            </a:r>
+          </a:p>
+        </p:txBody>
+      </p:sp>
+    </p:spTree>
+  </p:cSld>
+  <p:clrMapOvr>
+    <a:masterClrMapping/>
+  </p:clrMapOvr>
+</p:notes>
+</file>
+
+<file path=ppt/notesSlides/notesSlide29.xml><?xml version="1.0" encoding="utf-8"?>
 <p:notes xmlns:a="http://schemas.openxmlformats.org/drawingml/2006/main" xmlns:r="http://schemas.openxmlformats.org/officeDocument/2006/relationships" xmlns:p="http://schemas.openxmlformats.org/presentationml/2006/main">
   <p:cSld>
     <p:spTree>
@@ -22018,6 +22270,231 @@
           </p:spPr>
         </p:sp>
       </p:grpSp>
+      <p:sp>
+        <p:nvSpPr>
+          <p:cNvPr id="3" name="TextBox 7">
+            <a:extLst>
+              <a:ext uri="{FF2B5EF4-FFF2-40B4-BE49-F238E27FC236}">
+                <a16:creationId xmlns:a16="http://schemas.microsoft.com/office/drawing/2014/main" id="{C2931E5B-8253-01B5-6BC3-DEC92A6DD2CE}"/>
+              </a:ext>
+            </a:extLst>
+          </p:cNvPr>
+          <p:cNvSpPr txBox="1"/>
+          <p:nvPr/>
+        </p:nvSpPr>
+        <p:spPr>
+          <a:xfrm>
+            <a:off x="647624" y="3009900"/>
+            <a:ext cx="12306375" cy="5093189"/>
+          </a:xfrm>
+          <a:prstGeom prst="rect">
+            <a:avLst/>
+          </a:prstGeom>
+        </p:spPr>
+        <p:txBody>
+          <a:bodyPr wrap="square" lIns="0" tIns="0" rIns="0" bIns="0" rtlCol="0" anchor="t">
+            <a:spAutoFit/>
+          </a:bodyPr>
+          <a:lstStyle/>
+          <a:p>
+            <a:pPr marL="712470" lvl="1" indent="-356235" algn="l">
+              <a:lnSpc>
+                <a:spcPct val="150000"/>
+              </a:lnSpc>
+              <a:buFont typeface="Arial"/>
+              <a:buChar char="•"/>
+            </a:pPr>
+            <a:r>
+              <a:rPr lang="en-US" sz="2800" dirty="0" err="1">
+                <a:solidFill>
+                  <a:srgbClr val="000000"/>
+                </a:solidFill>
+                <a:latin typeface="Times New Roman"/>
+                <a:ea typeface="Times New Roman"/>
+                <a:cs typeface="Times New Roman"/>
+                <a:sym typeface="Times New Roman"/>
+              </a:rPr>
+              <a:t>Augmeneted</a:t>
+            </a:r>
+            <a:r>
+              <a:rPr lang="en-US" sz="2800" dirty="0">
+                <a:solidFill>
+                  <a:srgbClr val="000000"/>
+                </a:solidFill>
+                <a:latin typeface="Times New Roman"/>
+                <a:ea typeface="Times New Roman"/>
+                <a:cs typeface="Times New Roman"/>
+                <a:sym typeface="Times New Roman"/>
+              </a:rPr>
+              <a:t> 400 records to 16000 records</a:t>
+            </a:r>
+          </a:p>
+          <a:p>
+            <a:pPr marL="712470" lvl="1" indent="-356235" algn="l">
+              <a:lnSpc>
+                <a:spcPct val="150000"/>
+              </a:lnSpc>
+              <a:buFont typeface="Arial"/>
+              <a:buChar char="•"/>
+            </a:pPr>
+            <a:r>
+              <a:rPr lang="en-US" sz="2800" dirty="0">
+                <a:solidFill>
+                  <a:srgbClr val="000000"/>
+                </a:solidFill>
+                <a:latin typeface="Times New Roman"/>
+                <a:ea typeface="Times New Roman"/>
+                <a:cs typeface="Times New Roman"/>
+                <a:sym typeface="Times New Roman"/>
+              </a:rPr>
+              <a:t>Ensured equal distribution of data across each </a:t>
+            </a:r>
+            <a:r>
+              <a:rPr lang="en-US" sz="2800" dirty="0" err="1">
+                <a:solidFill>
+                  <a:srgbClr val="000000"/>
+                </a:solidFill>
+                <a:latin typeface="Times New Roman"/>
+                <a:ea typeface="Times New Roman"/>
+                <a:cs typeface="Times New Roman"/>
+                <a:sym typeface="Times New Roman"/>
+              </a:rPr>
+              <a:t>application_type</a:t>
+            </a:r>
+            <a:r>
+              <a:rPr lang="en-US" sz="2800" dirty="0">
+                <a:solidFill>
+                  <a:srgbClr val="000000"/>
+                </a:solidFill>
+                <a:latin typeface="Times New Roman"/>
+                <a:ea typeface="Times New Roman"/>
+                <a:cs typeface="Times New Roman"/>
+                <a:sym typeface="Times New Roman"/>
+              </a:rPr>
+              <a:t>.</a:t>
+            </a:r>
+          </a:p>
+          <a:p>
+            <a:pPr marL="712470" lvl="1" indent="-356235" algn="l">
+              <a:lnSpc>
+                <a:spcPct val="150000"/>
+              </a:lnSpc>
+              <a:buFont typeface="Arial"/>
+              <a:buChar char="•"/>
+            </a:pPr>
+            <a:r>
+              <a:rPr lang="en-US" sz="2800" dirty="0">
+                <a:solidFill>
+                  <a:srgbClr val="000000"/>
+                </a:solidFill>
+                <a:latin typeface="Times New Roman"/>
+                <a:ea typeface="Times New Roman"/>
+                <a:cs typeface="Times New Roman"/>
+                <a:sym typeface="Times New Roman"/>
+              </a:rPr>
+              <a:t>Compared the correlation difference for </a:t>
+            </a:r>
+            <a:r>
+              <a:rPr lang="en-US" sz="2800" dirty="0" err="1">
+                <a:solidFill>
+                  <a:srgbClr val="000000"/>
+                </a:solidFill>
+                <a:latin typeface="Times New Roman"/>
+                <a:ea typeface="Times New Roman"/>
+                <a:cs typeface="Times New Roman"/>
+                <a:sym typeface="Times New Roman"/>
+              </a:rPr>
+              <a:t>Gaussian_noise</a:t>
+            </a:r>
+            <a:r>
+              <a:rPr lang="en-US" sz="2800" dirty="0">
+                <a:solidFill>
+                  <a:srgbClr val="000000"/>
+                </a:solidFill>
+                <a:latin typeface="Times New Roman"/>
+                <a:ea typeface="Times New Roman"/>
+                <a:cs typeface="Times New Roman"/>
+                <a:sym typeface="Times New Roman"/>
+              </a:rPr>
+              <a:t> augmentation and GAN augmentation.</a:t>
+            </a:r>
+          </a:p>
+          <a:p>
+            <a:pPr marL="712470" lvl="1" indent="-356235" algn="l">
+              <a:lnSpc>
+                <a:spcPct val="150000"/>
+              </a:lnSpc>
+              <a:buFont typeface="Arial"/>
+              <a:buChar char="•"/>
+            </a:pPr>
+            <a:r>
+              <a:rPr lang="en-US" sz="2800" dirty="0">
+                <a:solidFill>
+                  <a:srgbClr val="000000"/>
+                </a:solidFill>
+                <a:latin typeface="Times New Roman"/>
+                <a:ea typeface="Times New Roman"/>
+                <a:cs typeface="Times New Roman"/>
+                <a:sym typeface="Times New Roman"/>
+              </a:rPr>
+              <a:t>Made sure the average values for each feature remained the same.</a:t>
+            </a:r>
+          </a:p>
+          <a:p>
+            <a:pPr marL="712470" lvl="1" indent="-356235" algn="l">
+              <a:lnSpc>
+                <a:spcPct val="150000"/>
+              </a:lnSpc>
+              <a:buFont typeface="Arial"/>
+              <a:buChar char="•"/>
+            </a:pPr>
+            <a:r>
+              <a:rPr lang="en-US" sz="2800" dirty="0">
+                <a:solidFill>
+                  <a:srgbClr val="000000"/>
+                </a:solidFill>
+                <a:latin typeface="Times New Roman"/>
+                <a:ea typeface="Times New Roman"/>
+                <a:cs typeface="Times New Roman"/>
+                <a:sym typeface="Times New Roman"/>
+              </a:rPr>
+              <a:t>Similar correlation was produced.</a:t>
+            </a:r>
+          </a:p>
+          <a:p>
+            <a:pPr marL="356235" lvl="1" algn="l">
+              <a:lnSpc>
+                <a:spcPct val="150000"/>
+              </a:lnSpc>
+            </a:pPr>
+            <a:endParaRPr lang="en-US" sz="2800" dirty="0">
+              <a:solidFill>
+                <a:srgbClr val="000000"/>
+              </a:solidFill>
+              <a:latin typeface="Times New Roman"/>
+              <a:ea typeface="Times New Roman"/>
+              <a:cs typeface="Times New Roman"/>
+              <a:sym typeface="Times New Roman"/>
+            </a:endParaRPr>
+          </a:p>
+          <a:p>
+            <a:pPr algn="ctr">
+              <a:lnSpc>
+                <a:spcPct val="150000"/>
+              </a:lnSpc>
+            </a:pPr>
+            <a:endParaRPr lang="en-US" sz="2800" dirty="0">
+              <a:solidFill>
+                <a:srgbClr val="000000"/>
+              </a:solidFill>
+              <a:latin typeface="Times New Roman"/>
+              <a:ea typeface="Times New Roman"/>
+              <a:cs typeface="Times New Roman"/>
+              <a:sym typeface="Times New Roman"/>
+            </a:endParaRPr>
+          </a:p>
+        </p:txBody>
+      </p:sp>
     </p:spTree>
     <p:extLst>
       <p:ext uri="{BB962C8B-B14F-4D97-AF65-F5344CB8AC3E}">
@@ -25485,6 +25962,351 @@
         </p:nvSpPr>
         <p:spPr>
           <a:xfrm>
+            <a:off x="714825" y="790975"/>
+            <a:ext cx="16858350" cy="746615"/>
+          </a:xfrm>
+          <a:prstGeom prst="rect">
+            <a:avLst/>
+          </a:prstGeom>
+        </p:spPr>
+        <p:txBody>
+          <a:bodyPr lIns="0" tIns="0" rIns="0" bIns="0" rtlCol="0" anchor="t">
+            <a:spAutoFit/>
+          </a:bodyPr>
+          <a:lstStyle/>
+          <a:p>
+            <a:pPr algn="l">
+              <a:lnSpc>
+                <a:spcPts val="6220"/>
+              </a:lnSpc>
+            </a:pPr>
+            <a:r>
+              <a:rPr lang="en-US" sz="5000" dirty="0">
+                <a:solidFill>
+                  <a:srgbClr val="FF0000"/>
+                </a:solidFill>
+                <a:latin typeface="Times New Roman"/>
+                <a:ea typeface="Times New Roman"/>
+                <a:cs typeface="Times New Roman"/>
+                <a:sym typeface="Times New Roman"/>
+              </a:rPr>
+              <a:t>Model Comparison – HGBRT</a:t>
+            </a:r>
+          </a:p>
+        </p:txBody>
+      </p:sp>
+      <p:grpSp>
+        <p:nvGrpSpPr>
+          <p:cNvPr id="4" name="Group 4"/>
+          <p:cNvGrpSpPr/>
+          <p:nvPr/>
+        </p:nvGrpSpPr>
+        <p:grpSpPr>
+          <a:xfrm>
+            <a:off x="647625" y="2012475"/>
+            <a:ext cx="17026650" cy="52650"/>
+            <a:chOff x="0" y="0"/>
+            <a:chExt cx="22702200" cy="70200"/>
+          </a:xfrm>
+        </p:grpSpPr>
+        <p:sp>
+          <p:nvSpPr>
+            <p:cNvPr id="5" name="Freeform 5"/>
+            <p:cNvSpPr/>
+            <p:nvPr/>
+          </p:nvSpPr>
+          <p:spPr>
+            <a:xfrm>
+              <a:off x="12700" y="12700"/>
+              <a:ext cx="22676738" cy="44831"/>
+            </a:xfrm>
+            <a:custGeom>
+              <a:avLst/>
+              <a:gdLst/>
+              <a:ahLst/>
+              <a:cxnLst/>
+              <a:rect l="l" t="t" r="r" b="b"/>
+              <a:pathLst>
+                <a:path w="22676738" h="44831">
+                  <a:moveTo>
+                    <a:pt x="0" y="0"/>
+                  </a:moveTo>
+                  <a:lnTo>
+                    <a:pt x="22676738" y="0"/>
+                  </a:lnTo>
+                  <a:lnTo>
+                    <a:pt x="22676738" y="44831"/>
+                  </a:lnTo>
+                  <a:lnTo>
+                    <a:pt x="0" y="44831"/>
+                  </a:lnTo>
+                  <a:close/>
+                </a:path>
+              </a:pathLst>
+            </a:custGeom>
+            <a:solidFill>
+              <a:srgbClr val="000000"/>
+            </a:solidFill>
+          </p:spPr>
+        </p:sp>
+        <p:sp>
+          <p:nvSpPr>
+            <p:cNvPr id="6" name="Freeform 6"/>
+            <p:cNvSpPr/>
+            <p:nvPr/>
+          </p:nvSpPr>
+          <p:spPr>
+            <a:xfrm>
+              <a:off x="0" y="0"/>
+              <a:ext cx="22702138" cy="70231"/>
+            </a:xfrm>
+            <a:custGeom>
+              <a:avLst/>
+              <a:gdLst/>
+              <a:ahLst/>
+              <a:cxnLst/>
+              <a:rect l="l" t="t" r="r" b="b"/>
+              <a:pathLst>
+                <a:path w="22702138" h="70231">
+                  <a:moveTo>
+                    <a:pt x="12700" y="0"/>
+                  </a:moveTo>
+                  <a:lnTo>
+                    <a:pt x="22689438" y="0"/>
+                  </a:lnTo>
+                  <a:cubicBezTo>
+                    <a:pt x="22696424" y="0"/>
+                    <a:pt x="22702138" y="5715"/>
+                    <a:pt x="22702138" y="12700"/>
+                  </a:cubicBezTo>
+                  <a:lnTo>
+                    <a:pt x="22702138" y="57531"/>
+                  </a:lnTo>
+                  <a:cubicBezTo>
+                    <a:pt x="22702138" y="64516"/>
+                    <a:pt x="22696424" y="70231"/>
+                    <a:pt x="22689438" y="70231"/>
+                  </a:cubicBezTo>
+                  <a:lnTo>
+                    <a:pt x="12700" y="70231"/>
+                  </a:lnTo>
+                  <a:cubicBezTo>
+                    <a:pt x="5715" y="70231"/>
+                    <a:pt x="0" y="64516"/>
+                    <a:pt x="0" y="57531"/>
+                  </a:cubicBezTo>
+                  <a:lnTo>
+                    <a:pt x="0" y="12700"/>
+                  </a:lnTo>
+                  <a:cubicBezTo>
+                    <a:pt x="0" y="5715"/>
+                    <a:pt x="5715" y="0"/>
+                    <a:pt x="12700" y="0"/>
+                  </a:cubicBezTo>
+                  <a:moveTo>
+                    <a:pt x="12700" y="25400"/>
+                  </a:moveTo>
+                  <a:lnTo>
+                    <a:pt x="12700" y="12700"/>
+                  </a:lnTo>
+                  <a:lnTo>
+                    <a:pt x="25400" y="12700"/>
+                  </a:lnTo>
+                  <a:lnTo>
+                    <a:pt x="25400" y="57531"/>
+                  </a:lnTo>
+                  <a:lnTo>
+                    <a:pt x="12700" y="57531"/>
+                  </a:lnTo>
+                  <a:lnTo>
+                    <a:pt x="12700" y="44831"/>
+                  </a:lnTo>
+                  <a:lnTo>
+                    <a:pt x="22689438" y="44831"/>
+                  </a:lnTo>
+                  <a:lnTo>
+                    <a:pt x="22689438" y="57531"/>
+                  </a:lnTo>
+                  <a:lnTo>
+                    <a:pt x="22676738" y="57531"/>
+                  </a:lnTo>
+                  <a:lnTo>
+                    <a:pt x="22676738" y="12700"/>
+                  </a:lnTo>
+                  <a:lnTo>
+                    <a:pt x="22689438" y="12700"/>
+                  </a:lnTo>
+                  <a:lnTo>
+                    <a:pt x="22689438" y="25400"/>
+                  </a:lnTo>
+                  <a:lnTo>
+                    <a:pt x="12700" y="25400"/>
+                  </a:lnTo>
+                  <a:close/>
+                </a:path>
+              </a:pathLst>
+            </a:custGeom>
+            <a:solidFill>
+              <a:srgbClr val="595959"/>
+            </a:solidFill>
+          </p:spPr>
+        </p:sp>
+      </p:grpSp>
+      <p:grpSp>
+        <p:nvGrpSpPr>
+          <p:cNvPr id="8" name="Group 8"/>
+          <p:cNvGrpSpPr/>
+          <p:nvPr/>
+        </p:nvGrpSpPr>
+        <p:grpSpPr>
+          <a:xfrm>
+            <a:off x="295499" y="284250"/>
+            <a:ext cx="17730900" cy="9718500"/>
+            <a:chOff x="0" y="0"/>
+            <a:chExt cx="23641200" cy="12958000"/>
+          </a:xfrm>
+        </p:grpSpPr>
+        <p:sp>
+          <p:nvSpPr>
+            <p:cNvPr id="9" name="Freeform 9"/>
+            <p:cNvSpPr/>
+            <p:nvPr/>
+          </p:nvSpPr>
+          <p:spPr>
+            <a:xfrm>
+              <a:off x="0" y="0"/>
+              <a:ext cx="23641177" cy="12957937"/>
+            </a:xfrm>
+            <a:custGeom>
+              <a:avLst/>
+              <a:gdLst/>
+              <a:ahLst/>
+              <a:cxnLst/>
+              <a:rect l="l" t="t" r="r" b="b"/>
+              <a:pathLst>
+                <a:path w="23641177" h="12957937">
+                  <a:moveTo>
+                    <a:pt x="25400" y="0"/>
+                  </a:moveTo>
+                  <a:lnTo>
+                    <a:pt x="23615777" y="0"/>
+                  </a:lnTo>
+                  <a:cubicBezTo>
+                    <a:pt x="23629747" y="0"/>
+                    <a:pt x="23641177" y="11430"/>
+                    <a:pt x="23641177" y="25400"/>
+                  </a:cubicBezTo>
+                  <a:lnTo>
+                    <a:pt x="23641177" y="12932537"/>
+                  </a:lnTo>
+                  <a:cubicBezTo>
+                    <a:pt x="23641177" y="12946507"/>
+                    <a:pt x="23629747" y="12957937"/>
+                    <a:pt x="23615777" y="12957937"/>
+                  </a:cubicBezTo>
+                  <a:lnTo>
+                    <a:pt x="25400" y="12957937"/>
+                  </a:lnTo>
+                  <a:cubicBezTo>
+                    <a:pt x="11430" y="12957937"/>
+                    <a:pt x="0" y="12946507"/>
+                    <a:pt x="0" y="12932537"/>
+                  </a:cubicBezTo>
+                  <a:lnTo>
+                    <a:pt x="0" y="25400"/>
+                  </a:lnTo>
+                  <a:cubicBezTo>
+                    <a:pt x="0" y="11430"/>
+                    <a:pt x="11430" y="0"/>
+                    <a:pt x="25400" y="0"/>
+                  </a:cubicBezTo>
+                  <a:moveTo>
+                    <a:pt x="25400" y="50800"/>
+                  </a:moveTo>
+                  <a:lnTo>
+                    <a:pt x="25400" y="25400"/>
+                  </a:lnTo>
+                  <a:lnTo>
+                    <a:pt x="50800" y="25400"/>
+                  </a:lnTo>
+                  <a:lnTo>
+                    <a:pt x="50800" y="12932537"/>
+                  </a:lnTo>
+                  <a:lnTo>
+                    <a:pt x="25400" y="12932537"/>
+                  </a:lnTo>
+                  <a:lnTo>
+                    <a:pt x="25400" y="12907137"/>
+                  </a:lnTo>
+                  <a:lnTo>
+                    <a:pt x="23615777" y="12907137"/>
+                  </a:lnTo>
+                  <a:lnTo>
+                    <a:pt x="23615777" y="12932537"/>
+                  </a:lnTo>
+                  <a:lnTo>
+                    <a:pt x="23590377" y="12932537"/>
+                  </a:lnTo>
+                  <a:lnTo>
+                    <a:pt x="23590377" y="25400"/>
+                  </a:lnTo>
+                  <a:lnTo>
+                    <a:pt x="23615777" y="25400"/>
+                  </a:lnTo>
+                  <a:lnTo>
+                    <a:pt x="23615777" y="50800"/>
+                  </a:lnTo>
+                  <a:lnTo>
+                    <a:pt x="25400" y="50800"/>
+                  </a:lnTo>
+                  <a:close/>
+                </a:path>
+              </a:pathLst>
+            </a:custGeom>
+            <a:solidFill>
+              <a:srgbClr val="000000"/>
+            </a:solidFill>
+          </p:spPr>
+        </p:sp>
+      </p:grpSp>
+    </p:spTree>
+    <p:extLst>
+      <p:ext uri="{BB962C8B-B14F-4D97-AF65-F5344CB8AC3E}">
+        <p14:creationId xmlns:p14="http://schemas.microsoft.com/office/powerpoint/2010/main" val="321612107"/>
+      </p:ext>
+    </p:extLst>
+  </p:cSld>
+  <p:clrMapOvr>
+    <a:masterClrMapping/>
+  </p:clrMapOvr>
+</p:sld>
+</file>
+
+<file path=ppt/slides/slide26.xml><?xml version="1.0" encoding="utf-8"?>
+<p:sld xmlns:a="http://schemas.openxmlformats.org/drawingml/2006/main" xmlns:r="http://schemas.openxmlformats.org/officeDocument/2006/relationships" xmlns:p="http://schemas.openxmlformats.org/presentationml/2006/main">
+  <p:cSld>
+    <p:spTree>
+      <p:nvGrpSpPr>
+        <p:cNvPr id="1" name=""/>
+        <p:cNvGrpSpPr/>
+        <p:nvPr/>
+      </p:nvGrpSpPr>
+      <p:grpSpPr>
+        <a:xfrm>
+          <a:off x="0" y="0"/>
+          <a:ext cx="0" cy="0"/>
+          <a:chOff x="0" y="0"/>
+          <a:chExt cx="0" cy="0"/>
+        </a:xfrm>
+      </p:grpSpPr>
+      <p:sp>
+        <p:nvSpPr>
+          <p:cNvPr id="2" name="TextBox 2"/>
+          <p:cNvSpPr txBox="1"/>
+          <p:nvPr/>
+        </p:nvSpPr>
+        <p:spPr>
+          <a:xfrm>
             <a:off x="714825" y="886225"/>
             <a:ext cx="16858352" cy="1057800"/>
           </a:xfrm>
@@ -26423,7 +27245,7 @@
 </p:sld>
 </file>
 
-<file path=ppt/slides/slide26.xml><?xml version="1.0" encoding="utf-8"?>
+<file path=ppt/slides/slide27.xml><?xml version="1.0" encoding="utf-8"?>
 <p:sld xmlns:a="http://schemas.openxmlformats.org/drawingml/2006/main" xmlns:r="http://schemas.openxmlformats.org/officeDocument/2006/relationships" xmlns:p="http://schemas.openxmlformats.org/presentationml/2006/main">
   <p:cSld>
     <p:spTree>
@@ -26818,7 +27640,7 @@
 </p:sld>
 </file>
 
-<file path=ppt/slides/slide27.xml><?xml version="1.0" encoding="utf-8"?>
+<file path=ppt/slides/slide28.xml><?xml version="1.0" encoding="utf-8"?>
 <p:sld xmlns:a="http://schemas.openxmlformats.org/drawingml/2006/main" xmlns:r="http://schemas.openxmlformats.org/officeDocument/2006/relationships" xmlns:p="http://schemas.openxmlformats.org/presentationml/2006/main">
   <p:cSld>
     <p:spTree>
@@ -27225,7 +28047,7 @@
 </p:sld>
 </file>
 
-<file path=ppt/slides/slide28.xml><?xml version="1.0" encoding="utf-8"?>
+<file path=ppt/slides/slide29.xml><?xml version="1.0" encoding="utf-8"?>
 <p:sld xmlns:a="http://schemas.openxmlformats.org/drawingml/2006/main" xmlns:r="http://schemas.openxmlformats.org/officeDocument/2006/relationships" xmlns:p="http://schemas.openxmlformats.org/presentationml/2006/main">
   <p:cSld>
     <p:spTree>

</xml_diff>

<commit_message>
first review change - categorised models (14 models)
</commit_message>
<xml_diff>
--- a/Batch_4 IT-G2.pptx
+++ b/Batch_4 IT-G2.pptx
@@ -5,7 +5,7 @@
     <p:sldMasterId id="2147483648" r:id="rId1"/>
   </p:sldMasterIdLst>
   <p:notesMasterIdLst>
-    <p:notesMasterId r:id="rId31"/>
+    <p:notesMasterId r:id="rId35"/>
   </p:notesMasterIdLst>
   <p:sldIdLst>
     <p:sldId id="256" r:id="rId2"/>
@@ -28,32 +28,36 @@
     <p:sldId id="278" r:id="rId19"/>
     <p:sldId id="281" r:id="rId20"/>
     <p:sldId id="282" r:id="rId21"/>
-    <p:sldId id="279" r:id="rId22"/>
-    <p:sldId id="283" r:id="rId23"/>
-    <p:sldId id="284" r:id="rId24"/>
-    <p:sldId id="285" r:id="rId25"/>
-    <p:sldId id="286" r:id="rId26"/>
-    <p:sldId id="269" r:id="rId27"/>
-    <p:sldId id="270" r:id="rId28"/>
-    <p:sldId id="271" r:id="rId29"/>
-    <p:sldId id="272" r:id="rId30"/>
+    <p:sldId id="289" r:id="rId22"/>
+    <p:sldId id="290" r:id="rId23"/>
+    <p:sldId id="291" r:id="rId24"/>
+    <p:sldId id="284" r:id="rId25"/>
+    <p:sldId id="288" r:id="rId26"/>
+    <p:sldId id="287" r:id="rId27"/>
+    <p:sldId id="285" r:id="rId28"/>
+    <p:sldId id="293" r:id="rId29"/>
+    <p:sldId id="286" r:id="rId30"/>
+    <p:sldId id="269" r:id="rId31"/>
+    <p:sldId id="270" r:id="rId32"/>
+    <p:sldId id="271" r:id="rId33"/>
+    <p:sldId id="272" r:id="rId34"/>
   </p:sldIdLst>
   <p:sldSz cx="18288000" cy="10287000"/>
   <p:notesSz cx="6858000" cy="9144000"/>
   <p:embeddedFontLst>
     <p:embeddedFont>
       <p:font typeface="Bahnschrift" panose="020B0502040204020203" pitchFamily="34" charset="0"/>
-      <p:regular r:id="rId32"/>
-      <p:bold r:id="rId33"/>
+      <p:regular r:id="rId36"/>
+      <p:bold r:id="rId37"/>
     </p:embeddedFont>
     <p:embeddedFont>
       <p:font typeface="Times New Roman Bold" panose="02020803070505020304" pitchFamily="18" charset="0"/>
-      <p:regular r:id="rId34"/>
-      <p:bold r:id="rId35"/>
+      <p:regular r:id="rId38"/>
+      <p:bold r:id="rId39"/>
     </p:embeddedFont>
     <p:embeddedFont>
       <p:font typeface="Times New Roman Italics" panose="020B0604020202020204" charset="0"/>
-      <p:regular r:id="rId36"/>
+      <p:regular r:id="rId40"/>
     </p:embeddedFont>
   </p:embeddedFontLst>
   <p:defaultTextStyle>
@@ -173,7 +177,7 @@
 <file path=ppt/revisionInfo.xml><?xml version="1.0" encoding="utf-8"?>
 <p1510:revInfo xmlns:a="http://schemas.openxmlformats.org/drawingml/2006/main" xmlns:r="http://schemas.openxmlformats.org/officeDocument/2006/relationships" xmlns:p1510="http://schemas.microsoft.com/office/powerpoint/2015/10/main">
   <p1510:revLst>
-    <p1510:client id="{70A2666E-DFD6-444A-A910-CE2623165711}" v="47" dt="2024-08-07T17:34:31.083"/>
+    <p1510:client id="{70A2666E-DFD6-444A-A910-CE2623165711}" v="61" dt="2024-08-10T15:11:31.064"/>
   </p1510:revLst>
 </p1510:revInfo>
 </file>
@@ -182,11 +186,26 @@
 <pc:chgInfo xmlns:a="http://schemas.openxmlformats.org/drawingml/2006/main" xmlns:r="http://schemas.openxmlformats.org/officeDocument/2006/relationships" xmlns:ac="http://schemas.microsoft.com/office/drawing/2013/main/command" xmlns:pc="http://schemas.microsoft.com/office/powerpoint/2013/main/command">
   <pc:docChgLst>
     <pc:chgData name="Prithiv Vijai" userId="5d24f1427401153b" providerId="LiveId" clId="{70A2666E-DFD6-444A-A910-CE2623165711}"/>
-    <pc:docChg chg="undo custSel addSld delSld modSld">
-      <pc:chgData name="Prithiv Vijai" userId="5d24f1427401153b" providerId="LiveId" clId="{70A2666E-DFD6-444A-A910-CE2623165711}" dt="2024-08-07T18:04:57.411" v="2988" actId="113"/>
+    <pc:docChg chg="undo custSel addSld delSld modSld sldOrd">
+      <pc:chgData name="Prithiv Vijai" userId="5d24f1427401153b" providerId="LiveId" clId="{70A2666E-DFD6-444A-A910-CE2623165711}" dt="2024-08-10T15:11:53.379" v="3648" actId="1076"/>
       <pc:docMkLst>
         <pc:docMk/>
       </pc:docMkLst>
+      <pc:sldChg chg="modSp mod">
+        <pc:chgData name="Prithiv Vijai" userId="5d24f1427401153b" providerId="LiveId" clId="{70A2666E-DFD6-444A-A910-CE2623165711}" dt="2024-08-10T11:08:27.448" v="3347" actId="20577"/>
+        <pc:sldMkLst>
+          <pc:docMk/>
+          <pc:sldMk cId="0" sldId="258"/>
+        </pc:sldMkLst>
+        <pc:spChg chg="mod">
+          <ac:chgData name="Prithiv Vijai" userId="5d24f1427401153b" providerId="LiveId" clId="{70A2666E-DFD6-444A-A910-CE2623165711}" dt="2024-08-10T11:08:27.448" v="3347" actId="20577"/>
+          <ac:spMkLst>
+            <pc:docMk/>
+            <pc:sldMk cId="0" sldId="258"/>
+            <ac:spMk id="3" creationId="{00000000-0000-0000-0000-000000000000}"/>
+          </ac:spMkLst>
+        </pc:spChg>
+      </pc:sldChg>
       <pc:sldChg chg="modSp mod">
         <pc:chgData name="Prithiv Vijai" userId="5d24f1427401153b" providerId="LiveId" clId="{70A2666E-DFD6-444A-A910-CE2623165711}" dt="2024-08-06T15:15:38.389" v="2434" actId="20577"/>
         <pc:sldMkLst>
@@ -695,8 +714,8 @@
           </ac:picMkLst>
         </pc:picChg>
       </pc:sldChg>
-      <pc:sldChg chg="modSp add mod">
-        <pc:chgData name="Prithiv Vijai" userId="5d24f1427401153b" providerId="LiveId" clId="{70A2666E-DFD6-444A-A910-CE2623165711}" dt="2024-08-07T17:51:23.829" v="2962" actId="1076"/>
+      <pc:sldChg chg="delSp modSp add del mod">
+        <pc:chgData name="Prithiv Vijai" userId="5d24f1427401153b" providerId="LiveId" clId="{70A2666E-DFD6-444A-A910-CE2623165711}" dt="2024-08-10T15:10:29.624" v="3639" actId="2696"/>
         <pc:sldMkLst>
           <pc:docMk/>
           <pc:sldMk cId="3426263962" sldId="279"/>
@@ -709,12 +728,20 @@
             <ac:spMk id="2" creationId="{00000000-0000-0000-0000-000000000000}"/>
           </ac:spMkLst>
         </pc:spChg>
-        <pc:spChg chg="mod">
-          <ac:chgData name="Prithiv Vijai" userId="5d24f1427401153b" providerId="LiveId" clId="{70A2666E-DFD6-444A-A910-CE2623165711}" dt="2024-08-07T17:51:23.829" v="2962" actId="1076"/>
+        <pc:spChg chg="del mod">
+          <ac:chgData name="Prithiv Vijai" userId="5d24f1427401153b" providerId="LiveId" clId="{70A2666E-DFD6-444A-A910-CE2623165711}" dt="2024-08-10T15:10:25.152" v="3637" actId="478"/>
           <ac:spMkLst>
             <pc:docMk/>
             <pc:sldMk cId="3426263962" sldId="279"/>
             <ac:spMk id="3" creationId="{62FA5441-5544-AF7F-ECA8-E56B5E8D0889}"/>
+          </ac:spMkLst>
+        </pc:spChg>
+        <pc:spChg chg="del mod">
+          <ac:chgData name="Prithiv Vijai" userId="5d24f1427401153b" providerId="LiveId" clId="{70A2666E-DFD6-444A-A910-CE2623165711}" dt="2024-08-10T15:10:26.989" v="3638" actId="478"/>
+          <ac:spMkLst>
+            <pc:docMk/>
+            <pc:sldMk cId="3426263962" sldId="279"/>
+            <ac:spMk id="7" creationId="{0AA4883A-F585-FC40-94E8-ABFEF1794BC2}"/>
           </ac:spMkLst>
         </pc:spChg>
       </pc:sldChg>
@@ -1031,18 +1058,42 @@
           </ac:picMkLst>
         </pc:picChg>
       </pc:sldChg>
-      <pc:sldChg chg="addSp delSp modSp add mod">
-        <pc:chgData name="Prithiv Vijai" userId="5d24f1427401153b" providerId="LiveId" clId="{70A2666E-DFD6-444A-A910-CE2623165711}" dt="2024-08-06T15:13:27.535" v="2430" actId="14100"/>
+      <pc:sldChg chg="addSp delSp modSp add del mod">
+        <pc:chgData name="Prithiv Vijai" userId="5d24f1427401153b" providerId="LiveId" clId="{70A2666E-DFD6-444A-A910-CE2623165711}" dt="2024-08-10T14:58:01.178" v="3590" actId="2696"/>
         <pc:sldMkLst>
           <pc:docMk/>
           <pc:sldMk cId="3510780241" sldId="283"/>
         </pc:sldMkLst>
+        <pc:spChg chg="mod">
+          <ac:chgData name="Prithiv Vijai" userId="5d24f1427401153b" providerId="LiveId" clId="{70A2666E-DFD6-444A-A910-CE2623165711}" dt="2024-08-10T14:46:09.198" v="3496" actId="20577"/>
+          <ac:spMkLst>
+            <pc:docMk/>
+            <pc:sldMk cId="3510780241" sldId="283"/>
+            <ac:spMk id="2" creationId="{00000000-0000-0000-0000-000000000000}"/>
+          </ac:spMkLst>
+        </pc:spChg>
         <pc:picChg chg="add del mod">
           <ac:chgData name="Prithiv Vijai" userId="5d24f1427401153b" providerId="LiveId" clId="{70A2666E-DFD6-444A-A910-CE2623165711}" dt="2024-08-06T15:03:00.784" v="2376" actId="478"/>
           <ac:picMkLst>
             <pc:docMk/>
             <pc:sldMk cId="3510780241" sldId="283"/>
             <ac:picMk id="7" creationId="{3CCD91FF-00C8-8050-92B0-527A0D262904}"/>
+          </ac:picMkLst>
+        </pc:picChg>
+        <pc:picChg chg="add mod modCrop">
+          <ac:chgData name="Prithiv Vijai" userId="5d24f1427401153b" providerId="LiveId" clId="{70A2666E-DFD6-444A-A910-CE2623165711}" dt="2024-08-10T14:03:56.506" v="3377" actId="1076"/>
+          <ac:picMkLst>
+            <pc:docMk/>
+            <pc:sldMk cId="3510780241" sldId="283"/>
+            <ac:picMk id="7" creationId="{FFE9519E-305A-4CB4-4927-185AF3A9D19D}"/>
+          </ac:picMkLst>
+        </pc:picChg>
+        <pc:picChg chg="add mod ord modCrop">
+          <ac:chgData name="Prithiv Vijai" userId="5d24f1427401153b" providerId="LiveId" clId="{70A2666E-DFD6-444A-A910-CE2623165711}" dt="2024-08-10T14:05:16.120" v="3409" actId="167"/>
+          <ac:picMkLst>
+            <pc:docMk/>
+            <pc:sldMk cId="3510780241" sldId="283"/>
+            <ac:picMk id="10" creationId="{9D9196F7-A772-F70A-5FE3-D123BB6FE4CB}"/>
           </ac:picMkLst>
         </pc:picChg>
         <pc:picChg chg="add del mod">
@@ -1053,8 +1104,8 @@
             <ac:picMk id="11" creationId="{54DB1DBC-7725-6833-3C4C-BA0ED38CB1C5}"/>
           </ac:picMkLst>
         </pc:picChg>
-        <pc:picChg chg="add mod">
-          <ac:chgData name="Prithiv Vijai" userId="5d24f1427401153b" providerId="LiveId" clId="{70A2666E-DFD6-444A-A910-CE2623165711}" dt="2024-08-06T15:13:27.535" v="2430" actId="14100"/>
+        <pc:picChg chg="add del mod">
+          <ac:chgData name="Prithiv Vijai" userId="5d24f1427401153b" providerId="LiveId" clId="{70A2666E-DFD6-444A-A910-CE2623165711}" dt="2024-08-10T14:03:34.256" v="3374" actId="478"/>
           <ac:picMkLst>
             <pc:docMk/>
             <pc:sldMk cId="3510780241" sldId="283"/>
@@ -1110,17 +1161,41 @@
         </pc:picChg>
       </pc:sldChg>
       <pc:sldChg chg="addSp delSp modSp add mod">
-        <pc:chgData name="Prithiv Vijai" userId="5d24f1427401153b" providerId="LiveId" clId="{70A2666E-DFD6-444A-A910-CE2623165711}" dt="2024-08-06T15:13:36.598" v="2433" actId="1076"/>
+        <pc:chgData name="Prithiv Vijai" userId="5d24f1427401153b" providerId="LiveId" clId="{70A2666E-DFD6-444A-A910-CE2623165711}" dt="2024-08-10T14:58:14.004" v="3630" actId="20577"/>
         <pc:sldMkLst>
           <pc:docMk/>
           <pc:sldMk cId="3257773676" sldId="284"/>
         </pc:sldMkLst>
+        <pc:spChg chg="mod">
+          <ac:chgData name="Prithiv Vijai" userId="5d24f1427401153b" providerId="LiveId" clId="{70A2666E-DFD6-444A-A910-CE2623165711}" dt="2024-08-10T14:58:14.004" v="3630" actId="20577"/>
+          <ac:spMkLst>
+            <pc:docMk/>
+            <pc:sldMk cId="3257773676" sldId="284"/>
+            <ac:spMk id="2" creationId="{00000000-0000-0000-0000-000000000000}"/>
+          </ac:spMkLst>
+        </pc:spChg>
+        <pc:picChg chg="add del mod ord modCrop">
+          <ac:chgData name="Prithiv Vijai" userId="5d24f1427401153b" providerId="LiveId" clId="{70A2666E-DFD6-444A-A910-CE2623165711}" dt="2024-08-10T14:47:25.092" v="3520" actId="478"/>
+          <ac:picMkLst>
+            <pc:docMk/>
+            <pc:sldMk cId="3257773676" sldId="284"/>
+            <ac:picMk id="3" creationId="{820CCE61-8A5C-198D-F2EB-7A7CB0F8B917}"/>
+          </ac:picMkLst>
+        </pc:picChg>
         <pc:picChg chg="del mod">
           <ac:chgData name="Prithiv Vijai" userId="5d24f1427401153b" providerId="LiveId" clId="{70A2666E-DFD6-444A-A910-CE2623165711}" dt="2024-08-06T15:09:13.194" v="2400" actId="478"/>
           <ac:picMkLst>
             <pc:docMk/>
             <pc:sldMk cId="3257773676" sldId="284"/>
             <ac:picMk id="7" creationId="{3CCD91FF-00C8-8050-92B0-527A0D262904}"/>
+          </ac:picMkLst>
+        </pc:picChg>
+        <pc:picChg chg="add mod">
+          <ac:chgData name="Prithiv Vijai" userId="5d24f1427401153b" providerId="LiveId" clId="{70A2666E-DFD6-444A-A910-CE2623165711}" dt="2024-08-10T14:47:32.722" v="3523" actId="1076"/>
+          <ac:picMkLst>
+            <pc:docMk/>
+            <pc:sldMk cId="3257773676" sldId="284"/>
+            <ac:picMk id="10" creationId="{5C2CB2DD-3D50-53EB-2B26-44F4BDCF5DB3}"/>
           </ac:picMkLst>
         </pc:picChg>
         <pc:picChg chg="add del mod">
@@ -1131,8 +1206,8 @@
             <ac:picMk id="10" creationId="{905A4240-86F7-B01B-ACEA-8746226E979F}"/>
           </ac:picMkLst>
         </pc:picChg>
-        <pc:picChg chg="add mod">
-          <ac:chgData name="Prithiv Vijai" userId="5d24f1427401153b" providerId="LiveId" clId="{70A2666E-DFD6-444A-A910-CE2623165711}" dt="2024-08-06T15:13:36.598" v="2433" actId="1076"/>
+        <pc:picChg chg="add del mod modCrop">
+          <ac:chgData name="Prithiv Vijai" userId="5d24f1427401153b" providerId="LiveId" clId="{70A2666E-DFD6-444A-A910-CE2623165711}" dt="2024-08-10T14:02:16.973" v="3357" actId="478"/>
           <ac:picMkLst>
             <pc:docMk/>
             <pc:sldMk cId="3257773676" sldId="284"/>
@@ -1141,17 +1216,33 @@
         </pc:picChg>
       </pc:sldChg>
       <pc:sldChg chg="addSp delSp modSp add mod">
-        <pc:chgData name="Prithiv Vijai" userId="5d24f1427401153b" providerId="LiveId" clId="{70A2666E-DFD6-444A-A910-CE2623165711}" dt="2024-08-06T15:10:05.158" v="2415" actId="1076"/>
+        <pc:chgData name="Prithiv Vijai" userId="5d24f1427401153b" providerId="LiveId" clId="{70A2666E-DFD6-444A-A910-CE2623165711}" dt="2024-08-10T15:11:35.717" v="3646" actId="1076"/>
         <pc:sldMkLst>
           <pc:docMk/>
           <pc:sldMk cId="262112687" sldId="285"/>
         </pc:sldMkLst>
-        <pc:picChg chg="add mod">
-          <ac:chgData name="Prithiv Vijai" userId="5d24f1427401153b" providerId="LiveId" clId="{70A2666E-DFD6-444A-A910-CE2623165711}" dt="2024-08-06T15:10:05.158" v="2415" actId="1076"/>
+        <pc:spChg chg="mod">
+          <ac:chgData name="Prithiv Vijai" userId="5d24f1427401153b" providerId="LiveId" clId="{70A2666E-DFD6-444A-A910-CE2623165711}" dt="2024-08-10T14:52:10.097" v="3586" actId="20577"/>
+          <ac:spMkLst>
+            <pc:docMk/>
+            <pc:sldMk cId="262112687" sldId="285"/>
+            <ac:spMk id="2" creationId="{00000000-0000-0000-0000-000000000000}"/>
+          </ac:spMkLst>
+        </pc:spChg>
+        <pc:picChg chg="add del mod">
+          <ac:chgData name="Prithiv Vijai" userId="5d24f1427401153b" providerId="LiveId" clId="{70A2666E-DFD6-444A-A910-CE2623165711}" dt="2024-08-10T14:52:14.059" v="3587" actId="478"/>
           <ac:picMkLst>
             <pc:docMk/>
             <pc:sldMk cId="262112687" sldId="285"/>
             <ac:picMk id="7" creationId="{BD92570C-D608-E3CB-9834-22B25AE17F18}"/>
+          </ac:picMkLst>
+        </pc:picChg>
+        <pc:picChg chg="add mod">
+          <ac:chgData name="Prithiv Vijai" userId="5d24f1427401153b" providerId="LiveId" clId="{70A2666E-DFD6-444A-A910-CE2623165711}" dt="2024-08-10T15:11:35.717" v="3646" actId="1076"/>
+          <ac:picMkLst>
+            <pc:docMk/>
+            <pc:sldMk cId="262112687" sldId="285"/>
+            <ac:picMk id="10" creationId="{FD186305-1AC5-6DE9-26A2-712165756554}"/>
           </ac:picMkLst>
         </pc:picChg>
         <pc:picChg chg="del">
@@ -1164,13 +1255,13 @@
         </pc:picChg>
       </pc:sldChg>
       <pc:sldChg chg="addSp delSp modSp add mod">
-        <pc:chgData name="Prithiv Vijai" userId="5d24f1427401153b" providerId="LiveId" clId="{70A2666E-DFD6-444A-A910-CE2623165711}" dt="2024-08-07T18:04:57.411" v="2988" actId="113"/>
+        <pc:chgData name="Prithiv Vijai" userId="5d24f1427401153b" providerId="LiveId" clId="{70A2666E-DFD6-444A-A910-CE2623165711}" dt="2024-08-10T15:10:51.043" v="3643" actId="20577"/>
         <pc:sldMkLst>
           <pc:docMk/>
           <pc:sldMk cId="321612107" sldId="286"/>
         </pc:sldMkLst>
         <pc:spChg chg="mod">
-          <ac:chgData name="Prithiv Vijai" userId="5d24f1427401153b" providerId="LiveId" clId="{70A2666E-DFD6-444A-A910-CE2623165711}" dt="2024-08-07T17:33:27.536" v="2447" actId="20577"/>
+          <ac:chgData name="Prithiv Vijai" userId="5d24f1427401153b" providerId="LiveId" clId="{70A2666E-DFD6-444A-A910-CE2623165711}" dt="2024-08-10T15:10:51.043" v="3643" actId="20577"/>
           <ac:spMkLst>
             <pc:docMk/>
             <pc:sldMk cId="321612107" sldId="286"/>
@@ -1178,7 +1269,7 @@
           </ac:spMkLst>
         </pc:spChg>
         <pc:spChg chg="add mod">
-          <ac:chgData name="Prithiv Vijai" userId="5d24f1427401153b" providerId="LiveId" clId="{70A2666E-DFD6-444A-A910-CE2623165711}" dt="2024-08-07T18:04:57.411" v="2988" actId="113"/>
+          <ac:chgData name="Prithiv Vijai" userId="5d24f1427401153b" providerId="LiveId" clId="{70A2666E-DFD6-444A-A910-CE2623165711}" dt="2024-08-10T15:10:44.652" v="3642" actId="14100"/>
           <ac:spMkLst>
             <pc:docMk/>
             <pc:sldMk cId="321612107" sldId="286"/>
@@ -1191,6 +1282,221 @@
             <pc:docMk/>
             <pc:sldMk cId="321612107" sldId="286"/>
             <ac:picMk id="7" creationId="{BD92570C-D608-E3CB-9834-22B25AE17F18}"/>
+          </ac:picMkLst>
+        </pc:picChg>
+      </pc:sldChg>
+      <pc:sldChg chg="addSp delSp modSp add mod">
+        <pc:chgData name="Prithiv Vijai" userId="5d24f1427401153b" providerId="LiveId" clId="{70A2666E-DFD6-444A-A910-CE2623165711}" dt="2024-08-10T15:06:23.643" v="3636" actId="1076"/>
+        <pc:sldMkLst>
+          <pc:docMk/>
+          <pc:sldMk cId="2448138101" sldId="287"/>
+        </pc:sldMkLst>
+        <pc:spChg chg="mod">
+          <ac:chgData name="Prithiv Vijai" userId="5d24f1427401153b" providerId="LiveId" clId="{70A2666E-DFD6-444A-A910-CE2623165711}" dt="2024-08-10T14:48:04.196" v="3554" actId="20577"/>
+          <ac:spMkLst>
+            <pc:docMk/>
+            <pc:sldMk cId="2448138101" sldId="287"/>
+            <ac:spMk id="2" creationId="{00000000-0000-0000-0000-000000000000}"/>
+          </ac:spMkLst>
+        </pc:spChg>
+        <pc:picChg chg="add del mod ord modCrop">
+          <ac:chgData name="Prithiv Vijai" userId="5d24f1427401153b" providerId="LiveId" clId="{70A2666E-DFD6-444A-A910-CE2623165711}" dt="2024-08-10T14:48:10.357" v="3556" actId="478"/>
+          <ac:picMkLst>
+            <pc:docMk/>
+            <pc:sldMk cId="2448138101" sldId="287"/>
+            <ac:picMk id="7" creationId="{C3ADEBDA-15B3-8078-7BE0-2766F8E70812}"/>
+          </ac:picMkLst>
+        </pc:picChg>
+        <pc:picChg chg="add mod">
+          <ac:chgData name="Prithiv Vijai" userId="5d24f1427401153b" providerId="LiveId" clId="{70A2666E-DFD6-444A-A910-CE2623165711}" dt="2024-08-10T15:06:23.643" v="3636" actId="1076"/>
+          <ac:picMkLst>
+            <pc:docMk/>
+            <pc:sldMk cId="2448138101" sldId="287"/>
+            <ac:picMk id="11" creationId="{DC67F66E-4718-1CE5-E531-4E29D54F58E8}"/>
+          </ac:picMkLst>
+        </pc:picChg>
+        <pc:picChg chg="del mod modCrop">
+          <ac:chgData name="Prithiv Vijai" userId="5d24f1427401153b" providerId="LiveId" clId="{70A2666E-DFD6-444A-A910-CE2623165711}" dt="2024-08-10T14:02:18.228" v="3358" actId="478"/>
+          <ac:picMkLst>
+            <pc:docMk/>
+            <pc:sldMk cId="2448138101" sldId="287"/>
+            <ac:picMk id="12" creationId="{0F2C762C-ADEE-66F7-FB0D-AD31B9251A47}"/>
+          </ac:picMkLst>
+        </pc:picChg>
+      </pc:sldChg>
+      <pc:sldChg chg="addSp delSp modSp add mod ord">
+        <pc:chgData name="Prithiv Vijai" userId="5d24f1427401153b" providerId="LiveId" clId="{70A2666E-DFD6-444A-A910-CE2623165711}" dt="2024-08-10T15:06:08.445" v="3633" actId="1076"/>
+        <pc:sldMkLst>
+          <pc:docMk/>
+          <pc:sldMk cId="3503454125" sldId="288"/>
+        </pc:sldMkLst>
+        <pc:spChg chg="mod">
+          <ac:chgData name="Prithiv Vijai" userId="5d24f1427401153b" providerId="LiveId" clId="{70A2666E-DFD6-444A-A910-CE2623165711}" dt="2024-08-10T14:47:56.909" v="3538" actId="20577"/>
+          <ac:spMkLst>
+            <pc:docMk/>
+            <pc:sldMk cId="3503454125" sldId="288"/>
+            <ac:spMk id="2" creationId="{00000000-0000-0000-0000-000000000000}"/>
+          </ac:spMkLst>
+        </pc:spChg>
+        <pc:picChg chg="add del mod modCrop">
+          <ac:chgData name="Prithiv Vijai" userId="5d24f1427401153b" providerId="LiveId" clId="{70A2666E-DFD6-444A-A910-CE2623165711}" dt="2024-08-10T14:47:12.369" v="3515" actId="478"/>
+          <ac:picMkLst>
+            <pc:docMk/>
+            <pc:sldMk cId="3503454125" sldId="288"/>
+            <ac:picMk id="7" creationId="{F1812005-D877-DB38-E886-827842087481}"/>
+          </ac:picMkLst>
+        </pc:picChg>
+        <pc:picChg chg="add del mod">
+          <ac:chgData name="Prithiv Vijai" userId="5d24f1427401153b" providerId="LiveId" clId="{70A2666E-DFD6-444A-A910-CE2623165711}" dt="2024-08-10T14:04:16.350" v="3383" actId="478"/>
+          <ac:picMkLst>
+            <pc:docMk/>
+            <pc:sldMk cId="3503454125" sldId="288"/>
+            <ac:picMk id="10" creationId="{CC8179B6-0044-BBE7-F8B6-1E865BD52AEE}"/>
+          </ac:picMkLst>
+        </pc:picChg>
+        <pc:picChg chg="add del mod">
+          <ac:chgData name="Prithiv Vijai" userId="5d24f1427401153b" providerId="LiveId" clId="{70A2666E-DFD6-444A-A910-CE2623165711}" dt="2024-08-10T14:48:07.447" v="3555" actId="478"/>
+          <ac:picMkLst>
+            <pc:docMk/>
+            <pc:sldMk cId="3503454125" sldId="288"/>
+            <ac:picMk id="12" creationId="{0B6EEADD-72B3-3519-ADC7-36E5B9871BD4}"/>
+          </ac:picMkLst>
+        </pc:picChg>
+        <pc:picChg chg="del">
+          <ac:chgData name="Prithiv Vijai" userId="5d24f1427401153b" providerId="LiveId" clId="{70A2666E-DFD6-444A-A910-CE2623165711}" dt="2024-08-10T14:03:33.156" v="3373" actId="478"/>
+          <ac:picMkLst>
+            <pc:docMk/>
+            <pc:sldMk cId="3503454125" sldId="288"/>
+            <ac:picMk id="13" creationId="{CFE1C020-3E64-3BAE-088F-FE2CDAC0C07B}"/>
+          </ac:picMkLst>
+        </pc:picChg>
+        <pc:picChg chg="add del mod">
+          <ac:chgData name="Prithiv Vijai" userId="5d24f1427401153b" providerId="LiveId" clId="{70A2666E-DFD6-444A-A910-CE2623165711}" dt="2024-08-10T14:47:23.493" v="3519" actId="478"/>
+          <ac:picMkLst>
+            <pc:docMk/>
+            <pc:sldMk cId="3503454125" sldId="288"/>
+            <ac:picMk id="15" creationId="{2DC12535-5E93-6E36-C71C-A83DCA3A4F26}"/>
+          </ac:picMkLst>
+        </pc:picChg>
+        <pc:picChg chg="add mod">
+          <ac:chgData name="Prithiv Vijai" userId="5d24f1427401153b" providerId="LiveId" clId="{70A2666E-DFD6-444A-A910-CE2623165711}" dt="2024-08-10T15:06:08.445" v="3633" actId="1076"/>
+          <ac:picMkLst>
+            <pc:docMk/>
+            <pc:sldMk cId="3503454125" sldId="288"/>
+            <ac:picMk id="17" creationId="{675C865C-0F79-AEE4-2024-7A5E0A52D260}"/>
+          </ac:picMkLst>
+        </pc:picChg>
+      </pc:sldChg>
+      <pc:sldChg chg="add del">
+        <pc:chgData name="Prithiv Vijai" userId="5d24f1427401153b" providerId="LiveId" clId="{70A2666E-DFD6-444A-A910-CE2623165711}" dt="2024-08-10T14:03:27.437" v="3371" actId="47"/>
+        <pc:sldMkLst>
+          <pc:docMk/>
+          <pc:sldMk cId="3808588682" sldId="288"/>
+        </pc:sldMkLst>
+      </pc:sldChg>
+      <pc:sldChg chg="new del">
+        <pc:chgData name="Prithiv Vijai" userId="5d24f1427401153b" providerId="LiveId" clId="{70A2666E-DFD6-444A-A910-CE2623165711}" dt="2024-08-10T14:07:53.060" v="3418" actId="47"/>
+        <pc:sldMkLst>
+          <pc:docMk/>
+          <pc:sldMk cId="270351083" sldId="289"/>
+        </pc:sldMkLst>
+      </pc:sldChg>
+      <pc:sldChg chg="addSp delSp modSp add mod">
+        <pc:chgData name="Prithiv Vijai" userId="5d24f1427401153b" providerId="LiveId" clId="{70A2666E-DFD6-444A-A910-CE2623165711}" dt="2024-08-10T14:45:50.435" v="3457"/>
+        <pc:sldMkLst>
+          <pc:docMk/>
+          <pc:sldMk cId="2540996004" sldId="289"/>
+        </pc:sldMkLst>
+        <pc:spChg chg="mod">
+          <ac:chgData name="Prithiv Vijai" userId="5d24f1427401153b" providerId="LiveId" clId="{70A2666E-DFD6-444A-A910-CE2623165711}" dt="2024-08-10T14:45:50.435" v="3457"/>
+          <ac:spMkLst>
+            <pc:docMk/>
+            <pc:sldMk cId="2540996004" sldId="289"/>
+            <ac:spMk id="2" creationId="{00000000-0000-0000-0000-000000000000}"/>
+          </ac:spMkLst>
+        </pc:spChg>
+        <pc:spChg chg="del">
+          <ac:chgData name="Prithiv Vijai" userId="5d24f1427401153b" providerId="LiveId" clId="{70A2666E-DFD6-444A-A910-CE2623165711}" dt="2024-08-10T14:08:17.562" v="3423" actId="478"/>
+          <ac:spMkLst>
+            <pc:docMk/>
+            <pc:sldMk cId="2540996004" sldId="289"/>
+            <ac:spMk id="3" creationId="{62FA5441-5544-AF7F-ECA8-E56B5E8D0889}"/>
+          </ac:spMkLst>
+        </pc:spChg>
+        <pc:spChg chg="del">
+          <ac:chgData name="Prithiv Vijai" userId="5d24f1427401153b" providerId="LiveId" clId="{70A2666E-DFD6-444A-A910-CE2623165711}" dt="2024-08-10T14:08:19.510" v="3424" actId="478"/>
+          <ac:spMkLst>
+            <pc:docMk/>
+            <pc:sldMk cId="2540996004" sldId="289"/>
+            <ac:spMk id="7" creationId="{0AA4883A-F585-FC40-94E8-ABFEF1794BC2}"/>
+          </ac:spMkLst>
+        </pc:spChg>
+        <pc:picChg chg="add mod">
+          <ac:chgData name="Prithiv Vijai" userId="5d24f1427401153b" providerId="LiveId" clId="{70A2666E-DFD6-444A-A910-CE2623165711}" dt="2024-08-10T14:45:16.449" v="3446" actId="1076"/>
+          <ac:picMkLst>
+            <pc:docMk/>
+            <pc:sldMk cId="2540996004" sldId="289"/>
+            <ac:picMk id="11" creationId="{85B039C8-228A-0813-AB52-AEF046826C7C}"/>
+          </ac:picMkLst>
+        </pc:picChg>
+      </pc:sldChg>
+      <pc:sldChg chg="addSp delSp modSp add mod">
+        <pc:chgData name="Prithiv Vijai" userId="5d24f1427401153b" providerId="LiveId" clId="{70A2666E-DFD6-444A-A910-CE2623165711}" dt="2024-08-10T14:45:56.485" v="3478" actId="20577"/>
+        <pc:sldMkLst>
+          <pc:docMk/>
+          <pc:sldMk cId="3755169604" sldId="290"/>
+        </pc:sldMkLst>
+        <pc:spChg chg="mod">
+          <ac:chgData name="Prithiv Vijai" userId="5d24f1427401153b" providerId="LiveId" clId="{70A2666E-DFD6-444A-A910-CE2623165711}" dt="2024-08-10T14:45:56.485" v="3478" actId="20577"/>
+          <ac:spMkLst>
+            <pc:docMk/>
+            <pc:sldMk cId="3755169604" sldId="290"/>
+            <ac:spMk id="2" creationId="{00000000-0000-0000-0000-000000000000}"/>
+          </ac:spMkLst>
+        </pc:spChg>
+        <pc:picChg chg="add mod">
+          <ac:chgData name="Prithiv Vijai" userId="5d24f1427401153b" providerId="LiveId" clId="{70A2666E-DFD6-444A-A910-CE2623165711}" dt="2024-08-10T14:45:30.139" v="3451" actId="1076"/>
+          <ac:picMkLst>
+            <pc:docMk/>
+            <pc:sldMk cId="3755169604" sldId="290"/>
+            <ac:picMk id="7" creationId="{841D2B3C-BDEC-151C-93A3-8A73553A737B}"/>
+          </ac:picMkLst>
+        </pc:picChg>
+        <pc:picChg chg="del">
+          <ac:chgData name="Prithiv Vijai" userId="5d24f1427401153b" providerId="LiveId" clId="{70A2666E-DFD6-444A-A910-CE2623165711}" dt="2024-08-10T14:45:26.281" v="3449" actId="478"/>
+          <ac:picMkLst>
+            <pc:docMk/>
+            <pc:sldMk cId="3755169604" sldId="290"/>
+            <ac:picMk id="11" creationId="{85B039C8-228A-0813-AB52-AEF046826C7C}"/>
+          </ac:picMkLst>
+        </pc:picChg>
+      </pc:sldChg>
+      <pc:sldChg chg="add">
+        <pc:chgData name="Prithiv Vijai" userId="5d24f1427401153b" providerId="LiveId" clId="{70A2666E-DFD6-444A-A910-CE2623165711}" dt="2024-08-10T14:47:50.664" v="3527" actId="2890"/>
+        <pc:sldMkLst>
+          <pc:docMk/>
+          <pc:sldMk cId="1900732085" sldId="291"/>
+        </pc:sldMkLst>
+      </pc:sldChg>
+      <pc:sldChg chg="add del">
+        <pc:chgData name="Prithiv Vijai" userId="5d24f1427401153b" providerId="LiveId" clId="{70A2666E-DFD6-444A-A910-CE2623165711}" dt="2024-08-10T14:52:19.346" v="3589" actId="47"/>
+        <pc:sldMkLst>
+          <pc:docMk/>
+          <pc:sldMk cId="1007859199" sldId="292"/>
+        </pc:sldMkLst>
+      </pc:sldChg>
+      <pc:sldChg chg="addSp modSp add mod">
+        <pc:chgData name="Prithiv Vijai" userId="5d24f1427401153b" providerId="LiveId" clId="{70A2666E-DFD6-444A-A910-CE2623165711}" dt="2024-08-10T15:11:53.379" v="3648" actId="1076"/>
+        <pc:sldMkLst>
+          <pc:docMk/>
+          <pc:sldMk cId="3768388641" sldId="293"/>
+        </pc:sldMkLst>
+        <pc:picChg chg="add mod">
+          <ac:chgData name="Prithiv Vijai" userId="5d24f1427401153b" providerId="LiveId" clId="{70A2666E-DFD6-444A-A910-CE2623165711}" dt="2024-08-10T15:11:53.379" v="3648" actId="1076"/>
+          <ac:picMkLst>
+            <pc:docMk/>
+            <pc:sldMk cId="3768388641" sldId="293"/>
+            <ac:picMk id="7" creationId="{DE1DC800-8CFE-50C2-2C50-459CBA659C20}"/>
           </ac:picMkLst>
         </pc:picChg>
       </pc:sldChg>
@@ -1281,7 +1587,7 @@
           <a:p>
             <a:fld id="{B7268E1E-0E44-426D-905E-8AD9B19D2182}" type="datetimeFigureOut">
               <a:rPr lang="cs-CZ" smtClean="0"/>
-              <a:t>07.08.2024</a:t>
+              <a:t>10.08.2024</a:t>
             </a:fld>
             <a:endParaRPr lang="cs-CZ"/>
           </a:p>
@@ -4594,7 +4900,7 @@
     </p:spTree>
     <p:extLst>
       <p:ext uri="{BB962C8B-B14F-4D97-AF65-F5344CB8AC3E}">
-        <p14:creationId xmlns:p14="http://schemas.microsoft.com/office/powerpoint/2010/main" val="32605038"/>
+        <p14:creationId xmlns:p14="http://schemas.microsoft.com/office/powerpoint/2010/main" val="840828176"/>
       </p:ext>
     </p:extLst>
   </p:cSld>
@@ -4814,7 +5120,7 @@
     </p:spTree>
     <p:extLst>
       <p:ext uri="{BB962C8B-B14F-4D97-AF65-F5344CB8AC3E}">
-        <p14:creationId xmlns:p14="http://schemas.microsoft.com/office/powerpoint/2010/main" val="4069349557"/>
+        <p14:creationId xmlns:p14="http://schemas.microsoft.com/office/powerpoint/2010/main" val="1474578662"/>
       </p:ext>
     </p:extLst>
   </p:cSld>
@@ -5034,7 +5340,7 @@
     </p:spTree>
     <p:extLst>
       <p:ext uri="{BB962C8B-B14F-4D97-AF65-F5344CB8AC3E}">
-        <p14:creationId xmlns:p14="http://schemas.microsoft.com/office/powerpoint/2010/main" val="1017474370"/>
+        <p14:creationId xmlns:p14="http://schemas.microsoft.com/office/powerpoint/2010/main" val="2367130193"/>
       </p:ext>
     </p:extLst>
   </p:cSld>
@@ -5254,7 +5560,7 @@
     </p:spTree>
     <p:extLst>
       <p:ext uri="{BB962C8B-B14F-4D97-AF65-F5344CB8AC3E}">
-        <p14:creationId xmlns:p14="http://schemas.microsoft.com/office/powerpoint/2010/main" val="727281543"/>
+        <p14:creationId xmlns:p14="http://schemas.microsoft.com/office/powerpoint/2010/main" val="1017474370"/>
       </p:ext>
     </p:extLst>
   </p:cSld>
@@ -5474,7 +5780,7 @@
     </p:spTree>
     <p:extLst>
       <p:ext uri="{BB962C8B-B14F-4D97-AF65-F5344CB8AC3E}">
-        <p14:creationId xmlns:p14="http://schemas.microsoft.com/office/powerpoint/2010/main" val="1746343275"/>
+        <p14:creationId xmlns:p14="http://schemas.microsoft.com/office/powerpoint/2010/main" val="2626958643"/>
       </p:ext>
     </p:extLst>
   </p:cSld>
@@ -5692,6 +5998,11 @@
         </p:txBody>
       </p:sp>
     </p:spTree>
+    <p:extLst>
+      <p:ext uri="{BB962C8B-B14F-4D97-AF65-F5344CB8AC3E}">
+        <p14:creationId xmlns:p14="http://schemas.microsoft.com/office/powerpoint/2010/main" val="1551284321"/>
+      </p:ext>
+    </p:extLst>
   </p:cSld>
   <p:clrMapOvr>
     <a:masterClrMapping/>
@@ -5793,8 +6104,8 @@
         </p:nvSpPr>
         <p:spPr>
           <a:xfrm>
-            <a:off x="2857500" y="512763"/>
-            <a:ext cx="3429000" cy="2566987"/>
+            <a:off x="2290763" y="512763"/>
+            <a:ext cx="4562475" cy="2566987"/>
           </a:xfrm>
           <a:prstGeom prst="rect">
             <a:avLst/>
@@ -5907,6 +6218,11 @@
         </p:txBody>
       </p:sp>
     </p:spTree>
+    <p:extLst>
+      <p:ext uri="{BB962C8B-B14F-4D97-AF65-F5344CB8AC3E}">
+        <p14:creationId xmlns:p14="http://schemas.microsoft.com/office/powerpoint/2010/main" val="727281543"/>
+      </p:ext>
+    </p:extLst>
   </p:cSld>
   <p:clrMapOvr>
     <a:masterClrMapping/>
@@ -6008,8 +6324,8 @@
         </p:nvSpPr>
         <p:spPr>
           <a:xfrm>
-            <a:off x="2857500" y="512763"/>
-            <a:ext cx="3429000" cy="2566987"/>
+            <a:off x="2290763" y="512763"/>
+            <a:ext cx="4562475" cy="2566987"/>
           </a:xfrm>
           <a:prstGeom prst="rect">
             <a:avLst/>
@@ -6122,6 +6438,11 @@
         </p:txBody>
       </p:sp>
     </p:spTree>
+    <p:extLst>
+      <p:ext uri="{BB962C8B-B14F-4D97-AF65-F5344CB8AC3E}">
+        <p14:creationId xmlns:p14="http://schemas.microsoft.com/office/powerpoint/2010/main" val="3391166675"/>
+      </p:ext>
+    </p:extLst>
   </p:cSld>
   <p:clrMapOvr>
     <a:masterClrMapping/>
@@ -6223,8 +6544,8 @@
         </p:nvSpPr>
         <p:spPr>
           <a:xfrm>
-            <a:off x="2857500" y="512763"/>
-            <a:ext cx="3429000" cy="2566987"/>
+            <a:off x="2290763" y="512763"/>
+            <a:ext cx="4562475" cy="2566987"/>
           </a:xfrm>
           <a:prstGeom prst="rect">
             <a:avLst/>
@@ -6337,6 +6658,11 @@
         </p:txBody>
       </p:sp>
     </p:spTree>
+    <p:extLst>
+      <p:ext uri="{BB962C8B-B14F-4D97-AF65-F5344CB8AC3E}">
+        <p14:creationId xmlns:p14="http://schemas.microsoft.com/office/powerpoint/2010/main" val="1746343275"/>
+      </p:ext>
+    </p:extLst>
   </p:cSld>
   <p:clrMapOvr>
     <a:masterClrMapping/>
@@ -6345,6 +6671,866 @@
 </file>
 
 <file path=ppt/notesSlides/notesSlide3.xml><?xml version="1.0" encoding="utf-8"?>
+<p:notes xmlns:a="http://schemas.openxmlformats.org/drawingml/2006/main" xmlns:r="http://schemas.openxmlformats.org/officeDocument/2006/relationships" xmlns:p="http://schemas.openxmlformats.org/presentationml/2006/main">
+  <p:cSld>
+    <p:spTree>
+      <p:nvGrpSpPr>
+        <p:cNvPr id="1" name=""/>
+        <p:cNvGrpSpPr/>
+        <p:nvPr/>
+      </p:nvGrpSpPr>
+      <p:grpSpPr>
+        <a:xfrm>
+          <a:off x="0" y="0"/>
+          <a:ext cx="0" cy="0"/>
+          <a:chOff x="0" y="0"/>
+          <a:chExt cx="0" cy="0"/>
+        </a:xfrm>
+      </p:grpSpPr>
+      <p:sp>
+        <p:nvSpPr>
+          <p:cNvPr id="2" name="Header Placeholder 1"/>
+          <p:cNvSpPr>
+            <a:spLocks noGrp="1"/>
+          </p:cNvSpPr>
+          <p:nvPr>
+            <p:ph type="hdr" sz="quarter"/>
+          </p:nvPr>
+        </p:nvSpPr>
+        <p:spPr>
+          <a:xfrm>
+            <a:off x="0" y="0"/>
+            <a:ext cx="3962400" cy="342900"/>
+          </a:xfrm>
+          <a:prstGeom prst="rect">
+            <a:avLst/>
+          </a:prstGeom>
+        </p:spPr>
+        <p:txBody>
+          <a:bodyPr vert="horz" lIns="91440" tIns="45720" rIns="91440" bIns="45720" rtlCol="0"/>
+          <a:lstStyle>
+            <a:lvl1pPr algn="l">
+              <a:defRPr sz="1200"/>
+            </a:lvl1pPr>
+          </a:lstStyle>
+          <a:p>
+            <a:endParaRPr/>
+          </a:p>
+        </p:txBody>
+      </p:sp>
+      <p:sp>
+        <p:nvSpPr>
+          <p:cNvPr id="3" name="Date Placeholder 2"/>
+          <p:cNvSpPr>
+            <a:spLocks noGrp="1"/>
+          </p:cNvSpPr>
+          <p:nvPr>
+            <p:ph type="dt" idx="1"/>
+          </p:nvPr>
+        </p:nvSpPr>
+        <p:spPr>
+          <a:xfrm>
+            <a:off x="5180013" y="0"/>
+            <a:ext cx="3962400" cy="342900"/>
+          </a:xfrm>
+          <a:prstGeom prst="rect">
+            <a:avLst/>
+          </a:prstGeom>
+        </p:spPr>
+        <p:txBody>
+          <a:bodyPr vert="horz" lIns="91440" tIns="45720" rIns="91440" bIns="45720" rtlCol="0"/>
+          <a:lstStyle>
+            <a:lvl1pPr algn="r">
+              <a:defRPr sz="1200"/>
+            </a:lvl1pPr>
+          </a:lstStyle>
+          <a:p>
+            <a:r>
+              <a:rPr lang="cs-CZ"/>
+              <a:t>1.7.2013</a:t>
+            </a:r>
+          </a:p>
+        </p:txBody>
+      </p:sp>
+      <p:sp>
+        <p:nvSpPr>
+          <p:cNvPr id="4" name="Slide Image Placeholder 3"/>
+          <p:cNvSpPr>
+            <a:spLocks noGrp="1" noRot="1" noChangeAspect="1"/>
+          </p:cNvSpPr>
+          <p:nvPr>
+            <p:ph type="sldImg" idx="2"/>
+          </p:nvPr>
+        </p:nvSpPr>
+        <p:spPr>
+          <a:xfrm>
+            <a:off x="2290763" y="512763"/>
+            <a:ext cx="4562475" cy="2566987"/>
+          </a:xfrm>
+          <a:prstGeom prst="rect">
+            <a:avLst/>
+          </a:prstGeom>
+          <a:noFill/>
+          <a:ln w="12700">
+            <a:solidFill>
+              <a:prstClr val="black"/>
+            </a:solidFill>
+          </a:ln>
+        </p:spPr>
+        <p:txBody>
+          <a:bodyPr vert="horz" lIns="91440" tIns="45720" rIns="91440" bIns="45720" rtlCol="0" anchor="ctr"/>
+          <a:lstStyle/>
+          <a:p>
+            <a:endParaRPr/>
+          </a:p>
+        </p:txBody>
+      </p:sp>
+      <p:sp>
+        <p:nvSpPr>
+          <p:cNvPr id="5" name="Notes Placeholder 4"/>
+          <p:cNvSpPr>
+            <a:spLocks noGrp="1"/>
+          </p:cNvSpPr>
+          <p:nvPr>
+            <p:ph type="body" sz="quarter" idx="3"/>
+          </p:nvPr>
+        </p:nvSpPr>
+        <p:spPr>
+          <a:xfrm>
+            <a:off x="914400" y="3251200"/>
+            <a:ext cx="7315200" cy="3081338"/>
+          </a:xfrm>
+          <a:prstGeom prst="rect">
+            <a:avLst/>
+          </a:prstGeom>
+        </p:spPr>
+        <p:txBody>
+          <a:bodyPr vert="horz" lIns="91440" tIns="45720" rIns="91440" bIns="45720" rtlCol="0"/>
+          <a:lstStyle/>
+          <a:p>
+            <a:endParaRPr lang="en-US"/>
+          </a:p>
+        </p:txBody>
+      </p:sp>
+      <p:sp>
+        <p:nvSpPr>
+          <p:cNvPr id="6" name="Footer Placeholder 5"/>
+          <p:cNvSpPr>
+            <a:spLocks noGrp="1"/>
+          </p:cNvSpPr>
+          <p:nvPr>
+            <p:ph type="ftr" sz="quarter" idx="4"/>
+          </p:nvPr>
+        </p:nvSpPr>
+        <p:spPr>
+          <a:xfrm>
+            <a:off x="0" y="6502400"/>
+            <a:ext cx="3962400" cy="341313"/>
+          </a:xfrm>
+          <a:prstGeom prst="rect">
+            <a:avLst/>
+          </a:prstGeom>
+        </p:spPr>
+        <p:txBody>
+          <a:bodyPr vert="horz" lIns="91440" tIns="45720" rIns="91440" bIns="45720" rtlCol="0" anchor="b"/>
+          <a:lstStyle>
+            <a:lvl1pPr algn="l">
+              <a:defRPr sz="1200"/>
+            </a:lvl1pPr>
+          </a:lstStyle>
+          <a:p>
+            <a:endParaRPr/>
+          </a:p>
+        </p:txBody>
+      </p:sp>
+      <p:sp>
+        <p:nvSpPr>
+          <p:cNvPr id="7" name="Slide Number Placeholder 6"/>
+          <p:cNvSpPr>
+            <a:spLocks noGrp="1"/>
+          </p:cNvSpPr>
+          <p:nvPr>
+            <p:ph type="sldNum" sz="quarter" idx="5"/>
+          </p:nvPr>
+        </p:nvSpPr>
+        <p:spPr>
+          <a:xfrm>
+            <a:off x="5180013" y="6502400"/>
+            <a:ext cx="3962400" cy="341313"/>
+          </a:xfrm>
+          <a:prstGeom prst="rect">
+            <a:avLst/>
+          </a:prstGeom>
+        </p:spPr>
+        <p:txBody>
+          <a:bodyPr vert="horz" lIns="91440" tIns="45720" rIns="91440" bIns="45720" rtlCol="0" anchor="b"/>
+          <a:lstStyle>
+            <a:lvl1pPr algn="r">
+              <a:defRPr sz="1200"/>
+            </a:lvl1pPr>
+          </a:lstStyle>
+          <a:p>
+            <a:r>
+              <a:rPr lang="cs-CZ"/>
+              <a:t>‹#›</a:t>
+            </a:r>
+          </a:p>
+        </p:txBody>
+      </p:sp>
+    </p:spTree>
+  </p:cSld>
+  <p:clrMapOvr>
+    <a:masterClrMapping/>
+  </p:clrMapOvr>
+</p:notes>
+</file>
+
+<file path=ppt/notesSlides/notesSlide30.xml><?xml version="1.0" encoding="utf-8"?>
+<p:notes xmlns:a="http://schemas.openxmlformats.org/drawingml/2006/main" xmlns:r="http://schemas.openxmlformats.org/officeDocument/2006/relationships" xmlns:p="http://schemas.openxmlformats.org/presentationml/2006/main">
+  <p:cSld>
+    <p:spTree>
+      <p:nvGrpSpPr>
+        <p:cNvPr id="1" name=""/>
+        <p:cNvGrpSpPr/>
+        <p:nvPr/>
+      </p:nvGrpSpPr>
+      <p:grpSpPr>
+        <a:xfrm>
+          <a:off x="0" y="0"/>
+          <a:ext cx="0" cy="0"/>
+          <a:chOff x="0" y="0"/>
+          <a:chExt cx="0" cy="0"/>
+        </a:xfrm>
+      </p:grpSpPr>
+      <p:sp>
+        <p:nvSpPr>
+          <p:cNvPr id="2" name="Header Placeholder 1"/>
+          <p:cNvSpPr>
+            <a:spLocks noGrp="1"/>
+          </p:cNvSpPr>
+          <p:nvPr>
+            <p:ph type="hdr" sz="quarter"/>
+          </p:nvPr>
+        </p:nvSpPr>
+        <p:spPr>
+          <a:xfrm>
+            <a:off x="0" y="0"/>
+            <a:ext cx="3962400" cy="342900"/>
+          </a:xfrm>
+          <a:prstGeom prst="rect">
+            <a:avLst/>
+          </a:prstGeom>
+        </p:spPr>
+        <p:txBody>
+          <a:bodyPr vert="horz" lIns="91440" tIns="45720" rIns="91440" bIns="45720" rtlCol="0"/>
+          <a:lstStyle>
+            <a:lvl1pPr algn="l">
+              <a:defRPr sz="1200"/>
+            </a:lvl1pPr>
+          </a:lstStyle>
+          <a:p>
+            <a:endParaRPr/>
+          </a:p>
+        </p:txBody>
+      </p:sp>
+      <p:sp>
+        <p:nvSpPr>
+          <p:cNvPr id="3" name="Date Placeholder 2"/>
+          <p:cNvSpPr>
+            <a:spLocks noGrp="1"/>
+          </p:cNvSpPr>
+          <p:nvPr>
+            <p:ph type="dt" idx="1"/>
+          </p:nvPr>
+        </p:nvSpPr>
+        <p:spPr>
+          <a:xfrm>
+            <a:off x="5180013" y="0"/>
+            <a:ext cx="3962400" cy="342900"/>
+          </a:xfrm>
+          <a:prstGeom prst="rect">
+            <a:avLst/>
+          </a:prstGeom>
+        </p:spPr>
+        <p:txBody>
+          <a:bodyPr vert="horz" lIns="91440" tIns="45720" rIns="91440" bIns="45720" rtlCol="0"/>
+          <a:lstStyle>
+            <a:lvl1pPr algn="r">
+              <a:defRPr sz="1200"/>
+            </a:lvl1pPr>
+          </a:lstStyle>
+          <a:p>
+            <a:r>
+              <a:rPr lang="cs-CZ"/>
+              <a:t>1.7.2013</a:t>
+            </a:r>
+          </a:p>
+        </p:txBody>
+      </p:sp>
+      <p:sp>
+        <p:nvSpPr>
+          <p:cNvPr id="4" name="Slide Image Placeholder 3"/>
+          <p:cNvSpPr>
+            <a:spLocks noGrp="1" noRot="1" noChangeAspect="1"/>
+          </p:cNvSpPr>
+          <p:nvPr>
+            <p:ph type="sldImg" idx="2"/>
+          </p:nvPr>
+        </p:nvSpPr>
+        <p:spPr>
+          <a:xfrm>
+            <a:off x="2290763" y="512763"/>
+            <a:ext cx="4562475" cy="2566987"/>
+          </a:xfrm>
+          <a:prstGeom prst="rect">
+            <a:avLst/>
+          </a:prstGeom>
+          <a:noFill/>
+          <a:ln w="12700">
+            <a:solidFill>
+              <a:prstClr val="black"/>
+            </a:solidFill>
+          </a:ln>
+        </p:spPr>
+        <p:txBody>
+          <a:bodyPr vert="horz" lIns="91440" tIns="45720" rIns="91440" bIns="45720" rtlCol="0" anchor="ctr"/>
+          <a:lstStyle/>
+          <a:p>
+            <a:endParaRPr/>
+          </a:p>
+        </p:txBody>
+      </p:sp>
+      <p:sp>
+        <p:nvSpPr>
+          <p:cNvPr id="5" name="Notes Placeholder 4"/>
+          <p:cNvSpPr>
+            <a:spLocks noGrp="1"/>
+          </p:cNvSpPr>
+          <p:nvPr>
+            <p:ph type="body" sz="quarter" idx="3"/>
+          </p:nvPr>
+        </p:nvSpPr>
+        <p:spPr>
+          <a:xfrm>
+            <a:off x="914400" y="3251200"/>
+            <a:ext cx="7315200" cy="3081338"/>
+          </a:xfrm>
+          <a:prstGeom prst="rect">
+            <a:avLst/>
+          </a:prstGeom>
+        </p:spPr>
+        <p:txBody>
+          <a:bodyPr vert="horz" lIns="91440" tIns="45720" rIns="91440" bIns="45720" rtlCol="0"/>
+          <a:lstStyle/>
+          <a:p>
+            <a:endParaRPr lang="en-US"/>
+          </a:p>
+        </p:txBody>
+      </p:sp>
+      <p:sp>
+        <p:nvSpPr>
+          <p:cNvPr id="6" name="Footer Placeholder 5"/>
+          <p:cNvSpPr>
+            <a:spLocks noGrp="1"/>
+          </p:cNvSpPr>
+          <p:nvPr>
+            <p:ph type="ftr" sz="quarter" idx="4"/>
+          </p:nvPr>
+        </p:nvSpPr>
+        <p:spPr>
+          <a:xfrm>
+            <a:off x="0" y="6502400"/>
+            <a:ext cx="3962400" cy="341313"/>
+          </a:xfrm>
+          <a:prstGeom prst="rect">
+            <a:avLst/>
+          </a:prstGeom>
+        </p:spPr>
+        <p:txBody>
+          <a:bodyPr vert="horz" lIns="91440" tIns="45720" rIns="91440" bIns="45720" rtlCol="0" anchor="b"/>
+          <a:lstStyle>
+            <a:lvl1pPr algn="l">
+              <a:defRPr sz="1200"/>
+            </a:lvl1pPr>
+          </a:lstStyle>
+          <a:p>
+            <a:endParaRPr/>
+          </a:p>
+        </p:txBody>
+      </p:sp>
+      <p:sp>
+        <p:nvSpPr>
+          <p:cNvPr id="7" name="Slide Number Placeholder 6"/>
+          <p:cNvSpPr>
+            <a:spLocks noGrp="1"/>
+          </p:cNvSpPr>
+          <p:nvPr>
+            <p:ph type="sldNum" sz="quarter" idx="5"/>
+          </p:nvPr>
+        </p:nvSpPr>
+        <p:spPr>
+          <a:xfrm>
+            <a:off x="5180013" y="6502400"/>
+            <a:ext cx="3962400" cy="341313"/>
+          </a:xfrm>
+          <a:prstGeom prst="rect">
+            <a:avLst/>
+          </a:prstGeom>
+        </p:spPr>
+        <p:txBody>
+          <a:bodyPr vert="horz" lIns="91440" tIns="45720" rIns="91440" bIns="45720" rtlCol="0" anchor="b"/>
+          <a:lstStyle>
+            <a:lvl1pPr algn="r">
+              <a:defRPr sz="1200"/>
+            </a:lvl1pPr>
+          </a:lstStyle>
+          <a:p>
+            <a:r>
+              <a:rPr lang="cs-CZ"/>
+              <a:t>‹#›</a:t>
+            </a:r>
+          </a:p>
+        </p:txBody>
+      </p:sp>
+    </p:spTree>
+  </p:cSld>
+  <p:clrMapOvr>
+    <a:masterClrMapping/>
+  </p:clrMapOvr>
+</p:notes>
+</file>
+
+<file path=ppt/notesSlides/notesSlide31.xml><?xml version="1.0" encoding="utf-8"?>
+<p:notes xmlns:a="http://schemas.openxmlformats.org/drawingml/2006/main" xmlns:r="http://schemas.openxmlformats.org/officeDocument/2006/relationships" xmlns:p="http://schemas.openxmlformats.org/presentationml/2006/main">
+  <p:cSld>
+    <p:spTree>
+      <p:nvGrpSpPr>
+        <p:cNvPr id="1" name=""/>
+        <p:cNvGrpSpPr/>
+        <p:nvPr/>
+      </p:nvGrpSpPr>
+      <p:grpSpPr>
+        <a:xfrm>
+          <a:off x="0" y="0"/>
+          <a:ext cx="0" cy="0"/>
+          <a:chOff x="0" y="0"/>
+          <a:chExt cx="0" cy="0"/>
+        </a:xfrm>
+      </p:grpSpPr>
+      <p:sp>
+        <p:nvSpPr>
+          <p:cNvPr id="2" name="Header Placeholder 1"/>
+          <p:cNvSpPr>
+            <a:spLocks noGrp="1"/>
+          </p:cNvSpPr>
+          <p:nvPr>
+            <p:ph type="hdr" sz="quarter"/>
+          </p:nvPr>
+        </p:nvSpPr>
+        <p:spPr>
+          <a:xfrm>
+            <a:off x="0" y="0"/>
+            <a:ext cx="3962400" cy="342900"/>
+          </a:xfrm>
+          <a:prstGeom prst="rect">
+            <a:avLst/>
+          </a:prstGeom>
+        </p:spPr>
+        <p:txBody>
+          <a:bodyPr vert="horz" lIns="91440" tIns="45720" rIns="91440" bIns="45720" rtlCol="0"/>
+          <a:lstStyle>
+            <a:lvl1pPr algn="l">
+              <a:defRPr sz="1200"/>
+            </a:lvl1pPr>
+          </a:lstStyle>
+          <a:p>
+            <a:endParaRPr/>
+          </a:p>
+        </p:txBody>
+      </p:sp>
+      <p:sp>
+        <p:nvSpPr>
+          <p:cNvPr id="3" name="Date Placeholder 2"/>
+          <p:cNvSpPr>
+            <a:spLocks noGrp="1"/>
+          </p:cNvSpPr>
+          <p:nvPr>
+            <p:ph type="dt" idx="1"/>
+          </p:nvPr>
+        </p:nvSpPr>
+        <p:spPr>
+          <a:xfrm>
+            <a:off x="5180013" y="0"/>
+            <a:ext cx="3962400" cy="342900"/>
+          </a:xfrm>
+          <a:prstGeom prst="rect">
+            <a:avLst/>
+          </a:prstGeom>
+        </p:spPr>
+        <p:txBody>
+          <a:bodyPr vert="horz" lIns="91440" tIns="45720" rIns="91440" bIns="45720" rtlCol="0"/>
+          <a:lstStyle>
+            <a:lvl1pPr algn="r">
+              <a:defRPr sz="1200"/>
+            </a:lvl1pPr>
+          </a:lstStyle>
+          <a:p>
+            <a:r>
+              <a:rPr lang="cs-CZ"/>
+              <a:t>1.7.2013</a:t>
+            </a:r>
+          </a:p>
+        </p:txBody>
+      </p:sp>
+      <p:sp>
+        <p:nvSpPr>
+          <p:cNvPr id="4" name="Slide Image Placeholder 3"/>
+          <p:cNvSpPr>
+            <a:spLocks noGrp="1" noRot="1" noChangeAspect="1"/>
+          </p:cNvSpPr>
+          <p:nvPr>
+            <p:ph type="sldImg" idx="2"/>
+          </p:nvPr>
+        </p:nvSpPr>
+        <p:spPr>
+          <a:xfrm>
+            <a:off x="2857500" y="512763"/>
+            <a:ext cx="3429000" cy="2566987"/>
+          </a:xfrm>
+          <a:prstGeom prst="rect">
+            <a:avLst/>
+          </a:prstGeom>
+          <a:noFill/>
+          <a:ln w="12700">
+            <a:solidFill>
+              <a:prstClr val="black"/>
+            </a:solidFill>
+          </a:ln>
+        </p:spPr>
+        <p:txBody>
+          <a:bodyPr vert="horz" lIns="91440" tIns="45720" rIns="91440" bIns="45720" rtlCol="0" anchor="ctr"/>
+          <a:lstStyle/>
+          <a:p>
+            <a:endParaRPr/>
+          </a:p>
+        </p:txBody>
+      </p:sp>
+      <p:sp>
+        <p:nvSpPr>
+          <p:cNvPr id="5" name="Notes Placeholder 4"/>
+          <p:cNvSpPr>
+            <a:spLocks noGrp="1"/>
+          </p:cNvSpPr>
+          <p:nvPr>
+            <p:ph type="body" sz="quarter" idx="3"/>
+          </p:nvPr>
+        </p:nvSpPr>
+        <p:spPr>
+          <a:xfrm>
+            <a:off x="914400" y="3251200"/>
+            <a:ext cx="7315200" cy="3081338"/>
+          </a:xfrm>
+          <a:prstGeom prst="rect">
+            <a:avLst/>
+          </a:prstGeom>
+        </p:spPr>
+        <p:txBody>
+          <a:bodyPr vert="horz" lIns="91440" tIns="45720" rIns="91440" bIns="45720" rtlCol="0"/>
+          <a:lstStyle/>
+          <a:p>
+            <a:endParaRPr lang="en-US"/>
+          </a:p>
+        </p:txBody>
+      </p:sp>
+      <p:sp>
+        <p:nvSpPr>
+          <p:cNvPr id="6" name="Footer Placeholder 5"/>
+          <p:cNvSpPr>
+            <a:spLocks noGrp="1"/>
+          </p:cNvSpPr>
+          <p:nvPr>
+            <p:ph type="ftr" sz="quarter" idx="4"/>
+          </p:nvPr>
+        </p:nvSpPr>
+        <p:spPr>
+          <a:xfrm>
+            <a:off x="0" y="6502400"/>
+            <a:ext cx="3962400" cy="341313"/>
+          </a:xfrm>
+          <a:prstGeom prst="rect">
+            <a:avLst/>
+          </a:prstGeom>
+        </p:spPr>
+        <p:txBody>
+          <a:bodyPr vert="horz" lIns="91440" tIns="45720" rIns="91440" bIns="45720" rtlCol="0" anchor="b"/>
+          <a:lstStyle>
+            <a:lvl1pPr algn="l">
+              <a:defRPr sz="1200"/>
+            </a:lvl1pPr>
+          </a:lstStyle>
+          <a:p>
+            <a:endParaRPr/>
+          </a:p>
+        </p:txBody>
+      </p:sp>
+      <p:sp>
+        <p:nvSpPr>
+          <p:cNvPr id="7" name="Slide Number Placeholder 6"/>
+          <p:cNvSpPr>
+            <a:spLocks noGrp="1"/>
+          </p:cNvSpPr>
+          <p:nvPr>
+            <p:ph type="sldNum" sz="quarter" idx="5"/>
+          </p:nvPr>
+        </p:nvSpPr>
+        <p:spPr>
+          <a:xfrm>
+            <a:off x="5180013" y="6502400"/>
+            <a:ext cx="3962400" cy="341313"/>
+          </a:xfrm>
+          <a:prstGeom prst="rect">
+            <a:avLst/>
+          </a:prstGeom>
+        </p:spPr>
+        <p:txBody>
+          <a:bodyPr vert="horz" lIns="91440" tIns="45720" rIns="91440" bIns="45720" rtlCol="0" anchor="b"/>
+          <a:lstStyle>
+            <a:lvl1pPr algn="r">
+              <a:defRPr sz="1200"/>
+            </a:lvl1pPr>
+          </a:lstStyle>
+          <a:p>
+            <a:r>
+              <a:rPr lang="cs-CZ"/>
+              <a:t>‹#›</a:t>
+            </a:r>
+          </a:p>
+        </p:txBody>
+      </p:sp>
+    </p:spTree>
+  </p:cSld>
+  <p:clrMapOvr>
+    <a:masterClrMapping/>
+  </p:clrMapOvr>
+</p:notes>
+</file>
+
+<file path=ppt/notesSlides/notesSlide32.xml><?xml version="1.0" encoding="utf-8"?>
+<p:notes xmlns:a="http://schemas.openxmlformats.org/drawingml/2006/main" xmlns:r="http://schemas.openxmlformats.org/officeDocument/2006/relationships" xmlns:p="http://schemas.openxmlformats.org/presentationml/2006/main">
+  <p:cSld>
+    <p:spTree>
+      <p:nvGrpSpPr>
+        <p:cNvPr id="1" name=""/>
+        <p:cNvGrpSpPr/>
+        <p:nvPr/>
+      </p:nvGrpSpPr>
+      <p:grpSpPr>
+        <a:xfrm>
+          <a:off x="0" y="0"/>
+          <a:ext cx="0" cy="0"/>
+          <a:chOff x="0" y="0"/>
+          <a:chExt cx="0" cy="0"/>
+        </a:xfrm>
+      </p:grpSpPr>
+      <p:sp>
+        <p:nvSpPr>
+          <p:cNvPr id="2" name="Header Placeholder 1"/>
+          <p:cNvSpPr>
+            <a:spLocks noGrp="1"/>
+          </p:cNvSpPr>
+          <p:nvPr>
+            <p:ph type="hdr" sz="quarter"/>
+          </p:nvPr>
+        </p:nvSpPr>
+        <p:spPr>
+          <a:xfrm>
+            <a:off x="0" y="0"/>
+            <a:ext cx="3962400" cy="342900"/>
+          </a:xfrm>
+          <a:prstGeom prst="rect">
+            <a:avLst/>
+          </a:prstGeom>
+        </p:spPr>
+        <p:txBody>
+          <a:bodyPr vert="horz" lIns="91440" tIns="45720" rIns="91440" bIns="45720" rtlCol="0"/>
+          <a:lstStyle>
+            <a:lvl1pPr algn="l">
+              <a:defRPr sz="1200"/>
+            </a:lvl1pPr>
+          </a:lstStyle>
+          <a:p>
+            <a:endParaRPr/>
+          </a:p>
+        </p:txBody>
+      </p:sp>
+      <p:sp>
+        <p:nvSpPr>
+          <p:cNvPr id="3" name="Date Placeholder 2"/>
+          <p:cNvSpPr>
+            <a:spLocks noGrp="1"/>
+          </p:cNvSpPr>
+          <p:nvPr>
+            <p:ph type="dt" idx="1"/>
+          </p:nvPr>
+        </p:nvSpPr>
+        <p:spPr>
+          <a:xfrm>
+            <a:off x="5180013" y="0"/>
+            <a:ext cx="3962400" cy="342900"/>
+          </a:xfrm>
+          <a:prstGeom prst="rect">
+            <a:avLst/>
+          </a:prstGeom>
+        </p:spPr>
+        <p:txBody>
+          <a:bodyPr vert="horz" lIns="91440" tIns="45720" rIns="91440" bIns="45720" rtlCol="0"/>
+          <a:lstStyle>
+            <a:lvl1pPr algn="r">
+              <a:defRPr sz="1200"/>
+            </a:lvl1pPr>
+          </a:lstStyle>
+          <a:p>
+            <a:r>
+              <a:rPr lang="cs-CZ"/>
+              <a:t>1.7.2013</a:t>
+            </a:r>
+          </a:p>
+        </p:txBody>
+      </p:sp>
+      <p:sp>
+        <p:nvSpPr>
+          <p:cNvPr id="4" name="Slide Image Placeholder 3"/>
+          <p:cNvSpPr>
+            <a:spLocks noGrp="1" noRot="1" noChangeAspect="1"/>
+          </p:cNvSpPr>
+          <p:nvPr>
+            <p:ph type="sldImg" idx="2"/>
+          </p:nvPr>
+        </p:nvSpPr>
+        <p:spPr>
+          <a:xfrm>
+            <a:off x="2857500" y="512763"/>
+            <a:ext cx="3429000" cy="2566987"/>
+          </a:xfrm>
+          <a:prstGeom prst="rect">
+            <a:avLst/>
+          </a:prstGeom>
+          <a:noFill/>
+          <a:ln w="12700">
+            <a:solidFill>
+              <a:prstClr val="black"/>
+            </a:solidFill>
+          </a:ln>
+        </p:spPr>
+        <p:txBody>
+          <a:bodyPr vert="horz" lIns="91440" tIns="45720" rIns="91440" bIns="45720" rtlCol="0" anchor="ctr"/>
+          <a:lstStyle/>
+          <a:p>
+            <a:endParaRPr/>
+          </a:p>
+        </p:txBody>
+      </p:sp>
+      <p:sp>
+        <p:nvSpPr>
+          <p:cNvPr id="5" name="Notes Placeholder 4"/>
+          <p:cNvSpPr>
+            <a:spLocks noGrp="1"/>
+          </p:cNvSpPr>
+          <p:nvPr>
+            <p:ph type="body" sz="quarter" idx="3"/>
+          </p:nvPr>
+        </p:nvSpPr>
+        <p:spPr>
+          <a:xfrm>
+            <a:off x="914400" y="3251200"/>
+            <a:ext cx="7315200" cy="3081338"/>
+          </a:xfrm>
+          <a:prstGeom prst="rect">
+            <a:avLst/>
+          </a:prstGeom>
+        </p:spPr>
+        <p:txBody>
+          <a:bodyPr vert="horz" lIns="91440" tIns="45720" rIns="91440" bIns="45720" rtlCol="0"/>
+          <a:lstStyle/>
+          <a:p>
+            <a:endParaRPr lang="en-US"/>
+          </a:p>
+        </p:txBody>
+      </p:sp>
+      <p:sp>
+        <p:nvSpPr>
+          <p:cNvPr id="6" name="Footer Placeholder 5"/>
+          <p:cNvSpPr>
+            <a:spLocks noGrp="1"/>
+          </p:cNvSpPr>
+          <p:nvPr>
+            <p:ph type="ftr" sz="quarter" idx="4"/>
+          </p:nvPr>
+        </p:nvSpPr>
+        <p:spPr>
+          <a:xfrm>
+            <a:off x="0" y="6502400"/>
+            <a:ext cx="3962400" cy="341313"/>
+          </a:xfrm>
+          <a:prstGeom prst="rect">
+            <a:avLst/>
+          </a:prstGeom>
+        </p:spPr>
+        <p:txBody>
+          <a:bodyPr vert="horz" lIns="91440" tIns="45720" rIns="91440" bIns="45720" rtlCol="0" anchor="b"/>
+          <a:lstStyle>
+            <a:lvl1pPr algn="l">
+              <a:defRPr sz="1200"/>
+            </a:lvl1pPr>
+          </a:lstStyle>
+          <a:p>
+            <a:endParaRPr/>
+          </a:p>
+        </p:txBody>
+      </p:sp>
+      <p:sp>
+        <p:nvSpPr>
+          <p:cNvPr id="7" name="Slide Number Placeholder 6"/>
+          <p:cNvSpPr>
+            <a:spLocks noGrp="1"/>
+          </p:cNvSpPr>
+          <p:nvPr>
+            <p:ph type="sldNum" sz="quarter" idx="5"/>
+          </p:nvPr>
+        </p:nvSpPr>
+        <p:spPr>
+          <a:xfrm>
+            <a:off x="5180013" y="6502400"/>
+            <a:ext cx="3962400" cy="341313"/>
+          </a:xfrm>
+          <a:prstGeom prst="rect">
+            <a:avLst/>
+          </a:prstGeom>
+        </p:spPr>
+        <p:txBody>
+          <a:bodyPr vert="horz" lIns="91440" tIns="45720" rIns="91440" bIns="45720" rtlCol="0" anchor="b"/>
+          <a:lstStyle>
+            <a:lvl1pPr algn="r">
+              <a:defRPr sz="1200"/>
+            </a:lvl1pPr>
+          </a:lstStyle>
+          <a:p>
+            <a:r>
+              <a:rPr lang="cs-CZ"/>
+              <a:t>‹#›</a:t>
+            </a:r>
+          </a:p>
+        </p:txBody>
+      </p:sp>
+    </p:spTree>
+  </p:cSld>
+  <p:clrMapOvr>
+    <a:masterClrMapping/>
+  </p:clrMapOvr>
+</p:notes>
+</file>
+
+<file path=ppt/notesSlides/notesSlide33.xml><?xml version="1.0" encoding="utf-8"?>
 <p:notes xmlns:a="http://schemas.openxmlformats.org/drawingml/2006/main" xmlns:r="http://schemas.openxmlformats.org/officeDocument/2006/relationships" xmlns:p="http://schemas.openxmlformats.org/presentationml/2006/main">
   <p:cSld>
     <p:spTree>
@@ -8029,7 +9215,7 @@
             <a:fld id="{1D8BD707-D9CF-40AE-B4C6-C98DA3205C09}" type="datetimeFigureOut">
               <a:rPr lang="en-US" smtClean="0"/>
               <a:pPr/>
-              <a:t>8/7/2024</a:t>
+              <a:t>8/10/2024</a:t>
             </a:fld>
             <a:endParaRPr lang="en-US"/>
           </a:p>
@@ -8194,7 +9380,7 @@
             <a:fld id="{1D8BD707-D9CF-40AE-B4C6-C98DA3205C09}" type="datetimeFigureOut">
               <a:rPr lang="en-US" smtClean="0"/>
               <a:pPr/>
-              <a:t>8/7/2024</a:t>
+              <a:t>8/10/2024</a:t>
             </a:fld>
             <a:endParaRPr lang="en-US"/>
           </a:p>
@@ -8369,7 +9555,7 @@
             <a:fld id="{1D8BD707-D9CF-40AE-B4C6-C98DA3205C09}" type="datetimeFigureOut">
               <a:rPr lang="en-US" smtClean="0"/>
               <a:pPr/>
-              <a:t>8/7/2024</a:t>
+              <a:t>8/10/2024</a:t>
             </a:fld>
             <a:endParaRPr lang="en-US"/>
           </a:p>
@@ -8534,7 +9720,7 @@
             <a:fld id="{1D8BD707-D9CF-40AE-B4C6-C98DA3205C09}" type="datetimeFigureOut">
               <a:rPr lang="en-US" smtClean="0"/>
               <a:pPr/>
-              <a:t>8/7/2024</a:t>
+              <a:t>8/10/2024</a:t>
             </a:fld>
             <a:endParaRPr lang="en-US"/>
           </a:p>
@@ -8776,7 +9962,7 @@
             <a:fld id="{1D8BD707-D9CF-40AE-B4C6-C98DA3205C09}" type="datetimeFigureOut">
               <a:rPr lang="en-US" smtClean="0"/>
               <a:pPr/>
-              <a:t>8/7/2024</a:t>
+              <a:t>8/10/2024</a:t>
             </a:fld>
             <a:endParaRPr lang="en-US"/>
           </a:p>
@@ -9058,7 +10244,7 @@
             <a:fld id="{1D8BD707-D9CF-40AE-B4C6-C98DA3205C09}" type="datetimeFigureOut">
               <a:rPr lang="en-US" smtClean="0"/>
               <a:pPr/>
-              <a:t>8/7/2024</a:t>
+              <a:t>8/10/2024</a:t>
             </a:fld>
             <a:endParaRPr lang="en-US"/>
           </a:p>
@@ -9474,7 +10660,7 @@
             <a:fld id="{1D8BD707-D9CF-40AE-B4C6-C98DA3205C09}" type="datetimeFigureOut">
               <a:rPr lang="en-US" smtClean="0"/>
               <a:pPr/>
-              <a:t>8/7/2024</a:t>
+              <a:t>8/10/2024</a:t>
             </a:fld>
             <a:endParaRPr lang="en-US"/>
           </a:p>
@@ -9588,7 +10774,7 @@
             <a:fld id="{1D8BD707-D9CF-40AE-B4C6-C98DA3205C09}" type="datetimeFigureOut">
               <a:rPr lang="en-US" smtClean="0"/>
               <a:pPr/>
-              <a:t>8/7/2024</a:t>
+              <a:t>8/10/2024</a:t>
             </a:fld>
             <a:endParaRPr lang="en-US"/>
           </a:p>
@@ -9680,7 +10866,7 @@
             <a:fld id="{1D8BD707-D9CF-40AE-B4C6-C98DA3205C09}" type="datetimeFigureOut">
               <a:rPr lang="en-US" smtClean="0"/>
               <a:pPr/>
-              <a:t>8/7/2024</a:t>
+              <a:t>8/10/2024</a:t>
             </a:fld>
             <a:endParaRPr lang="en-US"/>
           </a:p>
@@ -9952,7 +11138,7 @@
             <a:fld id="{1D8BD707-D9CF-40AE-B4C6-C98DA3205C09}" type="datetimeFigureOut">
               <a:rPr lang="en-US" smtClean="0"/>
               <a:pPr/>
-              <a:t>8/7/2024</a:t>
+              <a:t>8/10/2024</a:t>
             </a:fld>
             <a:endParaRPr lang="en-US"/>
           </a:p>
@@ -10201,7 +11387,7 @@
             <a:fld id="{1D8BD707-D9CF-40AE-B4C6-C98DA3205C09}" type="datetimeFigureOut">
               <a:rPr lang="en-US" smtClean="0"/>
               <a:pPr/>
-              <a:t>8/7/2024</a:t>
+              <a:t>8/10/2024</a:t>
             </a:fld>
             <a:endParaRPr lang="en-US"/>
           </a:p>
@@ -10409,7 +11595,7 @@
             <a:fld id="{1D8BD707-D9CF-40AE-B4C6-C98DA3205C09}" type="datetimeFigureOut">
               <a:rPr lang="en-US" smtClean="0"/>
               <a:pPr/>
-              <a:t>8/7/2024</a:t>
+              <a:t>8/10/2024</a:t>
             </a:fld>
             <a:endParaRPr lang="en-US"/>
           </a:p>
@@ -11287,7 +12473,7 @@
         <p:spPr>
           <a:xfrm>
             <a:off x="573658" y="2197422"/>
-            <a:ext cx="16858350" cy="3030093"/>
+            <a:ext cx="16858350" cy="2398092"/>
           </a:xfrm>
           <a:prstGeom prst="rect">
             <a:avLst/>
@@ -11314,7 +12500,7 @@
                 <a:cs typeface="Times New Roman Bold"/>
                 <a:sym typeface="Times New Roman Bold"/>
               </a:rPr>
-              <a:t>OPTIMIZING RESOURCE ALLOCATION IN MULTI-ACCESS EDGE COMPUTING FOR 5G NETWORKS USING ADVANCED MACHINE LEARNING TECHNIQUES</a:t>
+              <a:t>OPTIMIZING RESOURCE ALLOCATION FOR 5G NETWORKS USING ADVANCED MACHINE LEARNING TECHNIQUES</a:t>
             </a:r>
           </a:p>
           <a:p>
@@ -24107,7 +25293,7 @@
                 <a:cs typeface="Times New Roman"/>
                 <a:sym typeface="Times New Roman"/>
               </a:rPr>
-              <a:t>Model Comparison</a:t>
+              <a:t>Regression models - Actual vs Predicted</a:t>
             </a:r>
           </a:p>
         </p:txBody>
@@ -24386,414 +25572,46 @@
           </p:spPr>
         </p:sp>
       </p:grpSp>
-      <p:sp>
-        <p:nvSpPr>
-          <p:cNvPr id="3" name="TextBox 7">
+      <p:pic>
+        <p:nvPicPr>
+          <p:cNvPr id="11" name="Picture 10">
             <a:extLst>
               <a:ext uri="{FF2B5EF4-FFF2-40B4-BE49-F238E27FC236}">
-                <a16:creationId xmlns:a16="http://schemas.microsoft.com/office/drawing/2014/main" id="{62FA5441-5544-AF7F-ECA8-E56B5E8D0889}"/>
+                <a16:creationId xmlns:a16="http://schemas.microsoft.com/office/drawing/2014/main" id="{85B039C8-228A-0813-AB52-AEF046826C7C}"/>
               </a:ext>
             </a:extLst>
           </p:cNvPr>
-          <p:cNvSpPr txBox="1"/>
+          <p:cNvPicPr>
+            <a:picLocks noChangeAspect="1"/>
+          </p:cNvPicPr>
           <p:nvPr/>
-        </p:nvSpPr>
+        </p:nvPicPr>
+        <p:blipFill>
+          <a:blip r:embed="rId3">
+            <a:extLst>
+              <a:ext uri="{28A0092B-C50C-407E-A947-70E740481C1C}">
+                <a14:useLocalDpi xmlns:a14="http://schemas.microsoft.com/office/drawing/2010/main" val="0"/>
+              </a:ext>
+            </a:extLst>
+          </a:blip>
+          <a:stretch>
+            <a:fillRect/>
+          </a:stretch>
+        </p:blipFill>
         <p:spPr>
           <a:xfrm>
-            <a:off x="1617127" y="3009900"/>
-            <a:ext cx="7543800" cy="6385851"/>
+            <a:off x="1905000" y="2338225"/>
+            <a:ext cx="14782800" cy="7391400"/>
           </a:xfrm>
           <a:prstGeom prst="rect">
             <a:avLst/>
           </a:prstGeom>
         </p:spPr>
-        <p:txBody>
-          <a:bodyPr wrap="square" lIns="0" tIns="0" rIns="0" bIns="0" rtlCol="0" anchor="t">
-            <a:spAutoFit/>
-          </a:bodyPr>
-          <a:lstStyle/>
-          <a:p>
-            <a:pPr marL="356235" lvl="1" algn="l">
-              <a:lnSpc>
-                <a:spcPct val="150000"/>
-              </a:lnSpc>
-            </a:pPr>
-            <a:r>
-              <a:rPr lang="en-US" sz="2800" b="1" dirty="0">
-                <a:solidFill>
-                  <a:srgbClr val="000000"/>
-                </a:solidFill>
-                <a:latin typeface="Times New Roman"/>
-                <a:ea typeface="Times New Roman"/>
-                <a:cs typeface="Times New Roman"/>
-                <a:sym typeface="Times New Roman"/>
-              </a:rPr>
-              <a:t>Regression models used :</a:t>
-            </a:r>
-          </a:p>
-          <a:p>
-            <a:pPr marL="870585" lvl="1" indent="-514350" algn="l">
-              <a:lnSpc>
-                <a:spcPct val="150000"/>
-              </a:lnSpc>
-              <a:buFont typeface="+mj-lt"/>
-              <a:buAutoNum type="arabicPeriod"/>
-            </a:pPr>
-            <a:r>
-              <a:rPr lang="en-US" sz="2800" dirty="0">
-                <a:solidFill>
-                  <a:srgbClr val="000000"/>
-                </a:solidFill>
-                <a:latin typeface="Times New Roman"/>
-                <a:ea typeface="Times New Roman"/>
-                <a:cs typeface="Times New Roman"/>
-                <a:sym typeface="Times New Roman"/>
-              </a:rPr>
-              <a:t>Liner regression</a:t>
-            </a:r>
-          </a:p>
-          <a:p>
-            <a:pPr marL="870585" lvl="1" indent="-514350" algn="l">
-              <a:lnSpc>
-                <a:spcPct val="150000"/>
-              </a:lnSpc>
-              <a:buFont typeface="+mj-lt"/>
-              <a:buAutoNum type="arabicPeriod"/>
-            </a:pPr>
-            <a:r>
-              <a:rPr lang="en-US" sz="2800" dirty="0">
-                <a:solidFill>
-                  <a:srgbClr val="000000"/>
-                </a:solidFill>
-                <a:latin typeface="Times New Roman"/>
-                <a:ea typeface="Times New Roman"/>
-                <a:cs typeface="Times New Roman"/>
-                <a:sym typeface="Times New Roman"/>
-              </a:rPr>
-              <a:t>Lasso regression</a:t>
-            </a:r>
-          </a:p>
-          <a:p>
-            <a:pPr marL="870585" lvl="1" indent="-514350" algn="l">
-              <a:lnSpc>
-                <a:spcPct val="150000"/>
-              </a:lnSpc>
-              <a:buFont typeface="+mj-lt"/>
-              <a:buAutoNum type="arabicPeriod"/>
-            </a:pPr>
-            <a:r>
-              <a:rPr lang="en-US" sz="2800" dirty="0">
-                <a:solidFill>
-                  <a:srgbClr val="000000"/>
-                </a:solidFill>
-                <a:latin typeface="Times New Roman"/>
-                <a:ea typeface="Times New Roman"/>
-                <a:cs typeface="Times New Roman"/>
-                <a:sym typeface="Times New Roman"/>
-              </a:rPr>
-              <a:t>Ridge regression</a:t>
-            </a:r>
-          </a:p>
-          <a:p>
-            <a:pPr marL="870585" lvl="1" indent="-514350" algn="l">
-              <a:lnSpc>
-                <a:spcPct val="150000"/>
-              </a:lnSpc>
-              <a:buFont typeface="+mj-lt"/>
-              <a:buAutoNum type="arabicPeriod"/>
-            </a:pPr>
-            <a:r>
-              <a:rPr lang="en-US" sz="2800" dirty="0">
-                <a:solidFill>
-                  <a:srgbClr val="000000"/>
-                </a:solidFill>
-                <a:latin typeface="Times New Roman"/>
-                <a:ea typeface="Times New Roman"/>
-                <a:cs typeface="Times New Roman"/>
-                <a:sym typeface="Times New Roman"/>
-              </a:rPr>
-              <a:t>Decision tree</a:t>
-            </a:r>
-          </a:p>
-          <a:p>
-            <a:pPr marL="870585" lvl="1" indent="-514350" algn="l">
-              <a:lnSpc>
-                <a:spcPct val="150000"/>
-              </a:lnSpc>
-              <a:buFont typeface="+mj-lt"/>
-              <a:buAutoNum type="arabicPeriod"/>
-            </a:pPr>
-            <a:r>
-              <a:rPr lang="en-US" sz="2800" dirty="0">
-                <a:solidFill>
-                  <a:srgbClr val="000000"/>
-                </a:solidFill>
-                <a:latin typeface="Times New Roman"/>
-                <a:ea typeface="Times New Roman"/>
-                <a:cs typeface="Times New Roman"/>
-                <a:sym typeface="Times New Roman"/>
-              </a:rPr>
-              <a:t>Random forest</a:t>
-            </a:r>
-          </a:p>
-          <a:p>
-            <a:pPr marL="870585" lvl="1" indent="-514350" algn="l">
-              <a:lnSpc>
-                <a:spcPct val="150000"/>
-              </a:lnSpc>
-              <a:buFont typeface="+mj-lt"/>
-              <a:buAutoNum type="arabicPeriod"/>
-            </a:pPr>
-            <a:r>
-              <a:rPr lang="en-US" sz="2800" dirty="0">
-                <a:solidFill>
-                  <a:srgbClr val="000000"/>
-                </a:solidFill>
-                <a:latin typeface="Times New Roman"/>
-                <a:ea typeface="Times New Roman"/>
-                <a:cs typeface="Times New Roman"/>
-                <a:sym typeface="Times New Roman"/>
-              </a:rPr>
-              <a:t>Gradient boosting</a:t>
-            </a:r>
-          </a:p>
-          <a:p>
-            <a:pPr marL="870585" lvl="1" indent="-514350" algn="l">
-              <a:lnSpc>
-                <a:spcPct val="150000"/>
-              </a:lnSpc>
-              <a:buFont typeface="+mj-lt"/>
-              <a:buAutoNum type="arabicPeriod"/>
-            </a:pPr>
-            <a:r>
-              <a:rPr lang="en-US" sz="2800" dirty="0">
-                <a:solidFill>
-                  <a:srgbClr val="000000"/>
-                </a:solidFill>
-                <a:latin typeface="Times New Roman"/>
-                <a:ea typeface="Times New Roman"/>
-                <a:cs typeface="Times New Roman"/>
-                <a:sym typeface="Times New Roman"/>
-              </a:rPr>
-              <a:t>Support vector machine</a:t>
-            </a:r>
-          </a:p>
-          <a:p>
-            <a:pPr marL="870585" lvl="1" indent="-514350" algn="l">
-              <a:lnSpc>
-                <a:spcPct val="150000"/>
-              </a:lnSpc>
-              <a:buFont typeface="+mj-lt"/>
-              <a:buAutoNum type="arabicPeriod"/>
-            </a:pPr>
-            <a:r>
-              <a:rPr lang="en-US" sz="2800" dirty="0">
-                <a:solidFill>
-                  <a:srgbClr val="000000"/>
-                </a:solidFill>
-                <a:latin typeface="Times New Roman"/>
-                <a:ea typeface="Times New Roman"/>
-                <a:cs typeface="Times New Roman"/>
-                <a:sym typeface="Times New Roman"/>
-              </a:rPr>
-              <a:t>Polynomial regression</a:t>
-            </a:r>
-          </a:p>
-          <a:p>
-            <a:pPr algn="ctr">
-              <a:lnSpc>
-                <a:spcPct val="150000"/>
-              </a:lnSpc>
-            </a:pPr>
-            <a:endParaRPr lang="en-US" sz="2800" dirty="0">
-              <a:solidFill>
-                <a:srgbClr val="000000"/>
-              </a:solidFill>
-              <a:latin typeface="Times New Roman"/>
-              <a:ea typeface="Times New Roman"/>
-              <a:cs typeface="Times New Roman"/>
-              <a:sym typeface="Times New Roman"/>
-            </a:endParaRPr>
-          </a:p>
-        </p:txBody>
-      </p:sp>
-      <p:sp>
-        <p:nvSpPr>
-          <p:cNvPr id="7" name="TextBox 7">
-            <a:extLst>
-              <a:ext uri="{FF2B5EF4-FFF2-40B4-BE49-F238E27FC236}">
-                <a16:creationId xmlns:a16="http://schemas.microsoft.com/office/drawing/2014/main" id="{0AA4883A-F585-FC40-94E8-ABFEF1794BC2}"/>
-              </a:ext>
-            </a:extLst>
-          </p:cNvPr>
-          <p:cNvSpPr txBox="1"/>
-          <p:nvPr/>
-        </p:nvSpPr>
-        <p:spPr>
-          <a:xfrm>
-            <a:off x="9813291" y="3086100"/>
-            <a:ext cx="7543800" cy="4446858"/>
-          </a:xfrm>
-          <a:prstGeom prst="rect">
-            <a:avLst/>
-          </a:prstGeom>
-        </p:spPr>
-        <p:txBody>
-          <a:bodyPr wrap="square" lIns="0" tIns="0" rIns="0" bIns="0" rtlCol="0" anchor="t">
-            <a:spAutoFit/>
-          </a:bodyPr>
-          <a:lstStyle/>
-          <a:p>
-            <a:pPr marL="356235" lvl="1" algn="l">
-              <a:lnSpc>
-                <a:spcPct val="150000"/>
-              </a:lnSpc>
-            </a:pPr>
-            <a:r>
-              <a:rPr lang="en-US" sz="2800" b="1" dirty="0">
-                <a:solidFill>
-                  <a:srgbClr val="000000"/>
-                </a:solidFill>
-                <a:latin typeface="Times New Roman"/>
-                <a:ea typeface="Times New Roman"/>
-                <a:cs typeface="Times New Roman"/>
-                <a:sym typeface="Times New Roman"/>
-              </a:rPr>
-              <a:t>Metrics compared:</a:t>
-            </a:r>
-          </a:p>
-          <a:p>
-            <a:pPr marL="870585" lvl="1" indent="-514350" algn="l">
-              <a:lnSpc>
-                <a:spcPct val="150000"/>
-              </a:lnSpc>
-              <a:buFont typeface="+mj-lt"/>
-              <a:buAutoNum type="arabicPeriod"/>
-            </a:pPr>
-            <a:r>
-              <a:rPr lang="en-US" sz="2800" dirty="0">
-                <a:solidFill>
-                  <a:srgbClr val="000000"/>
-                </a:solidFill>
-                <a:latin typeface="Times New Roman"/>
-                <a:ea typeface="Times New Roman"/>
-                <a:cs typeface="Times New Roman"/>
-                <a:sym typeface="Times New Roman"/>
-              </a:rPr>
-              <a:t>MSE: Mean Squared Error</a:t>
-            </a:r>
-          </a:p>
-          <a:p>
-            <a:pPr marL="870585" lvl="1" indent="-514350" algn="l">
-              <a:lnSpc>
-                <a:spcPct val="150000"/>
-              </a:lnSpc>
-              <a:buFont typeface="+mj-lt"/>
-              <a:buAutoNum type="arabicPeriod"/>
-            </a:pPr>
-            <a:r>
-              <a:rPr lang="en-US" sz="2800" dirty="0">
-                <a:solidFill>
-                  <a:srgbClr val="000000"/>
-                </a:solidFill>
-                <a:latin typeface="Times New Roman"/>
-                <a:ea typeface="Times New Roman"/>
-                <a:cs typeface="Times New Roman"/>
-                <a:sym typeface="Times New Roman"/>
-              </a:rPr>
-              <a:t>RMSE: Root Mean Squared Error</a:t>
-            </a:r>
-          </a:p>
-          <a:p>
-            <a:pPr marL="870585" lvl="1" indent="-514350" algn="l">
-              <a:lnSpc>
-                <a:spcPct val="150000"/>
-              </a:lnSpc>
-              <a:buFont typeface="+mj-lt"/>
-              <a:buAutoNum type="arabicPeriod"/>
-            </a:pPr>
-            <a:r>
-              <a:rPr lang="en-US" sz="2800" dirty="0">
-                <a:solidFill>
-                  <a:srgbClr val="000000"/>
-                </a:solidFill>
-                <a:latin typeface="Times New Roman"/>
-                <a:ea typeface="Times New Roman"/>
-                <a:cs typeface="Times New Roman"/>
-                <a:sym typeface="Times New Roman"/>
-              </a:rPr>
-              <a:t>R2: R-Squared</a:t>
-            </a:r>
-          </a:p>
-          <a:p>
-            <a:pPr marL="870585" lvl="1" indent="-514350" algn="l">
-              <a:lnSpc>
-                <a:spcPct val="150000"/>
-              </a:lnSpc>
-              <a:buFont typeface="+mj-lt"/>
-              <a:buAutoNum type="arabicPeriod"/>
-            </a:pPr>
-            <a:r>
-              <a:rPr lang="en-US" sz="2800" dirty="0">
-                <a:solidFill>
-                  <a:srgbClr val="000000"/>
-                </a:solidFill>
-                <a:latin typeface="Times New Roman"/>
-                <a:ea typeface="Times New Roman"/>
-                <a:cs typeface="Times New Roman"/>
-                <a:sym typeface="Times New Roman"/>
-              </a:rPr>
-              <a:t>Adjusted R2: Adjusted R-Squared</a:t>
-            </a:r>
-          </a:p>
-          <a:p>
-            <a:pPr marL="870585" lvl="1" indent="-514350" algn="l">
-              <a:lnSpc>
-                <a:spcPct val="150000"/>
-              </a:lnSpc>
-              <a:buFont typeface="+mj-lt"/>
-              <a:buAutoNum type="arabicPeriod"/>
-            </a:pPr>
-            <a:r>
-              <a:rPr lang="en-US" sz="2800" dirty="0">
-                <a:solidFill>
-                  <a:srgbClr val="000000"/>
-                </a:solidFill>
-                <a:latin typeface="Times New Roman"/>
-                <a:ea typeface="Times New Roman"/>
-                <a:cs typeface="Times New Roman"/>
-                <a:sym typeface="Times New Roman"/>
-              </a:rPr>
-              <a:t>MAPE: Mean Absolute Percentage Error</a:t>
-            </a:r>
-          </a:p>
-          <a:p>
-            <a:pPr marL="870585" lvl="1" indent="-514350" algn="l">
-              <a:lnSpc>
-                <a:spcPct val="150000"/>
-              </a:lnSpc>
-              <a:buFont typeface="+mj-lt"/>
-              <a:buAutoNum type="arabicPeriod"/>
-            </a:pPr>
-            <a:r>
-              <a:rPr lang="en-US" sz="2800" dirty="0">
-                <a:solidFill>
-                  <a:srgbClr val="000000"/>
-                </a:solidFill>
-                <a:latin typeface="Times New Roman"/>
-                <a:ea typeface="Times New Roman"/>
-                <a:cs typeface="Times New Roman"/>
-                <a:sym typeface="Times New Roman"/>
-              </a:rPr>
-              <a:t>MAE: Mean Absolute Error</a:t>
-            </a:r>
-          </a:p>
-        </p:txBody>
-      </p:sp>
+      </p:pic>
     </p:spTree>
     <p:extLst>
       <p:ext uri="{BB962C8B-B14F-4D97-AF65-F5344CB8AC3E}">
-        <p14:creationId xmlns:p14="http://schemas.microsoft.com/office/powerpoint/2010/main" val="3426263962"/>
+        <p14:creationId xmlns:p14="http://schemas.microsoft.com/office/powerpoint/2010/main" val="2540996004"/>
       </p:ext>
     </p:extLst>
   </p:cSld>
@@ -24856,7 +25674,7 @@
                 <a:cs typeface="Times New Roman"/>
                 <a:sym typeface="Times New Roman"/>
               </a:rPr>
-              <a:t>Model Comparison – Actual vs Predicted</a:t>
+              <a:t>Regression models – Metric comparison</a:t>
             </a:r>
           </a:p>
         </p:txBody>
@@ -25137,10 +25955,10 @@
       </p:grpSp>
       <p:pic>
         <p:nvPicPr>
-          <p:cNvPr id="13" name="Picture 12">
+          <p:cNvPr id="7" name="Picture 6">
             <a:extLst>
               <a:ext uri="{FF2B5EF4-FFF2-40B4-BE49-F238E27FC236}">
-                <a16:creationId xmlns:a16="http://schemas.microsoft.com/office/drawing/2014/main" id="{CFE1C020-3E64-3BAE-088F-FE2CDAC0C07B}"/>
+                <a16:creationId xmlns:a16="http://schemas.microsoft.com/office/drawing/2014/main" id="{841D2B3C-BDEC-151C-93A3-8A73553A737B}"/>
               </a:ext>
             </a:extLst>
           </p:cNvPr>
@@ -25163,8 +25981,8 @@
         </p:blipFill>
         <p:spPr>
           <a:xfrm>
-            <a:off x="1219200" y="2154421"/>
-            <a:ext cx="15468600" cy="7734300"/>
+            <a:off x="647625" y="2401607"/>
+            <a:ext cx="17026604" cy="7094418"/>
           </a:xfrm>
           <a:prstGeom prst="rect">
             <a:avLst/>
@@ -25174,7 +25992,7 @@
     </p:spTree>
     <p:extLst>
       <p:ext uri="{BB962C8B-B14F-4D97-AF65-F5344CB8AC3E}">
-        <p14:creationId xmlns:p14="http://schemas.microsoft.com/office/powerpoint/2010/main" val="3510780241"/>
+        <p14:creationId xmlns:p14="http://schemas.microsoft.com/office/powerpoint/2010/main" val="3755169604"/>
       </p:ext>
     </p:extLst>
   </p:cSld>
@@ -25201,42 +26019,6 @@
           <a:chExt cx="0" cy="0"/>
         </a:xfrm>
       </p:grpSpPr>
-      <p:pic>
-        <p:nvPicPr>
-          <p:cNvPr id="12" name="Picture 11">
-            <a:extLst>
-              <a:ext uri="{FF2B5EF4-FFF2-40B4-BE49-F238E27FC236}">
-                <a16:creationId xmlns:a16="http://schemas.microsoft.com/office/drawing/2014/main" id="{0F2C762C-ADEE-66F7-FB0D-AD31B9251A47}"/>
-              </a:ext>
-            </a:extLst>
-          </p:cNvPr>
-          <p:cNvPicPr>
-            <a:picLocks noChangeAspect="1"/>
-          </p:cNvPicPr>
-          <p:nvPr/>
-        </p:nvPicPr>
-        <p:blipFill>
-          <a:blip r:embed="rId3">
-            <a:extLst>
-              <a:ext uri="{28A0092B-C50C-407E-A947-70E740481C1C}">
-                <a14:useLocalDpi xmlns:a14="http://schemas.microsoft.com/office/drawing/2010/main" val="0"/>
-              </a:ext>
-            </a:extLst>
-          </a:blip>
-          <a:stretch>
-            <a:fillRect/>
-          </a:stretch>
-        </p:blipFill>
-        <p:spPr>
-          <a:xfrm>
-            <a:off x="304800" y="2110637"/>
-            <a:ext cx="17724931" cy="7385388"/>
-          </a:xfrm>
-          <a:prstGeom prst="rect">
-            <a:avLst/>
-          </a:prstGeom>
-        </p:spPr>
-      </p:pic>
       <p:sp>
         <p:nvSpPr>
           <p:cNvPr id="2" name="TextBox 2"/>
@@ -25273,7 +26055,7 @@
                 <a:cs typeface="Times New Roman"/>
                 <a:sym typeface="Times New Roman"/>
               </a:rPr>
-              <a:t>Model Comparison – Metrics Comparison</a:t>
+              <a:t>Tree based models– Actual vs Predicted</a:t>
             </a:r>
           </a:p>
         </p:txBody>
@@ -25552,10 +26334,46 @@
           </p:spPr>
         </p:sp>
       </p:grpSp>
+      <p:pic>
+        <p:nvPicPr>
+          <p:cNvPr id="12" name="Picture 11">
+            <a:extLst>
+              <a:ext uri="{FF2B5EF4-FFF2-40B4-BE49-F238E27FC236}">
+                <a16:creationId xmlns:a16="http://schemas.microsoft.com/office/drawing/2014/main" id="{0B6EEADD-72B3-3519-ADC7-36E5B9871BD4}"/>
+              </a:ext>
+            </a:extLst>
+          </p:cNvPr>
+          <p:cNvPicPr>
+            <a:picLocks noChangeAspect="1"/>
+          </p:cNvPicPr>
+          <p:nvPr/>
+        </p:nvPicPr>
+        <p:blipFill>
+          <a:blip r:embed="rId3">
+            <a:extLst>
+              <a:ext uri="{28A0092B-C50C-407E-A947-70E740481C1C}">
+                <a14:useLocalDpi xmlns:a14="http://schemas.microsoft.com/office/drawing/2010/main" val="0"/>
+              </a:ext>
+            </a:extLst>
+          </a:blip>
+          <a:stretch>
+            <a:fillRect/>
+          </a:stretch>
+        </p:blipFill>
+        <p:spPr>
+          <a:xfrm>
+            <a:off x="1524000" y="3763107"/>
+            <a:ext cx="15706892" cy="3926723"/>
+          </a:xfrm>
+          <a:prstGeom prst="rect">
+            <a:avLst/>
+          </a:prstGeom>
+        </p:spPr>
+      </p:pic>
     </p:spTree>
     <p:extLst>
       <p:ext uri="{BB962C8B-B14F-4D97-AF65-F5344CB8AC3E}">
-        <p14:creationId xmlns:p14="http://schemas.microsoft.com/office/powerpoint/2010/main" val="3257773676"/>
+        <p14:creationId xmlns:p14="http://schemas.microsoft.com/office/powerpoint/2010/main" val="1900732085"/>
       </p:ext>
     </p:extLst>
   </p:cSld>
@@ -25618,7 +26436,7 @@
                 <a:cs typeface="Times New Roman"/>
                 <a:sym typeface="Times New Roman"/>
               </a:rPr>
-              <a:t>Model Comparison – Best performance</a:t>
+              <a:t>Tree based models – Metrics Comparison</a:t>
             </a:r>
           </a:p>
         </p:txBody>
@@ -25899,10 +26717,10 @@
       </p:grpSp>
       <p:pic>
         <p:nvPicPr>
-          <p:cNvPr id="7" name="Picture 6">
+          <p:cNvPr id="10" name="Picture 9">
             <a:extLst>
               <a:ext uri="{FF2B5EF4-FFF2-40B4-BE49-F238E27FC236}">
-                <a16:creationId xmlns:a16="http://schemas.microsoft.com/office/drawing/2014/main" id="{BD92570C-D608-E3CB-9834-22B25AE17F18}"/>
+                <a16:creationId xmlns:a16="http://schemas.microsoft.com/office/drawing/2014/main" id="{5C2CB2DD-3D50-53EB-2B26-44F4BDCF5DB3}"/>
               </a:ext>
             </a:extLst>
           </p:cNvPr>
@@ -25925,8 +26743,8 @@
         </p:blipFill>
         <p:spPr>
           <a:xfrm>
-            <a:off x="2362200" y="2310819"/>
-            <a:ext cx="13743456" cy="7176304"/>
+            <a:off x="1143000" y="2705100"/>
+            <a:ext cx="15544800" cy="6477000"/>
           </a:xfrm>
           <a:prstGeom prst="rect">
             <a:avLst/>
@@ -25936,7 +26754,7 @@
     </p:spTree>
     <p:extLst>
       <p:ext uri="{BB962C8B-B14F-4D97-AF65-F5344CB8AC3E}">
-        <p14:creationId xmlns:p14="http://schemas.microsoft.com/office/powerpoint/2010/main" val="262112687"/>
+        <p14:creationId xmlns:p14="http://schemas.microsoft.com/office/powerpoint/2010/main" val="3257773676"/>
       </p:ext>
     </p:extLst>
   </p:cSld>
@@ -25999,7 +26817,7 @@
                 <a:cs typeface="Times New Roman"/>
                 <a:sym typeface="Times New Roman"/>
               </a:rPr>
-              <a:t>Model Comparison – HGBRT</a:t>
+              <a:t>Boosting models– Actual vs Predicted</a:t>
             </a:r>
           </a:p>
         </p:txBody>
@@ -26278,6 +27096,1524 @@
           </p:spPr>
         </p:sp>
       </p:grpSp>
+      <p:pic>
+        <p:nvPicPr>
+          <p:cNvPr id="17" name="Picture 16">
+            <a:extLst>
+              <a:ext uri="{FF2B5EF4-FFF2-40B4-BE49-F238E27FC236}">
+                <a16:creationId xmlns:a16="http://schemas.microsoft.com/office/drawing/2014/main" id="{675C865C-0F79-AEE4-2024-7A5E0A52D260}"/>
+              </a:ext>
+            </a:extLst>
+          </p:cNvPr>
+          <p:cNvPicPr>
+            <a:picLocks noChangeAspect="1"/>
+          </p:cNvPicPr>
+          <p:nvPr/>
+        </p:nvPicPr>
+        <p:blipFill>
+          <a:blip r:embed="rId3">
+            <a:extLst>
+              <a:ext uri="{28A0092B-C50C-407E-A947-70E740481C1C}">
+                <a14:useLocalDpi xmlns:a14="http://schemas.microsoft.com/office/drawing/2010/main" val="0"/>
+              </a:ext>
+            </a:extLst>
+          </a:blip>
+          <a:stretch>
+            <a:fillRect/>
+          </a:stretch>
+        </p:blipFill>
+        <p:spPr>
+          <a:xfrm>
+            <a:off x="647625" y="3363242"/>
+            <a:ext cx="17145000" cy="4286250"/>
+          </a:xfrm>
+          <a:prstGeom prst="rect">
+            <a:avLst/>
+          </a:prstGeom>
+        </p:spPr>
+      </p:pic>
+    </p:spTree>
+    <p:extLst>
+      <p:ext uri="{BB962C8B-B14F-4D97-AF65-F5344CB8AC3E}">
+        <p14:creationId xmlns:p14="http://schemas.microsoft.com/office/powerpoint/2010/main" val="3503454125"/>
+      </p:ext>
+    </p:extLst>
+  </p:cSld>
+  <p:clrMapOvr>
+    <a:masterClrMapping/>
+  </p:clrMapOvr>
+</p:sld>
+</file>
+
+<file path=ppt/slides/slide26.xml><?xml version="1.0" encoding="utf-8"?>
+<p:sld xmlns:a="http://schemas.openxmlformats.org/drawingml/2006/main" xmlns:r="http://schemas.openxmlformats.org/officeDocument/2006/relationships" xmlns:p="http://schemas.openxmlformats.org/presentationml/2006/main">
+  <p:cSld>
+    <p:spTree>
+      <p:nvGrpSpPr>
+        <p:cNvPr id="1" name=""/>
+        <p:cNvGrpSpPr/>
+        <p:nvPr/>
+      </p:nvGrpSpPr>
+      <p:grpSpPr>
+        <a:xfrm>
+          <a:off x="0" y="0"/>
+          <a:ext cx="0" cy="0"/>
+          <a:chOff x="0" y="0"/>
+          <a:chExt cx="0" cy="0"/>
+        </a:xfrm>
+      </p:grpSpPr>
+      <p:sp>
+        <p:nvSpPr>
+          <p:cNvPr id="2" name="TextBox 2"/>
+          <p:cNvSpPr txBox="1"/>
+          <p:nvPr/>
+        </p:nvSpPr>
+        <p:spPr>
+          <a:xfrm>
+            <a:off x="714825" y="843292"/>
+            <a:ext cx="16858350" cy="746615"/>
+          </a:xfrm>
+          <a:prstGeom prst="rect">
+            <a:avLst/>
+          </a:prstGeom>
+        </p:spPr>
+        <p:txBody>
+          <a:bodyPr lIns="0" tIns="0" rIns="0" bIns="0" rtlCol="0" anchor="t">
+            <a:spAutoFit/>
+          </a:bodyPr>
+          <a:lstStyle/>
+          <a:p>
+            <a:pPr algn="l">
+              <a:lnSpc>
+                <a:spcPts val="6220"/>
+              </a:lnSpc>
+            </a:pPr>
+            <a:r>
+              <a:rPr lang="en-US" sz="5000" dirty="0">
+                <a:solidFill>
+                  <a:srgbClr val="FF0000"/>
+                </a:solidFill>
+                <a:latin typeface="Times New Roman"/>
+                <a:ea typeface="Times New Roman"/>
+                <a:cs typeface="Times New Roman"/>
+                <a:sym typeface="Times New Roman"/>
+              </a:rPr>
+              <a:t>Boosting models – Metrics Comparison</a:t>
+            </a:r>
+          </a:p>
+        </p:txBody>
+      </p:sp>
+      <p:grpSp>
+        <p:nvGrpSpPr>
+          <p:cNvPr id="4" name="Group 4"/>
+          <p:cNvGrpSpPr/>
+          <p:nvPr/>
+        </p:nvGrpSpPr>
+        <p:grpSpPr>
+          <a:xfrm>
+            <a:off x="647625" y="2012475"/>
+            <a:ext cx="17026650" cy="52650"/>
+            <a:chOff x="0" y="0"/>
+            <a:chExt cx="22702200" cy="70200"/>
+          </a:xfrm>
+        </p:grpSpPr>
+        <p:sp>
+          <p:nvSpPr>
+            <p:cNvPr id="5" name="Freeform 5"/>
+            <p:cNvSpPr/>
+            <p:nvPr/>
+          </p:nvSpPr>
+          <p:spPr>
+            <a:xfrm>
+              <a:off x="12700" y="12700"/>
+              <a:ext cx="22676738" cy="44831"/>
+            </a:xfrm>
+            <a:custGeom>
+              <a:avLst/>
+              <a:gdLst/>
+              <a:ahLst/>
+              <a:cxnLst/>
+              <a:rect l="l" t="t" r="r" b="b"/>
+              <a:pathLst>
+                <a:path w="22676738" h="44831">
+                  <a:moveTo>
+                    <a:pt x="0" y="0"/>
+                  </a:moveTo>
+                  <a:lnTo>
+                    <a:pt x="22676738" y="0"/>
+                  </a:lnTo>
+                  <a:lnTo>
+                    <a:pt x="22676738" y="44831"/>
+                  </a:lnTo>
+                  <a:lnTo>
+                    <a:pt x="0" y="44831"/>
+                  </a:lnTo>
+                  <a:close/>
+                </a:path>
+              </a:pathLst>
+            </a:custGeom>
+            <a:solidFill>
+              <a:srgbClr val="000000"/>
+            </a:solidFill>
+          </p:spPr>
+        </p:sp>
+        <p:sp>
+          <p:nvSpPr>
+            <p:cNvPr id="6" name="Freeform 6"/>
+            <p:cNvSpPr/>
+            <p:nvPr/>
+          </p:nvSpPr>
+          <p:spPr>
+            <a:xfrm>
+              <a:off x="0" y="0"/>
+              <a:ext cx="22702138" cy="70231"/>
+            </a:xfrm>
+            <a:custGeom>
+              <a:avLst/>
+              <a:gdLst/>
+              <a:ahLst/>
+              <a:cxnLst/>
+              <a:rect l="l" t="t" r="r" b="b"/>
+              <a:pathLst>
+                <a:path w="22702138" h="70231">
+                  <a:moveTo>
+                    <a:pt x="12700" y="0"/>
+                  </a:moveTo>
+                  <a:lnTo>
+                    <a:pt x="22689438" y="0"/>
+                  </a:lnTo>
+                  <a:cubicBezTo>
+                    <a:pt x="22696424" y="0"/>
+                    <a:pt x="22702138" y="5715"/>
+                    <a:pt x="22702138" y="12700"/>
+                  </a:cubicBezTo>
+                  <a:lnTo>
+                    <a:pt x="22702138" y="57531"/>
+                  </a:lnTo>
+                  <a:cubicBezTo>
+                    <a:pt x="22702138" y="64516"/>
+                    <a:pt x="22696424" y="70231"/>
+                    <a:pt x="22689438" y="70231"/>
+                  </a:cubicBezTo>
+                  <a:lnTo>
+                    <a:pt x="12700" y="70231"/>
+                  </a:lnTo>
+                  <a:cubicBezTo>
+                    <a:pt x="5715" y="70231"/>
+                    <a:pt x="0" y="64516"/>
+                    <a:pt x="0" y="57531"/>
+                  </a:cubicBezTo>
+                  <a:lnTo>
+                    <a:pt x="0" y="12700"/>
+                  </a:lnTo>
+                  <a:cubicBezTo>
+                    <a:pt x="0" y="5715"/>
+                    <a:pt x="5715" y="0"/>
+                    <a:pt x="12700" y="0"/>
+                  </a:cubicBezTo>
+                  <a:moveTo>
+                    <a:pt x="12700" y="25400"/>
+                  </a:moveTo>
+                  <a:lnTo>
+                    <a:pt x="12700" y="12700"/>
+                  </a:lnTo>
+                  <a:lnTo>
+                    <a:pt x="25400" y="12700"/>
+                  </a:lnTo>
+                  <a:lnTo>
+                    <a:pt x="25400" y="57531"/>
+                  </a:lnTo>
+                  <a:lnTo>
+                    <a:pt x="12700" y="57531"/>
+                  </a:lnTo>
+                  <a:lnTo>
+                    <a:pt x="12700" y="44831"/>
+                  </a:lnTo>
+                  <a:lnTo>
+                    <a:pt x="22689438" y="44831"/>
+                  </a:lnTo>
+                  <a:lnTo>
+                    <a:pt x="22689438" y="57531"/>
+                  </a:lnTo>
+                  <a:lnTo>
+                    <a:pt x="22676738" y="57531"/>
+                  </a:lnTo>
+                  <a:lnTo>
+                    <a:pt x="22676738" y="12700"/>
+                  </a:lnTo>
+                  <a:lnTo>
+                    <a:pt x="22689438" y="12700"/>
+                  </a:lnTo>
+                  <a:lnTo>
+                    <a:pt x="22689438" y="25400"/>
+                  </a:lnTo>
+                  <a:lnTo>
+                    <a:pt x="12700" y="25400"/>
+                  </a:lnTo>
+                  <a:close/>
+                </a:path>
+              </a:pathLst>
+            </a:custGeom>
+            <a:solidFill>
+              <a:srgbClr val="595959"/>
+            </a:solidFill>
+          </p:spPr>
+        </p:sp>
+      </p:grpSp>
+      <p:grpSp>
+        <p:nvGrpSpPr>
+          <p:cNvPr id="8" name="Group 8"/>
+          <p:cNvGrpSpPr/>
+          <p:nvPr/>
+        </p:nvGrpSpPr>
+        <p:grpSpPr>
+          <a:xfrm>
+            <a:off x="295499" y="284250"/>
+            <a:ext cx="17730900" cy="9718500"/>
+            <a:chOff x="0" y="0"/>
+            <a:chExt cx="23641200" cy="12958000"/>
+          </a:xfrm>
+        </p:grpSpPr>
+        <p:sp>
+          <p:nvSpPr>
+            <p:cNvPr id="9" name="Freeform 9"/>
+            <p:cNvSpPr/>
+            <p:nvPr/>
+          </p:nvSpPr>
+          <p:spPr>
+            <a:xfrm>
+              <a:off x="0" y="0"/>
+              <a:ext cx="23641177" cy="12957937"/>
+            </a:xfrm>
+            <a:custGeom>
+              <a:avLst/>
+              <a:gdLst/>
+              <a:ahLst/>
+              <a:cxnLst/>
+              <a:rect l="l" t="t" r="r" b="b"/>
+              <a:pathLst>
+                <a:path w="23641177" h="12957937">
+                  <a:moveTo>
+                    <a:pt x="25400" y="0"/>
+                  </a:moveTo>
+                  <a:lnTo>
+                    <a:pt x="23615777" y="0"/>
+                  </a:lnTo>
+                  <a:cubicBezTo>
+                    <a:pt x="23629747" y="0"/>
+                    <a:pt x="23641177" y="11430"/>
+                    <a:pt x="23641177" y="25400"/>
+                  </a:cubicBezTo>
+                  <a:lnTo>
+                    <a:pt x="23641177" y="12932537"/>
+                  </a:lnTo>
+                  <a:cubicBezTo>
+                    <a:pt x="23641177" y="12946507"/>
+                    <a:pt x="23629747" y="12957937"/>
+                    <a:pt x="23615777" y="12957937"/>
+                  </a:cubicBezTo>
+                  <a:lnTo>
+                    <a:pt x="25400" y="12957937"/>
+                  </a:lnTo>
+                  <a:cubicBezTo>
+                    <a:pt x="11430" y="12957937"/>
+                    <a:pt x="0" y="12946507"/>
+                    <a:pt x="0" y="12932537"/>
+                  </a:cubicBezTo>
+                  <a:lnTo>
+                    <a:pt x="0" y="25400"/>
+                  </a:lnTo>
+                  <a:cubicBezTo>
+                    <a:pt x="0" y="11430"/>
+                    <a:pt x="11430" y="0"/>
+                    <a:pt x="25400" y="0"/>
+                  </a:cubicBezTo>
+                  <a:moveTo>
+                    <a:pt x="25400" y="50800"/>
+                  </a:moveTo>
+                  <a:lnTo>
+                    <a:pt x="25400" y="25400"/>
+                  </a:lnTo>
+                  <a:lnTo>
+                    <a:pt x="50800" y="25400"/>
+                  </a:lnTo>
+                  <a:lnTo>
+                    <a:pt x="50800" y="12932537"/>
+                  </a:lnTo>
+                  <a:lnTo>
+                    <a:pt x="25400" y="12932537"/>
+                  </a:lnTo>
+                  <a:lnTo>
+                    <a:pt x="25400" y="12907137"/>
+                  </a:lnTo>
+                  <a:lnTo>
+                    <a:pt x="23615777" y="12907137"/>
+                  </a:lnTo>
+                  <a:lnTo>
+                    <a:pt x="23615777" y="12932537"/>
+                  </a:lnTo>
+                  <a:lnTo>
+                    <a:pt x="23590377" y="12932537"/>
+                  </a:lnTo>
+                  <a:lnTo>
+                    <a:pt x="23590377" y="25400"/>
+                  </a:lnTo>
+                  <a:lnTo>
+                    <a:pt x="23615777" y="25400"/>
+                  </a:lnTo>
+                  <a:lnTo>
+                    <a:pt x="23615777" y="50800"/>
+                  </a:lnTo>
+                  <a:lnTo>
+                    <a:pt x="25400" y="50800"/>
+                  </a:lnTo>
+                  <a:close/>
+                </a:path>
+              </a:pathLst>
+            </a:custGeom>
+            <a:solidFill>
+              <a:srgbClr val="000000"/>
+            </a:solidFill>
+          </p:spPr>
+        </p:sp>
+      </p:grpSp>
+      <p:pic>
+        <p:nvPicPr>
+          <p:cNvPr id="11" name="Picture 10">
+            <a:extLst>
+              <a:ext uri="{FF2B5EF4-FFF2-40B4-BE49-F238E27FC236}">
+                <a16:creationId xmlns:a16="http://schemas.microsoft.com/office/drawing/2014/main" id="{DC67F66E-4718-1CE5-E531-4E29D54F58E8}"/>
+              </a:ext>
+            </a:extLst>
+          </p:cNvPr>
+          <p:cNvPicPr>
+            <a:picLocks noChangeAspect="1"/>
+          </p:cNvPicPr>
+          <p:nvPr/>
+        </p:nvPicPr>
+        <p:blipFill>
+          <a:blip r:embed="rId3">
+            <a:extLst>
+              <a:ext uri="{28A0092B-C50C-407E-A947-70E740481C1C}">
+                <a14:useLocalDpi xmlns:a14="http://schemas.microsoft.com/office/drawing/2010/main" val="0"/>
+              </a:ext>
+            </a:extLst>
+          </a:blip>
+          <a:stretch>
+            <a:fillRect/>
+          </a:stretch>
+        </p:blipFill>
+        <p:spPr>
+          <a:xfrm>
+            <a:off x="961575" y="2705100"/>
+            <a:ext cx="16611600" cy="6921500"/>
+          </a:xfrm>
+          <a:prstGeom prst="rect">
+            <a:avLst/>
+          </a:prstGeom>
+        </p:spPr>
+      </p:pic>
+    </p:spTree>
+    <p:extLst>
+      <p:ext uri="{BB962C8B-B14F-4D97-AF65-F5344CB8AC3E}">
+        <p14:creationId xmlns:p14="http://schemas.microsoft.com/office/powerpoint/2010/main" val="2448138101"/>
+      </p:ext>
+    </p:extLst>
+  </p:cSld>
+  <p:clrMapOvr>
+    <a:masterClrMapping/>
+  </p:clrMapOvr>
+</p:sld>
+</file>
+
+<file path=ppt/slides/slide27.xml><?xml version="1.0" encoding="utf-8"?>
+<p:sld xmlns:a="http://schemas.openxmlformats.org/drawingml/2006/main" xmlns:r="http://schemas.openxmlformats.org/officeDocument/2006/relationships" xmlns:p="http://schemas.openxmlformats.org/presentationml/2006/main">
+  <p:cSld>
+    <p:spTree>
+      <p:nvGrpSpPr>
+        <p:cNvPr id="1" name=""/>
+        <p:cNvGrpSpPr/>
+        <p:nvPr/>
+      </p:nvGrpSpPr>
+      <p:grpSpPr>
+        <a:xfrm>
+          <a:off x="0" y="0"/>
+          <a:ext cx="0" cy="0"/>
+          <a:chOff x="0" y="0"/>
+          <a:chExt cx="0" cy="0"/>
+        </a:xfrm>
+      </p:grpSpPr>
+      <p:sp>
+        <p:nvSpPr>
+          <p:cNvPr id="2" name="TextBox 2"/>
+          <p:cNvSpPr txBox="1"/>
+          <p:nvPr/>
+        </p:nvSpPr>
+        <p:spPr>
+          <a:xfrm>
+            <a:off x="714825" y="790975"/>
+            <a:ext cx="16858350" cy="746615"/>
+          </a:xfrm>
+          <a:prstGeom prst="rect">
+            <a:avLst/>
+          </a:prstGeom>
+        </p:spPr>
+        <p:txBody>
+          <a:bodyPr lIns="0" tIns="0" rIns="0" bIns="0" rtlCol="0" anchor="t">
+            <a:spAutoFit/>
+          </a:bodyPr>
+          <a:lstStyle/>
+          <a:p>
+            <a:pPr algn="l">
+              <a:lnSpc>
+                <a:spcPts val="6220"/>
+              </a:lnSpc>
+            </a:pPr>
+            <a:r>
+              <a:rPr lang="en-US" sz="5000" dirty="0">
+                <a:solidFill>
+                  <a:srgbClr val="FF0000"/>
+                </a:solidFill>
+                <a:latin typeface="Times New Roman"/>
+                <a:ea typeface="Times New Roman"/>
+                <a:cs typeface="Times New Roman"/>
+                <a:sym typeface="Times New Roman"/>
+              </a:rPr>
+              <a:t>Consolidated model comparison</a:t>
+            </a:r>
+          </a:p>
+        </p:txBody>
+      </p:sp>
+      <p:grpSp>
+        <p:nvGrpSpPr>
+          <p:cNvPr id="4" name="Group 4"/>
+          <p:cNvGrpSpPr/>
+          <p:nvPr/>
+        </p:nvGrpSpPr>
+        <p:grpSpPr>
+          <a:xfrm>
+            <a:off x="647625" y="2012475"/>
+            <a:ext cx="17026650" cy="52650"/>
+            <a:chOff x="0" y="0"/>
+            <a:chExt cx="22702200" cy="70200"/>
+          </a:xfrm>
+        </p:grpSpPr>
+        <p:sp>
+          <p:nvSpPr>
+            <p:cNvPr id="5" name="Freeform 5"/>
+            <p:cNvSpPr/>
+            <p:nvPr/>
+          </p:nvSpPr>
+          <p:spPr>
+            <a:xfrm>
+              <a:off x="12700" y="12700"/>
+              <a:ext cx="22676738" cy="44831"/>
+            </a:xfrm>
+            <a:custGeom>
+              <a:avLst/>
+              <a:gdLst/>
+              <a:ahLst/>
+              <a:cxnLst/>
+              <a:rect l="l" t="t" r="r" b="b"/>
+              <a:pathLst>
+                <a:path w="22676738" h="44831">
+                  <a:moveTo>
+                    <a:pt x="0" y="0"/>
+                  </a:moveTo>
+                  <a:lnTo>
+                    <a:pt x="22676738" y="0"/>
+                  </a:lnTo>
+                  <a:lnTo>
+                    <a:pt x="22676738" y="44831"/>
+                  </a:lnTo>
+                  <a:lnTo>
+                    <a:pt x="0" y="44831"/>
+                  </a:lnTo>
+                  <a:close/>
+                </a:path>
+              </a:pathLst>
+            </a:custGeom>
+            <a:solidFill>
+              <a:srgbClr val="000000"/>
+            </a:solidFill>
+          </p:spPr>
+        </p:sp>
+        <p:sp>
+          <p:nvSpPr>
+            <p:cNvPr id="6" name="Freeform 6"/>
+            <p:cNvSpPr/>
+            <p:nvPr/>
+          </p:nvSpPr>
+          <p:spPr>
+            <a:xfrm>
+              <a:off x="0" y="0"/>
+              <a:ext cx="22702138" cy="70231"/>
+            </a:xfrm>
+            <a:custGeom>
+              <a:avLst/>
+              <a:gdLst/>
+              <a:ahLst/>
+              <a:cxnLst/>
+              <a:rect l="l" t="t" r="r" b="b"/>
+              <a:pathLst>
+                <a:path w="22702138" h="70231">
+                  <a:moveTo>
+                    <a:pt x="12700" y="0"/>
+                  </a:moveTo>
+                  <a:lnTo>
+                    <a:pt x="22689438" y="0"/>
+                  </a:lnTo>
+                  <a:cubicBezTo>
+                    <a:pt x="22696424" y="0"/>
+                    <a:pt x="22702138" y="5715"/>
+                    <a:pt x="22702138" y="12700"/>
+                  </a:cubicBezTo>
+                  <a:lnTo>
+                    <a:pt x="22702138" y="57531"/>
+                  </a:lnTo>
+                  <a:cubicBezTo>
+                    <a:pt x="22702138" y="64516"/>
+                    <a:pt x="22696424" y="70231"/>
+                    <a:pt x="22689438" y="70231"/>
+                  </a:cubicBezTo>
+                  <a:lnTo>
+                    <a:pt x="12700" y="70231"/>
+                  </a:lnTo>
+                  <a:cubicBezTo>
+                    <a:pt x="5715" y="70231"/>
+                    <a:pt x="0" y="64516"/>
+                    <a:pt x="0" y="57531"/>
+                  </a:cubicBezTo>
+                  <a:lnTo>
+                    <a:pt x="0" y="12700"/>
+                  </a:lnTo>
+                  <a:cubicBezTo>
+                    <a:pt x="0" y="5715"/>
+                    <a:pt x="5715" y="0"/>
+                    <a:pt x="12700" y="0"/>
+                  </a:cubicBezTo>
+                  <a:moveTo>
+                    <a:pt x="12700" y="25400"/>
+                  </a:moveTo>
+                  <a:lnTo>
+                    <a:pt x="12700" y="12700"/>
+                  </a:lnTo>
+                  <a:lnTo>
+                    <a:pt x="25400" y="12700"/>
+                  </a:lnTo>
+                  <a:lnTo>
+                    <a:pt x="25400" y="57531"/>
+                  </a:lnTo>
+                  <a:lnTo>
+                    <a:pt x="12700" y="57531"/>
+                  </a:lnTo>
+                  <a:lnTo>
+                    <a:pt x="12700" y="44831"/>
+                  </a:lnTo>
+                  <a:lnTo>
+                    <a:pt x="22689438" y="44831"/>
+                  </a:lnTo>
+                  <a:lnTo>
+                    <a:pt x="22689438" y="57531"/>
+                  </a:lnTo>
+                  <a:lnTo>
+                    <a:pt x="22676738" y="57531"/>
+                  </a:lnTo>
+                  <a:lnTo>
+                    <a:pt x="22676738" y="12700"/>
+                  </a:lnTo>
+                  <a:lnTo>
+                    <a:pt x="22689438" y="12700"/>
+                  </a:lnTo>
+                  <a:lnTo>
+                    <a:pt x="22689438" y="25400"/>
+                  </a:lnTo>
+                  <a:lnTo>
+                    <a:pt x="12700" y="25400"/>
+                  </a:lnTo>
+                  <a:close/>
+                </a:path>
+              </a:pathLst>
+            </a:custGeom>
+            <a:solidFill>
+              <a:srgbClr val="595959"/>
+            </a:solidFill>
+          </p:spPr>
+        </p:sp>
+      </p:grpSp>
+      <p:grpSp>
+        <p:nvGrpSpPr>
+          <p:cNvPr id="8" name="Group 8"/>
+          <p:cNvGrpSpPr/>
+          <p:nvPr/>
+        </p:nvGrpSpPr>
+        <p:grpSpPr>
+          <a:xfrm>
+            <a:off x="295499" y="284250"/>
+            <a:ext cx="17730900" cy="9718500"/>
+            <a:chOff x="0" y="0"/>
+            <a:chExt cx="23641200" cy="12958000"/>
+          </a:xfrm>
+        </p:grpSpPr>
+        <p:sp>
+          <p:nvSpPr>
+            <p:cNvPr id="9" name="Freeform 9"/>
+            <p:cNvSpPr/>
+            <p:nvPr/>
+          </p:nvSpPr>
+          <p:spPr>
+            <a:xfrm>
+              <a:off x="0" y="0"/>
+              <a:ext cx="23641177" cy="12957937"/>
+            </a:xfrm>
+            <a:custGeom>
+              <a:avLst/>
+              <a:gdLst/>
+              <a:ahLst/>
+              <a:cxnLst/>
+              <a:rect l="l" t="t" r="r" b="b"/>
+              <a:pathLst>
+                <a:path w="23641177" h="12957937">
+                  <a:moveTo>
+                    <a:pt x="25400" y="0"/>
+                  </a:moveTo>
+                  <a:lnTo>
+                    <a:pt x="23615777" y="0"/>
+                  </a:lnTo>
+                  <a:cubicBezTo>
+                    <a:pt x="23629747" y="0"/>
+                    <a:pt x="23641177" y="11430"/>
+                    <a:pt x="23641177" y="25400"/>
+                  </a:cubicBezTo>
+                  <a:lnTo>
+                    <a:pt x="23641177" y="12932537"/>
+                  </a:lnTo>
+                  <a:cubicBezTo>
+                    <a:pt x="23641177" y="12946507"/>
+                    <a:pt x="23629747" y="12957937"/>
+                    <a:pt x="23615777" y="12957937"/>
+                  </a:cubicBezTo>
+                  <a:lnTo>
+                    <a:pt x="25400" y="12957937"/>
+                  </a:lnTo>
+                  <a:cubicBezTo>
+                    <a:pt x="11430" y="12957937"/>
+                    <a:pt x="0" y="12946507"/>
+                    <a:pt x="0" y="12932537"/>
+                  </a:cubicBezTo>
+                  <a:lnTo>
+                    <a:pt x="0" y="25400"/>
+                  </a:lnTo>
+                  <a:cubicBezTo>
+                    <a:pt x="0" y="11430"/>
+                    <a:pt x="11430" y="0"/>
+                    <a:pt x="25400" y="0"/>
+                  </a:cubicBezTo>
+                  <a:moveTo>
+                    <a:pt x="25400" y="50800"/>
+                  </a:moveTo>
+                  <a:lnTo>
+                    <a:pt x="25400" y="25400"/>
+                  </a:lnTo>
+                  <a:lnTo>
+                    <a:pt x="50800" y="25400"/>
+                  </a:lnTo>
+                  <a:lnTo>
+                    <a:pt x="50800" y="12932537"/>
+                  </a:lnTo>
+                  <a:lnTo>
+                    <a:pt x="25400" y="12932537"/>
+                  </a:lnTo>
+                  <a:lnTo>
+                    <a:pt x="25400" y="12907137"/>
+                  </a:lnTo>
+                  <a:lnTo>
+                    <a:pt x="23615777" y="12907137"/>
+                  </a:lnTo>
+                  <a:lnTo>
+                    <a:pt x="23615777" y="12932537"/>
+                  </a:lnTo>
+                  <a:lnTo>
+                    <a:pt x="23590377" y="12932537"/>
+                  </a:lnTo>
+                  <a:lnTo>
+                    <a:pt x="23590377" y="25400"/>
+                  </a:lnTo>
+                  <a:lnTo>
+                    <a:pt x="23615777" y="25400"/>
+                  </a:lnTo>
+                  <a:lnTo>
+                    <a:pt x="23615777" y="50800"/>
+                  </a:lnTo>
+                  <a:lnTo>
+                    <a:pt x="25400" y="50800"/>
+                  </a:lnTo>
+                  <a:close/>
+                </a:path>
+              </a:pathLst>
+            </a:custGeom>
+            <a:solidFill>
+              <a:srgbClr val="000000"/>
+            </a:solidFill>
+          </p:spPr>
+        </p:sp>
+      </p:grpSp>
+      <p:pic>
+        <p:nvPicPr>
+          <p:cNvPr id="10" name="Picture 9">
+            <a:extLst>
+              <a:ext uri="{FF2B5EF4-FFF2-40B4-BE49-F238E27FC236}">
+                <a16:creationId xmlns:a16="http://schemas.microsoft.com/office/drawing/2014/main" id="{FD186305-1AC5-6DE9-26A2-712165756554}"/>
+              </a:ext>
+            </a:extLst>
+          </p:cNvPr>
+          <p:cNvPicPr>
+            <a:picLocks noChangeAspect="1"/>
+          </p:cNvPicPr>
+          <p:nvPr/>
+        </p:nvPicPr>
+        <p:blipFill>
+          <a:blip r:embed="rId3">
+            <a:extLst>
+              <a:ext uri="{28A0092B-C50C-407E-A947-70E740481C1C}">
+                <a14:useLocalDpi xmlns:a14="http://schemas.microsoft.com/office/drawing/2010/main" val="0"/>
+              </a:ext>
+            </a:extLst>
+          </a:blip>
+          <a:stretch>
+            <a:fillRect/>
+          </a:stretch>
+        </p:blipFill>
+        <p:spPr>
+          <a:xfrm>
+            <a:off x="1066800" y="2781300"/>
+            <a:ext cx="15849600" cy="6604000"/>
+          </a:xfrm>
+          <a:prstGeom prst="rect">
+            <a:avLst/>
+          </a:prstGeom>
+        </p:spPr>
+      </p:pic>
+    </p:spTree>
+    <p:extLst>
+      <p:ext uri="{BB962C8B-B14F-4D97-AF65-F5344CB8AC3E}">
+        <p14:creationId xmlns:p14="http://schemas.microsoft.com/office/powerpoint/2010/main" val="262112687"/>
+      </p:ext>
+    </p:extLst>
+  </p:cSld>
+  <p:clrMapOvr>
+    <a:masterClrMapping/>
+  </p:clrMapOvr>
+</p:sld>
+</file>
+
+<file path=ppt/slides/slide28.xml><?xml version="1.0" encoding="utf-8"?>
+<p:sld xmlns:a="http://schemas.openxmlformats.org/drawingml/2006/main" xmlns:r="http://schemas.openxmlformats.org/officeDocument/2006/relationships" xmlns:p="http://schemas.openxmlformats.org/presentationml/2006/main">
+  <p:cSld>
+    <p:spTree>
+      <p:nvGrpSpPr>
+        <p:cNvPr id="1" name=""/>
+        <p:cNvGrpSpPr/>
+        <p:nvPr/>
+      </p:nvGrpSpPr>
+      <p:grpSpPr>
+        <a:xfrm>
+          <a:off x="0" y="0"/>
+          <a:ext cx="0" cy="0"/>
+          <a:chOff x="0" y="0"/>
+          <a:chExt cx="0" cy="0"/>
+        </a:xfrm>
+      </p:grpSpPr>
+      <p:sp>
+        <p:nvSpPr>
+          <p:cNvPr id="2" name="TextBox 2"/>
+          <p:cNvSpPr txBox="1"/>
+          <p:nvPr/>
+        </p:nvSpPr>
+        <p:spPr>
+          <a:xfrm>
+            <a:off x="714825" y="790975"/>
+            <a:ext cx="16858350" cy="746615"/>
+          </a:xfrm>
+          <a:prstGeom prst="rect">
+            <a:avLst/>
+          </a:prstGeom>
+        </p:spPr>
+        <p:txBody>
+          <a:bodyPr lIns="0" tIns="0" rIns="0" bIns="0" rtlCol="0" anchor="t">
+            <a:spAutoFit/>
+          </a:bodyPr>
+          <a:lstStyle/>
+          <a:p>
+            <a:pPr algn="l">
+              <a:lnSpc>
+                <a:spcPts val="6220"/>
+              </a:lnSpc>
+            </a:pPr>
+            <a:r>
+              <a:rPr lang="en-US" sz="5000" dirty="0">
+                <a:solidFill>
+                  <a:srgbClr val="FF0000"/>
+                </a:solidFill>
+                <a:latin typeface="Times New Roman"/>
+                <a:ea typeface="Times New Roman"/>
+                <a:cs typeface="Times New Roman"/>
+                <a:sym typeface="Times New Roman"/>
+              </a:rPr>
+              <a:t>Consolidated model comparison</a:t>
+            </a:r>
+          </a:p>
+        </p:txBody>
+      </p:sp>
+      <p:grpSp>
+        <p:nvGrpSpPr>
+          <p:cNvPr id="4" name="Group 4"/>
+          <p:cNvGrpSpPr/>
+          <p:nvPr/>
+        </p:nvGrpSpPr>
+        <p:grpSpPr>
+          <a:xfrm>
+            <a:off x="647625" y="2012475"/>
+            <a:ext cx="17026650" cy="52650"/>
+            <a:chOff x="0" y="0"/>
+            <a:chExt cx="22702200" cy="70200"/>
+          </a:xfrm>
+        </p:grpSpPr>
+        <p:sp>
+          <p:nvSpPr>
+            <p:cNvPr id="5" name="Freeform 5"/>
+            <p:cNvSpPr/>
+            <p:nvPr/>
+          </p:nvSpPr>
+          <p:spPr>
+            <a:xfrm>
+              <a:off x="12700" y="12700"/>
+              <a:ext cx="22676738" cy="44831"/>
+            </a:xfrm>
+            <a:custGeom>
+              <a:avLst/>
+              <a:gdLst/>
+              <a:ahLst/>
+              <a:cxnLst/>
+              <a:rect l="l" t="t" r="r" b="b"/>
+              <a:pathLst>
+                <a:path w="22676738" h="44831">
+                  <a:moveTo>
+                    <a:pt x="0" y="0"/>
+                  </a:moveTo>
+                  <a:lnTo>
+                    <a:pt x="22676738" y="0"/>
+                  </a:lnTo>
+                  <a:lnTo>
+                    <a:pt x="22676738" y="44831"/>
+                  </a:lnTo>
+                  <a:lnTo>
+                    <a:pt x="0" y="44831"/>
+                  </a:lnTo>
+                  <a:close/>
+                </a:path>
+              </a:pathLst>
+            </a:custGeom>
+            <a:solidFill>
+              <a:srgbClr val="000000"/>
+            </a:solidFill>
+          </p:spPr>
+        </p:sp>
+        <p:sp>
+          <p:nvSpPr>
+            <p:cNvPr id="6" name="Freeform 6"/>
+            <p:cNvSpPr/>
+            <p:nvPr/>
+          </p:nvSpPr>
+          <p:spPr>
+            <a:xfrm>
+              <a:off x="0" y="0"/>
+              <a:ext cx="22702138" cy="70231"/>
+            </a:xfrm>
+            <a:custGeom>
+              <a:avLst/>
+              <a:gdLst/>
+              <a:ahLst/>
+              <a:cxnLst/>
+              <a:rect l="l" t="t" r="r" b="b"/>
+              <a:pathLst>
+                <a:path w="22702138" h="70231">
+                  <a:moveTo>
+                    <a:pt x="12700" y="0"/>
+                  </a:moveTo>
+                  <a:lnTo>
+                    <a:pt x="22689438" y="0"/>
+                  </a:lnTo>
+                  <a:cubicBezTo>
+                    <a:pt x="22696424" y="0"/>
+                    <a:pt x="22702138" y="5715"/>
+                    <a:pt x="22702138" y="12700"/>
+                  </a:cubicBezTo>
+                  <a:lnTo>
+                    <a:pt x="22702138" y="57531"/>
+                  </a:lnTo>
+                  <a:cubicBezTo>
+                    <a:pt x="22702138" y="64516"/>
+                    <a:pt x="22696424" y="70231"/>
+                    <a:pt x="22689438" y="70231"/>
+                  </a:cubicBezTo>
+                  <a:lnTo>
+                    <a:pt x="12700" y="70231"/>
+                  </a:lnTo>
+                  <a:cubicBezTo>
+                    <a:pt x="5715" y="70231"/>
+                    <a:pt x="0" y="64516"/>
+                    <a:pt x="0" y="57531"/>
+                  </a:cubicBezTo>
+                  <a:lnTo>
+                    <a:pt x="0" y="12700"/>
+                  </a:lnTo>
+                  <a:cubicBezTo>
+                    <a:pt x="0" y="5715"/>
+                    <a:pt x="5715" y="0"/>
+                    <a:pt x="12700" y="0"/>
+                  </a:cubicBezTo>
+                  <a:moveTo>
+                    <a:pt x="12700" y="25400"/>
+                  </a:moveTo>
+                  <a:lnTo>
+                    <a:pt x="12700" y="12700"/>
+                  </a:lnTo>
+                  <a:lnTo>
+                    <a:pt x="25400" y="12700"/>
+                  </a:lnTo>
+                  <a:lnTo>
+                    <a:pt x="25400" y="57531"/>
+                  </a:lnTo>
+                  <a:lnTo>
+                    <a:pt x="12700" y="57531"/>
+                  </a:lnTo>
+                  <a:lnTo>
+                    <a:pt x="12700" y="44831"/>
+                  </a:lnTo>
+                  <a:lnTo>
+                    <a:pt x="22689438" y="44831"/>
+                  </a:lnTo>
+                  <a:lnTo>
+                    <a:pt x="22689438" y="57531"/>
+                  </a:lnTo>
+                  <a:lnTo>
+                    <a:pt x="22676738" y="57531"/>
+                  </a:lnTo>
+                  <a:lnTo>
+                    <a:pt x="22676738" y="12700"/>
+                  </a:lnTo>
+                  <a:lnTo>
+                    <a:pt x="22689438" y="12700"/>
+                  </a:lnTo>
+                  <a:lnTo>
+                    <a:pt x="22689438" y="25400"/>
+                  </a:lnTo>
+                  <a:lnTo>
+                    <a:pt x="12700" y="25400"/>
+                  </a:lnTo>
+                  <a:close/>
+                </a:path>
+              </a:pathLst>
+            </a:custGeom>
+            <a:solidFill>
+              <a:srgbClr val="595959"/>
+            </a:solidFill>
+          </p:spPr>
+        </p:sp>
+      </p:grpSp>
+      <p:grpSp>
+        <p:nvGrpSpPr>
+          <p:cNvPr id="8" name="Group 8"/>
+          <p:cNvGrpSpPr/>
+          <p:nvPr/>
+        </p:nvGrpSpPr>
+        <p:grpSpPr>
+          <a:xfrm>
+            <a:off x="295499" y="284250"/>
+            <a:ext cx="17730900" cy="9718500"/>
+            <a:chOff x="0" y="0"/>
+            <a:chExt cx="23641200" cy="12958000"/>
+          </a:xfrm>
+        </p:grpSpPr>
+        <p:sp>
+          <p:nvSpPr>
+            <p:cNvPr id="9" name="Freeform 9"/>
+            <p:cNvSpPr/>
+            <p:nvPr/>
+          </p:nvSpPr>
+          <p:spPr>
+            <a:xfrm>
+              <a:off x="0" y="0"/>
+              <a:ext cx="23641177" cy="12957937"/>
+            </a:xfrm>
+            <a:custGeom>
+              <a:avLst/>
+              <a:gdLst/>
+              <a:ahLst/>
+              <a:cxnLst/>
+              <a:rect l="l" t="t" r="r" b="b"/>
+              <a:pathLst>
+                <a:path w="23641177" h="12957937">
+                  <a:moveTo>
+                    <a:pt x="25400" y="0"/>
+                  </a:moveTo>
+                  <a:lnTo>
+                    <a:pt x="23615777" y="0"/>
+                  </a:lnTo>
+                  <a:cubicBezTo>
+                    <a:pt x="23629747" y="0"/>
+                    <a:pt x="23641177" y="11430"/>
+                    <a:pt x="23641177" y="25400"/>
+                  </a:cubicBezTo>
+                  <a:lnTo>
+                    <a:pt x="23641177" y="12932537"/>
+                  </a:lnTo>
+                  <a:cubicBezTo>
+                    <a:pt x="23641177" y="12946507"/>
+                    <a:pt x="23629747" y="12957937"/>
+                    <a:pt x="23615777" y="12957937"/>
+                  </a:cubicBezTo>
+                  <a:lnTo>
+                    <a:pt x="25400" y="12957937"/>
+                  </a:lnTo>
+                  <a:cubicBezTo>
+                    <a:pt x="11430" y="12957937"/>
+                    <a:pt x="0" y="12946507"/>
+                    <a:pt x="0" y="12932537"/>
+                  </a:cubicBezTo>
+                  <a:lnTo>
+                    <a:pt x="0" y="25400"/>
+                  </a:lnTo>
+                  <a:cubicBezTo>
+                    <a:pt x="0" y="11430"/>
+                    <a:pt x="11430" y="0"/>
+                    <a:pt x="25400" y="0"/>
+                  </a:cubicBezTo>
+                  <a:moveTo>
+                    <a:pt x="25400" y="50800"/>
+                  </a:moveTo>
+                  <a:lnTo>
+                    <a:pt x="25400" y="25400"/>
+                  </a:lnTo>
+                  <a:lnTo>
+                    <a:pt x="50800" y="25400"/>
+                  </a:lnTo>
+                  <a:lnTo>
+                    <a:pt x="50800" y="12932537"/>
+                  </a:lnTo>
+                  <a:lnTo>
+                    <a:pt x="25400" y="12932537"/>
+                  </a:lnTo>
+                  <a:lnTo>
+                    <a:pt x="25400" y="12907137"/>
+                  </a:lnTo>
+                  <a:lnTo>
+                    <a:pt x="23615777" y="12907137"/>
+                  </a:lnTo>
+                  <a:lnTo>
+                    <a:pt x="23615777" y="12932537"/>
+                  </a:lnTo>
+                  <a:lnTo>
+                    <a:pt x="23590377" y="12932537"/>
+                  </a:lnTo>
+                  <a:lnTo>
+                    <a:pt x="23590377" y="25400"/>
+                  </a:lnTo>
+                  <a:lnTo>
+                    <a:pt x="23615777" y="25400"/>
+                  </a:lnTo>
+                  <a:lnTo>
+                    <a:pt x="23615777" y="50800"/>
+                  </a:lnTo>
+                  <a:lnTo>
+                    <a:pt x="25400" y="50800"/>
+                  </a:lnTo>
+                  <a:close/>
+                </a:path>
+              </a:pathLst>
+            </a:custGeom>
+            <a:solidFill>
+              <a:srgbClr val="000000"/>
+            </a:solidFill>
+          </p:spPr>
+        </p:sp>
+      </p:grpSp>
+      <p:pic>
+        <p:nvPicPr>
+          <p:cNvPr id="7" name="Picture 6">
+            <a:extLst>
+              <a:ext uri="{FF2B5EF4-FFF2-40B4-BE49-F238E27FC236}">
+                <a16:creationId xmlns:a16="http://schemas.microsoft.com/office/drawing/2014/main" id="{DE1DC800-8CFE-50C2-2C50-459CBA659C20}"/>
+              </a:ext>
+            </a:extLst>
+          </p:cNvPr>
+          <p:cNvPicPr>
+            <a:picLocks noChangeAspect="1"/>
+          </p:cNvPicPr>
+          <p:nvPr/>
+        </p:nvPicPr>
+        <p:blipFill>
+          <a:blip r:embed="rId3"/>
+          <a:stretch>
+            <a:fillRect/>
+          </a:stretch>
+        </p:blipFill>
+        <p:spPr>
+          <a:xfrm>
+            <a:off x="3352800" y="2705100"/>
+            <a:ext cx="9869277" cy="6211167"/>
+          </a:xfrm>
+          <a:prstGeom prst="rect">
+            <a:avLst/>
+          </a:prstGeom>
+        </p:spPr>
+      </p:pic>
+    </p:spTree>
+    <p:extLst>
+      <p:ext uri="{BB962C8B-B14F-4D97-AF65-F5344CB8AC3E}">
+        <p14:creationId xmlns:p14="http://schemas.microsoft.com/office/powerpoint/2010/main" val="3768388641"/>
+      </p:ext>
+    </p:extLst>
+  </p:cSld>
+  <p:clrMapOvr>
+    <a:masterClrMapping/>
+  </p:clrMapOvr>
+</p:sld>
+</file>
+
+<file path=ppt/slides/slide29.xml><?xml version="1.0" encoding="utf-8"?>
+<p:sld xmlns:a="http://schemas.openxmlformats.org/drawingml/2006/main" xmlns:r="http://schemas.openxmlformats.org/officeDocument/2006/relationships" xmlns:p="http://schemas.openxmlformats.org/presentationml/2006/main">
+  <p:cSld>
+    <p:spTree>
+      <p:nvGrpSpPr>
+        <p:cNvPr id="1" name=""/>
+        <p:cNvGrpSpPr/>
+        <p:nvPr/>
+      </p:nvGrpSpPr>
+      <p:grpSpPr>
+        <a:xfrm>
+          <a:off x="0" y="0"/>
+          <a:ext cx="0" cy="0"/>
+          <a:chOff x="0" y="0"/>
+          <a:chExt cx="0" cy="0"/>
+        </a:xfrm>
+      </p:grpSpPr>
+      <p:sp>
+        <p:nvSpPr>
+          <p:cNvPr id="2" name="TextBox 2"/>
+          <p:cNvSpPr txBox="1"/>
+          <p:nvPr/>
+        </p:nvSpPr>
+        <p:spPr>
+          <a:xfrm>
+            <a:off x="714825" y="790975"/>
+            <a:ext cx="16858350" cy="746615"/>
+          </a:xfrm>
+          <a:prstGeom prst="rect">
+            <a:avLst/>
+          </a:prstGeom>
+        </p:spPr>
+        <p:txBody>
+          <a:bodyPr lIns="0" tIns="0" rIns="0" bIns="0" rtlCol="0" anchor="t">
+            <a:spAutoFit/>
+          </a:bodyPr>
+          <a:lstStyle/>
+          <a:p>
+            <a:pPr algn="l">
+              <a:lnSpc>
+                <a:spcPts val="6220"/>
+              </a:lnSpc>
+            </a:pPr>
+            <a:r>
+              <a:rPr lang="en-US" sz="5000" dirty="0">
+                <a:solidFill>
+                  <a:srgbClr val="FF0000"/>
+                </a:solidFill>
+                <a:latin typeface="Times New Roman"/>
+                <a:ea typeface="Times New Roman"/>
+                <a:cs typeface="Times New Roman"/>
+                <a:sym typeface="Times New Roman"/>
+              </a:rPr>
+              <a:t>HGBRT</a:t>
+            </a:r>
+          </a:p>
+        </p:txBody>
+      </p:sp>
+      <p:grpSp>
+        <p:nvGrpSpPr>
+          <p:cNvPr id="4" name="Group 4"/>
+          <p:cNvGrpSpPr/>
+          <p:nvPr/>
+        </p:nvGrpSpPr>
+        <p:grpSpPr>
+          <a:xfrm>
+            <a:off x="647625" y="2012475"/>
+            <a:ext cx="17026650" cy="52650"/>
+            <a:chOff x="0" y="0"/>
+            <a:chExt cx="22702200" cy="70200"/>
+          </a:xfrm>
+        </p:grpSpPr>
+        <p:sp>
+          <p:nvSpPr>
+            <p:cNvPr id="5" name="Freeform 5"/>
+            <p:cNvSpPr/>
+            <p:nvPr/>
+          </p:nvSpPr>
+          <p:spPr>
+            <a:xfrm>
+              <a:off x="12700" y="12700"/>
+              <a:ext cx="22676738" cy="44831"/>
+            </a:xfrm>
+            <a:custGeom>
+              <a:avLst/>
+              <a:gdLst/>
+              <a:ahLst/>
+              <a:cxnLst/>
+              <a:rect l="l" t="t" r="r" b="b"/>
+              <a:pathLst>
+                <a:path w="22676738" h="44831">
+                  <a:moveTo>
+                    <a:pt x="0" y="0"/>
+                  </a:moveTo>
+                  <a:lnTo>
+                    <a:pt x="22676738" y="0"/>
+                  </a:lnTo>
+                  <a:lnTo>
+                    <a:pt x="22676738" y="44831"/>
+                  </a:lnTo>
+                  <a:lnTo>
+                    <a:pt x="0" y="44831"/>
+                  </a:lnTo>
+                  <a:close/>
+                </a:path>
+              </a:pathLst>
+            </a:custGeom>
+            <a:solidFill>
+              <a:srgbClr val="000000"/>
+            </a:solidFill>
+          </p:spPr>
+        </p:sp>
+        <p:sp>
+          <p:nvSpPr>
+            <p:cNvPr id="6" name="Freeform 6"/>
+            <p:cNvSpPr/>
+            <p:nvPr/>
+          </p:nvSpPr>
+          <p:spPr>
+            <a:xfrm>
+              <a:off x="0" y="0"/>
+              <a:ext cx="22702138" cy="70231"/>
+            </a:xfrm>
+            <a:custGeom>
+              <a:avLst/>
+              <a:gdLst/>
+              <a:ahLst/>
+              <a:cxnLst/>
+              <a:rect l="l" t="t" r="r" b="b"/>
+              <a:pathLst>
+                <a:path w="22702138" h="70231">
+                  <a:moveTo>
+                    <a:pt x="12700" y="0"/>
+                  </a:moveTo>
+                  <a:lnTo>
+                    <a:pt x="22689438" y="0"/>
+                  </a:lnTo>
+                  <a:cubicBezTo>
+                    <a:pt x="22696424" y="0"/>
+                    <a:pt x="22702138" y="5715"/>
+                    <a:pt x="22702138" y="12700"/>
+                  </a:cubicBezTo>
+                  <a:lnTo>
+                    <a:pt x="22702138" y="57531"/>
+                  </a:lnTo>
+                  <a:cubicBezTo>
+                    <a:pt x="22702138" y="64516"/>
+                    <a:pt x="22696424" y="70231"/>
+                    <a:pt x="22689438" y="70231"/>
+                  </a:cubicBezTo>
+                  <a:lnTo>
+                    <a:pt x="12700" y="70231"/>
+                  </a:lnTo>
+                  <a:cubicBezTo>
+                    <a:pt x="5715" y="70231"/>
+                    <a:pt x="0" y="64516"/>
+                    <a:pt x="0" y="57531"/>
+                  </a:cubicBezTo>
+                  <a:lnTo>
+                    <a:pt x="0" y="12700"/>
+                  </a:lnTo>
+                  <a:cubicBezTo>
+                    <a:pt x="0" y="5715"/>
+                    <a:pt x="5715" y="0"/>
+                    <a:pt x="12700" y="0"/>
+                  </a:cubicBezTo>
+                  <a:moveTo>
+                    <a:pt x="12700" y="25400"/>
+                  </a:moveTo>
+                  <a:lnTo>
+                    <a:pt x="12700" y="12700"/>
+                  </a:lnTo>
+                  <a:lnTo>
+                    <a:pt x="25400" y="12700"/>
+                  </a:lnTo>
+                  <a:lnTo>
+                    <a:pt x="25400" y="57531"/>
+                  </a:lnTo>
+                  <a:lnTo>
+                    <a:pt x="12700" y="57531"/>
+                  </a:lnTo>
+                  <a:lnTo>
+                    <a:pt x="12700" y="44831"/>
+                  </a:lnTo>
+                  <a:lnTo>
+                    <a:pt x="22689438" y="44831"/>
+                  </a:lnTo>
+                  <a:lnTo>
+                    <a:pt x="22689438" y="57531"/>
+                  </a:lnTo>
+                  <a:lnTo>
+                    <a:pt x="22676738" y="57531"/>
+                  </a:lnTo>
+                  <a:lnTo>
+                    <a:pt x="22676738" y="12700"/>
+                  </a:lnTo>
+                  <a:lnTo>
+                    <a:pt x="22689438" y="12700"/>
+                  </a:lnTo>
+                  <a:lnTo>
+                    <a:pt x="22689438" y="25400"/>
+                  </a:lnTo>
+                  <a:lnTo>
+                    <a:pt x="12700" y="25400"/>
+                  </a:lnTo>
+                  <a:close/>
+                </a:path>
+              </a:pathLst>
+            </a:custGeom>
+            <a:solidFill>
+              <a:srgbClr val="595959"/>
+            </a:solidFill>
+          </p:spPr>
+        </p:sp>
+      </p:grpSp>
+      <p:grpSp>
+        <p:nvGrpSpPr>
+          <p:cNvPr id="8" name="Group 8"/>
+          <p:cNvGrpSpPr/>
+          <p:nvPr/>
+        </p:nvGrpSpPr>
+        <p:grpSpPr>
+          <a:xfrm>
+            <a:off x="295499" y="284250"/>
+            <a:ext cx="17730900" cy="9718500"/>
+            <a:chOff x="0" y="0"/>
+            <a:chExt cx="23641200" cy="12958000"/>
+          </a:xfrm>
+        </p:grpSpPr>
+        <p:sp>
+          <p:nvSpPr>
+            <p:cNvPr id="9" name="Freeform 9"/>
+            <p:cNvSpPr/>
+            <p:nvPr/>
+          </p:nvSpPr>
+          <p:spPr>
+            <a:xfrm>
+              <a:off x="0" y="0"/>
+              <a:ext cx="23641177" cy="12957937"/>
+            </a:xfrm>
+            <a:custGeom>
+              <a:avLst/>
+              <a:gdLst/>
+              <a:ahLst/>
+              <a:cxnLst/>
+              <a:rect l="l" t="t" r="r" b="b"/>
+              <a:pathLst>
+                <a:path w="23641177" h="12957937">
+                  <a:moveTo>
+                    <a:pt x="25400" y="0"/>
+                  </a:moveTo>
+                  <a:lnTo>
+                    <a:pt x="23615777" y="0"/>
+                  </a:lnTo>
+                  <a:cubicBezTo>
+                    <a:pt x="23629747" y="0"/>
+                    <a:pt x="23641177" y="11430"/>
+                    <a:pt x="23641177" y="25400"/>
+                  </a:cubicBezTo>
+                  <a:lnTo>
+                    <a:pt x="23641177" y="12932537"/>
+                  </a:lnTo>
+                  <a:cubicBezTo>
+                    <a:pt x="23641177" y="12946507"/>
+                    <a:pt x="23629747" y="12957937"/>
+                    <a:pt x="23615777" y="12957937"/>
+                  </a:cubicBezTo>
+                  <a:lnTo>
+                    <a:pt x="25400" y="12957937"/>
+                  </a:lnTo>
+                  <a:cubicBezTo>
+                    <a:pt x="11430" y="12957937"/>
+                    <a:pt x="0" y="12946507"/>
+                    <a:pt x="0" y="12932537"/>
+                  </a:cubicBezTo>
+                  <a:lnTo>
+                    <a:pt x="0" y="25400"/>
+                  </a:lnTo>
+                  <a:cubicBezTo>
+                    <a:pt x="0" y="11430"/>
+                    <a:pt x="11430" y="0"/>
+                    <a:pt x="25400" y="0"/>
+                  </a:cubicBezTo>
+                  <a:moveTo>
+                    <a:pt x="25400" y="50800"/>
+                  </a:moveTo>
+                  <a:lnTo>
+                    <a:pt x="25400" y="25400"/>
+                  </a:lnTo>
+                  <a:lnTo>
+                    <a:pt x="50800" y="25400"/>
+                  </a:lnTo>
+                  <a:lnTo>
+                    <a:pt x="50800" y="12932537"/>
+                  </a:lnTo>
+                  <a:lnTo>
+                    <a:pt x="25400" y="12932537"/>
+                  </a:lnTo>
+                  <a:lnTo>
+                    <a:pt x="25400" y="12907137"/>
+                  </a:lnTo>
+                  <a:lnTo>
+                    <a:pt x="23615777" y="12907137"/>
+                  </a:lnTo>
+                  <a:lnTo>
+                    <a:pt x="23615777" y="12932537"/>
+                  </a:lnTo>
+                  <a:lnTo>
+                    <a:pt x="23590377" y="12932537"/>
+                  </a:lnTo>
+                  <a:lnTo>
+                    <a:pt x="23590377" y="25400"/>
+                  </a:lnTo>
+                  <a:lnTo>
+                    <a:pt x="23615777" y="25400"/>
+                  </a:lnTo>
+                  <a:lnTo>
+                    <a:pt x="23615777" y="50800"/>
+                  </a:lnTo>
+                  <a:lnTo>
+                    <a:pt x="25400" y="50800"/>
+                  </a:lnTo>
+                  <a:close/>
+                </a:path>
+              </a:pathLst>
+            </a:custGeom>
+            <a:solidFill>
+              <a:srgbClr val="000000"/>
+            </a:solidFill>
+          </p:spPr>
+        </p:sp>
+      </p:grpSp>
       <p:sp>
         <p:nvSpPr>
           <p:cNvPr id="7" name="TextBox 6">
@@ -26293,7 +28629,7 @@
         <p:spPr>
           <a:xfrm>
             <a:off x="1524000" y="2273432"/>
-            <a:ext cx="15240000" cy="7478970"/>
+            <a:ext cx="14401800" cy="7478970"/>
           </a:xfrm>
           <a:prstGeom prst="rect">
             <a:avLst/>
@@ -26615,19 +28951,13 @@
               <a:rPr lang="en-IN" sz="2400" dirty="0">
                 <a:latin typeface="Bahnschrift" panose="020B0502040204020203" pitchFamily="34" charset="0"/>
               </a:rPr>
-              <a:t>Bayesian Optimization Metrics - MSE: 0.9869974645364588 RMSE: 0.9934774605075138 </a:t>
+              <a:t>Bayesian Optimization Metrics - </a:t>
             </a:r>
             <a:r>
               <a:rPr lang="en-IN" sz="2400" b="1" dirty="0">
                 <a:latin typeface="Bahnschrift" panose="020B0502040204020203" pitchFamily="34" charset="0"/>
               </a:rPr>
-              <a:t>R2: 0.9861896531818773 </a:t>
-            </a:r>
-            <a:r>
-              <a:rPr lang="en-IN" sz="2400" dirty="0">
-                <a:latin typeface="Bahnschrift" panose="020B0502040204020203" pitchFamily="34" charset="0"/>
-              </a:rPr>
-              <a:t>Adjusted R2: 0.9861685557990204 MAPE: 0.009920163204059173</a:t>
+              <a:t>MSE: 0.9869974645364588 RMSE: 0.9934774605075138 R2: 0.9861896531818773 Adjusted R2: 0.9861685557990204 MAPE: 0.009920163204059173</a:t>
             </a:r>
           </a:p>
         </p:txBody>
@@ -26645,7 +28975,352 @@
 </p:sld>
 </file>
 
-<file path=ppt/slides/slide26.xml><?xml version="1.0" encoding="utf-8"?>
+<file path=ppt/slides/slide3.xml><?xml version="1.0" encoding="utf-8"?>
+<p:sld xmlns:a="http://schemas.openxmlformats.org/drawingml/2006/main" xmlns:r="http://schemas.openxmlformats.org/officeDocument/2006/relationships" xmlns:p="http://schemas.openxmlformats.org/presentationml/2006/main">
+  <p:cSld>
+    <p:spTree>
+      <p:nvGrpSpPr>
+        <p:cNvPr id="1" name=""/>
+        <p:cNvGrpSpPr/>
+        <p:nvPr/>
+      </p:nvGrpSpPr>
+      <p:grpSpPr>
+        <a:xfrm>
+          <a:off x="0" y="0"/>
+          <a:ext cx="0" cy="0"/>
+          <a:chOff x="0" y="0"/>
+          <a:chExt cx="0" cy="0"/>
+        </a:xfrm>
+      </p:grpSpPr>
+      <p:sp>
+        <p:nvSpPr>
+          <p:cNvPr id="2" name="TextBox 2"/>
+          <p:cNvSpPr txBox="1"/>
+          <p:nvPr/>
+        </p:nvSpPr>
+        <p:spPr>
+          <a:xfrm>
+            <a:off x="714825" y="886225"/>
+            <a:ext cx="16858352" cy="857250"/>
+          </a:xfrm>
+          <a:prstGeom prst="rect">
+            <a:avLst/>
+          </a:prstGeom>
+        </p:spPr>
+        <p:txBody>
+          <a:bodyPr lIns="0" tIns="0" rIns="0" bIns="0" rtlCol="0" anchor="t">
+            <a:spAutoFit/>
+          </a:bodyPr>
+          <a:lstStyle/>
+          <a:p>
+            <a:pPr algn="l">
+              <a:lnSpc>
+                <a:spcPts val="6047"/>
+              </a:lnSpc>
+            </a:pPr>
+            <a:r>
+              <a:rPr lang="en-US" sz="5039">
+                <a:solidFill>
+                  <a:srgbClr val="FF0000"/>
+                </a:solidFill>
+                <a:latin typeface="Times New Roman"/>
+                <a:ea typeface="Times New Roman"/>
+                <a:cs typeface="Times New Roman"/>
+                <a:sym typeface="Times New Roman"/>
+              </a:rPr>
+              <a:t>Abstract: -</a:t>
+            </a:r>
+          </a:p>
+        </p:txBody>
+      </p:sp>
+      <p:sp>
+        <p:nvSpPr>
+          <p:cNvPr id="3" name="TextBox 3"/>
+          <p:cNvSpPr txBox="1"/>
+          <p:nvPr/>
+        </p:nvSpPr>
+        <p:spPr>
+          <a:xfrm>
+            <a:off x="714825" y="2158250"/>
+            <a:ext cx="16858352" cy="7133556"/>
+          </a:xfrm>
+          <a:prstGeom prst="rect">
+            <a:avLst/>
+          </a:prstGeom>
+        </p:spPr>
+        <p:txBody>
+          <a:bodyPr lIns="0" tIns="0" rIns="0" bIns="0" rtlCol="0" anchor="t">
+            <a:spAutoFit/>
+          </a:bodyPr>
+          <a:lstStyle/>
+          <a:p>
+            <a:pPr marL="977163" lvl="1" indent="-488581" algn="just">
+              <a:lnSpc>
+                <a:spcPts val="5579"/>
+              </a:lnSpc>
+              <a:buFont typeface="Arial"/>
+              <a:buChar char="•"/>
+            </a:pPr>
+            <a:r>
+              <a:rPr lang="en-US" sz="3099" dirty="0">
+                <a:solidFill>
+                  <a:srgbClr val="000000"/>
+                </a:solidFill>
+                <a:latin typeface="Times New Roman"/>
+                <a:ea typeface="Times New Roman"/>
+                <a:cs typeface="Times New Roman"/>
+                <a:sym typeface="Times New Roman"/>
+              </a:rPr>
+              <a:t>Optimizing resource allocation using advanced machine learning techniques to analyze key patterns and correlations in a comprehensive dataset, including fields like latency, allocated bandwidth, required bandwidth, signal strength, and resource allocation efficiency.</a:t>
+            </a:r>
+          </a:p>
+          <a:p>
+            <a:pPr marL="977163" lvl="1" indent="-488581" algn="just">
+              <a:lnSpc>
+                <a:spcPts val="5579"/>
+              </a:lnSpc>
+              <a:buFont typeface="Arial"/>
+              <a:buChar char="•"/>
+            </a:pPr>
+            <a:r>
+              <a:rPr lang="en-US" sz="3099" dirty="0">
+                <a:solidFill>
+                  <a:srgbClr val="000000"/>
+                </a:solidFill>
+                <a:latin typeface="Times New Roman"/>
+                <a:ea typeface="Times New Roman"/>
+                <a:cs typeface="Times New Roman"/>
+                <a:sym typeface="Times New Roman"/>
+              </a:rPr>
+              <a:t>The project aims to predict and enhance system efficiency and responsiveness by dynamically allocating bandwidth and processing power, minimizing latency, and maximizing overall network performance, thereby improving user experience and service delivery.</a:t>
+            </a:r>
+          </a:p>
+          <a:p>
+            <a:pPr marL="977163" lvl="1" indent="-488581" algn="just">
+              <a:lnSpc>
+                <a:spcPts val="5579"/>
+              </a:lnSpc>
+              <a:buFont typeface="Arial"/>
+              <a:buChar char="•"/>
+            </a:pPr>
+            <a:r>
+              <a:rPr lang="en-US" sz="3099" dirty="0">
+                <a:solidFill>
+                  <a:srgbClr val="000000"/>
+                </a:solidFill>
+                <a:latin typeface="Times New Roman"/>
+                <a:ea typeface="Times New Roman"/>
+                <a:cs typeface="Times New Roman"/>
+                <a:sym typeface="Times New Roman"/>
+              </a:rPr>
+              <a:t>The resource allocation efficiency is predicted using advanced machine leaning models which enable better understanding of network fields and their correlation contributing to better and </a:t>
+            </a:r>
+            <a:r>
+              <a:rPr lang="en-US" sz="3099">
+                <a:solidFill>
+                  <a:srgbClr val="000000"/>
+                </a:solidFill>
+                <a:latin typeface="Times New Roman"/>
+                <a:ea typeface="Times New Roman"/>
+                <a:cs typeface="Times New Roman"/>
+                <a:sym typeface="Times New Roman"/>
+              </a:rPr>
+              <a:t>optimized efficiency.</a:t>
+            </a:r>
+            <a:endParaRPr lang="en-US" sz="3099" dirty="0">
+              <a:solidFill>
+                <a:srgbClr val="000000"/>
+              </a:solidFill>
+              <a:latin typeface="Times New Roman"/>
+              <a:ea typeface="Times New Roman"/>
+              <a:cs typeface="Times New Roman"/>
+              <a:sym typeface="Times New Roman"/>
+            </a:endParaRPr>
+          </a:p>
+          <a:p>
+            <a:pPr marL="1049909" lvl="1" indent="-524955" algn="just">
+              <a:lnSpc>
+                <a:spcPts val="5994"/>
+              </a:lnSpc>
+            </a:pPr>
+            <a:endParaRPr lang="en-US" sz="3099" dirty="0">
+              <a:solidFill>
+                <a:srgbClr val="000000"/>
+              </a:solidFill>
+              <a:latin typeface="Times New Roman"/>
+              <a:ea typeface="Times New Roman"/>
+              <a:cs typeface="Times New Roman"/>
+              <a:sym typeface="Times New Roman"/>
+            </a:endParaRPr>
+          </a:p>
+        </p:txBody>
+      </p:sp>
+      <p:grpSp>
+        <p:nvGrpSpPr>
+          <p:cNvPr id="4" name="Group 4"/>
+          <p:cNvGrpSpPr/>
+          <p:nvPr/>
+        </p:nvGrpSpPr>
+        <p:grpSpPr>
+          <a:xfrm>
+            <a:off x="647623" y="2012475"/>
+            <a:ext cx="17026652" cy="52650"/>
+            <a:chOff x="0" y="0"/>
+            <a:chExt cx="22702203" cy="70200"/>
+          </a:xfrm>
+        </p:grpSpPr>
+        <p:sp>
+          <p:nvSpPr>
+            <p:cNvPr id="5" name="Freeform 5"/>
+            <p:cNvSpPr/>
+            <p:nvPr/>
+          </p:nvSpPr>
+          <p:spPr>
+            <a:xfrm>
+              <a:off x="12700" y="12700"/>
+              <a:ext cx="22676865" cy="44831"/>
+            </a:xfrm>
+            <a:custGeom>
+              <a:avLst/>
+              <a:gdLst/>
+              <a:ahLst/>
+              <a:cxnLst/>
+              <a:rect l="l" t="t" r="r" b="b"/>
+              <a:pathLst>
+                <a:path w="22676865" h="44831">
+                  <a:moveTo>
+                    <a:pt x="0" y="0"/>
+                  </a:moveTo>
+                  <a:lnTo>
+                    <a:pt x="22676865" y="0"/>
+                  </a:lnTo>
+                  <a:lnTo>
+                    <a:pt x="22676865" y="44831"/>
+                  </a:lnTo>
+                  <a:lnTo>
+                    <a:pt x="0" y="44831"/>
+                  </a:lnTo>
+                  <a:close/>
+                </a:path>
+              </a:pathLst>
+            </a:custGeom>
+            <a:solidFill>
+              <a:srgbClr val="000000"/>
+            </a:solidFill>
+          </p:spPr>
+        </p:sp>
+        <p:sp>
+          <p:nvSpPr>
+            <p:cNvPr id="6" name="Freeform 6"/>
+            <p:cNvSpPr/>
+            <p:nvPr/>
+          </p:nvSpPr>
+          <p:spPr>
+            <a:xfrm>
+              <a:off x="0" y="0"/>
+              <a:ext cx="22702265" cy="70231"/>
+            </a:xfrm>
+            <a:custGeom>
+              <a:avLst/>
+              <a:gdLst/>
+              <a:ahLst/>
+              <a:cxnLst/>
+              <a:rect l="l" t="t" r="r" b="b"/>
+              <a:pathLst>
+                <a:path w="22702265" h="70231">
+                  <a:moveTo>
+                    <a:pt x="12700" y="0"/>
+                  </a:moveTo>
+                  <a:lnTo>
+                    <a:pt x="22689565" y="0"/>
+                  </a:lnTo>
+                  <a:cubicBezTo>
+                    <a:pt x="22696551" y="0"/>
+                    <a:pt x="22702265" y="5715"/>
+                    <a:pt x="22702265" y="12700"/>
+                  </a:cubicBezTo>
+                  <a:lnTo>
+                    <a:pt x="22702265" y="57531"/>
+                  </a:lnTo>
+                  <a:cubicBezTo>
+                    <a:pt x="22702265" y="64516"/>
+                    <a:pt x="22696551" y="70231"/>
+                    <a:pt x="22689565" y="70231"/>
+                  </a:cubicBezTo>
+                  <a:lnTo>
+                    <a:pt x="12700" y="70231"/>
+                  </a:lnTo>
+                  <a:cubicBezTo>
+                    <a:pt x="5715" y="70231"/>
+                    <a:pt x="0" y="64516"/>
+                    <a:pt x="0" y="57531"/>
+                  </a:cubicBezTo>
+                  <a:lnTo>
+                    <a:pt x="0" y="12700"/>
+                  </a:lnTo>
+                  <a:cubicBezTo>
+                    <a:pt x="0" y="5715"/>
+                    <a:pt x="5715" y="0"/>
+                    <a:pt x="12700" y="0"/>
+                  </a:cubicBezTo>
+                  <a:moveTo>
+                    <a:pt x="12700" y="25400"/>
+                  </a:moveTo>
+                  <a:lnTo>
+                    <a:pt x="12700" y="12700"/>
+                  </a:lnTo>
+                  <a:lnTo>
+                    <a:pt x="25400" y="12700"/>
+                  </a:lnTo>
+                  <a:lnTo>
+                    <a:pt x="25400" y="57531"/>
+                  </a:lnTo>
+                  <a:lnTo>
+                    <a:pt x="12700" y="57531"/>
+                  </a:lnTo>
+                  <a:lnTo>
+                    <a:pt x="12700" y="44831"/>
+                  </a:lnTo>
+                  <a:lnTo>
+                    <a:pt x="22689565" y="44831"/>
+                  </a:lnTo>
+                  <a:lnTo>
+                    <a:pt x="22689565" y="57531"/>
+                  </a:lnTo>
+                  <a:lnTo>
+                    <a:pt x="22676865" y="57531"/>
+                  </a:lnTo>
+                  <a:lnTo>
+                    <a:pt x="22676865" y="12700"/>
+                  </a:lnTo>
+                  <a:lnTo>
+                    <a:pt x="22689565" y="12700"/>
+                  </a:lnTo>
+                  <a:lnTo>
+                    <a:pt x="22689565" y="25400"/>
+                  </a:lnTo>
+                  <a:lnTo>
+                    <a:pt x="12700" y="25400"/>
+                  </a:lnTo>
+                  <a:close/>
+                </a:path>
+              </a:pathLst>
+            </a:custGeom>
+            <a:solidFill>
+              <a:srgbClr val="595959"/>
+            </a:solidFill>
+          </p:spPr>
+        </p:sp>
+      </p:grpSp>
+    </p:spTree>
+  </p:cSld>
+  <p:clrMapOvr>
+    <a:masterClrMapping/>
+  </p:clrMapOvr>
+</p:sld>
+</file>
+
+<file path=ppt/slides/slide30.xml><?xml version="1.0" encoding="utf-8"?>
 <p:sld xmlns:a="http://schemas.openxmlformats.org/drawingml/2006/main" xmlns:r="http://schemas.openxmlformats.org/officeDocument/2006/relationships" xmlns:p="http://schemas.openxmlformats.org/presentationml/2006/main">
   <p:cSld>
     <p:spTree>
@@ -27608,7 +30283,7 @@
 </p:sld>
 </file>
 
-<file path=ppt/slides/slide27.xml><?xml version="1.0" encoding="utf-8"?>
+<file path=ppt/slides/slide31.xml><?xml version="1.0" encoding="utf-8"?>
 <p:sld xmlns:a="http://schemas.openxmlformats.org/drawingml/2006/main" xmlns:r="http://schemas.openxmlformats.org/officeDocument/2006/relationships" xmlns:p="http://schemas.openxmlformats.org/presentationml/2006/main">
   <p:cSld>
     <p:spTree>
@@ -28003,7 +30678,7 @@
 </p:sld>
 </file>
 
-<file path=ppt/slides/slide28.xml><?xml version="1.0" encoding="utf-8"?>
+<file path=ppt/slides/slide32.xml><?xml version="1.0" encoding="utf-8"?>
 <p:sld xmlns:a="http://schemas.openxmlformats.org/drawingml/2006/main" xmlns:r="http://schemas.openxmlformats.org/officeDocument/2006/relationships" xmlns:p="http://schemas.openxmlformats.org/presentationml/2006/main">
   <p:cSld>
     <p:spTree>
@@ -28410,7 +31085,7 @@
 </p:sld>
 </file>
 
-<file path=ppt/slides/slide29.xml><?xml version="1.0" encoding="utf-8"?>
+<file path=ppt/slides/slide33.xml><?xml version="1.0" encoding="utf-8"?>
 <p:sld xmlns:a="http://schemas.openxmlformats.org/drawingml/2006/main" xmlns:r="http://schemas.openxmlformats.org/officeDocument/2006/relationships" xmlns:p="http://schemas.openxmlformats.org/presentationml/2006/main">
   <p:cSld>
     <p:spTree>
@@ -28581,330 +31256,6 @@
             </a:custGeom>
             <a:solidFill>
               <a:srgbClr val="000000"/>
-            </a:solidFill>
-          </p:spPr>
-        </p:sp>
-      </p:grpSp>
-    </p:spTree>
-  </p:cSld>
-  <p:clrMapOvr>
-    <a:masterClrMapping/>
-  </p:clrMapOvr>
-</p:sld>
-</file>
-
-<file path=ppt/slides/slide3.xml><?xml version="1.0" encoding="utf-8"?>
-<p:sld xmlns:a="http://schemas.openxmlformats.org/drawingml/2006/main" xmlns:r="http://schemas.openxmlformats.org/officeDocument/2006/relationships" xmlns:p="http://schemas.openxmlformats.org/presentationml/2006/main">
-  <p:cSld>
-    <p:spTree>
-      <p:nvGrpSpPr>
-        <p:cNvPr id="1" name=""/>
-        <p:cNvGrpSpPr/>
-        <p:nvPr/>
-      </p:nvGrpSpPr>
-      <p:grpSpPr>
-        <a:xfrm>
-          <a:off x="0" y="0"/>
-          <a:ext cx="0" cy="0"/>
-          <a:chOff x="0" y="0"/>
-          <a:chExt cx="0" cy="0"/>
-        </a:xfrm>
-      </p:grpSpPr>
-      <p:sp>
-        <p:nvSpPr>
-          <p:cNvPr id="2" name="TextBox 2"/>
-          <p:cNvSpPr txBox="1"/>
-          <p:nvPr/>
-        </p:nvSpPr>
-        <p:spPr>
-          <a:xfrm>
-            <a:off x="714825" y="886225"/>
-            <a:ext cx="16858352" cy="857250"/>
-          </a:xfrm>
-          <a:prstGeom prst="rect">
-            <a:avLst/>
-          </a:prstGeom>
-        </p:spPr>
-        <p:txBody>
-          <a:bodyPr lIns="0" tIns="0" rIns="0" bIns="0" rtlCol="0" anchor="t">
-            <a:spAutoFit/>
-          </a:bodyPr>
-          <a:lstStyle/>
-          <a:p>
-            <a:pPr algn="l">
-              <a:lnSpc>
-                <a:spcPts val="6047"/>
-              </a:lnSpc>
-            </a:pPr>
-            <a:r>
-              <a:rPr lang="en-US" sz="5039">
-                <a:solidFill>
-                  <a:srgbClr val="FF0000"/>
-                </a:solidFill>
-                <a:latin typeface="Times New Roman"/>
-                <a:ea typeface="Times New Roman"/>
-                <a:cs typeface="Times New Roman"/>
-                <a:sym typeface="Times New Roman"/>
-              </a:rPr>
-              <a:t>Abstract: -</a:t>
-            </a:r>
-          </a:p>
-        </p:txBody>
-      </p:sp>
-      <p:sp>
-        <p:nvSpPr>
-          <p:cNvPr id="3" name="TextBox 3"/>
-          <p:cNvSpPr txBox="1"/>
-          <p:nvPr/>
-        </p:nvSpPr>
-        <p:spPr>
-          <a:xfrm>
-            <a:off x="714825" y="2158250"/>
-            <a:ext cx="16858352" cy="8498967"/>
-          </a:xfrm>
-          <a:prstGeom prst="rect">
-            <a:avLst/>
-          </a:prstGeom>
-        </p:spPr>
-        <p:txBody>
-          <a:bodyPr lIns="0" tIns="0" rIns="0" bIns="0" rtlCol="0" anchor="t">
-            <a:spAutoFit/>
-          </a:bodyPr>
-          <a:lstStyle/>
-          <a:p>
-            <a:pPr marL="977163" lvl="1" indent="-488581" algn="just">
-              <a:lnSpc>
-                <a:spcPts val="5579"/>
-              </a:lnSpc>
-              <a:buFont typeface="Arial"/>
-              <a:buChar char="•"/>
-            </a:pPr>
-            <a:r>
-              <a:rPr lang="en-US" sz="3099" dirty="0">
-                <a:solidFill>
-                  <a:srgbClr val="000000"/>
-                </a:solidFill>
-                <a:latin typeface="Times New Roman"/>
-                <a:ea typeface="Times New Roman"/>
-                <a:cs typeface="Times New Roman"/>
-                <a:sym typeface="Times New Roman"/>
-              </a:rPr>
-              <a:t>Multi-Access Edge Computing (MEC) with 5G technology optimizes resource allocation using advanced machine learning techniques to analyze key patterns and correlations in a comprehensive dataset, including fields like latency, allocated bandwidth, required bandwidth, signal strength, and resource allocation efficiency.</a:t>
-            </a:r>
-          </a:p>
-          <a:p>
-            <a:pPr marL="977163" lvl="1" indent="-488581" algn="just">
-              <a:lnSpc>
-                <a:spcPts val="5579"/>
-              </a:lnSpc>
-              <a:buFont typeface="Arial"/>
-              <a:buChar char="•"/>
-            </a:pPr>
-            <a:r>
-              <a:rPr lang="en-US" sz="3099" dirty="0">
-                <a:solidFill>
-                  <a:srgbClr val="000000"/>
-                </a:solidFill>
-                <a:latin typeface="Times New Roman"/>
-                <a:ea typeface="Times New Roman"/>
-                <a:cs typeface="Times New Roman"/>
-                <a:sym typeface="Times New Roman"/>
-              </a:rPr>
-              <a:t>The project aims to enhance MEC system efficiency and responsiveness by dynamically allocating bandwidth and processing power, minimizing latency, and maximizing overall network performance, thereby improving user experience and service delivery.</a:t>
-            </a:r>
-          </a:p>
-          <a:p>
-            <a:pPr marL="977163" lvl="1" indent="-488581" algn="just">
-              <a:lnSpc>
-                <a:spcPts val="5579"/>
-              </a:lnSpc>
-              <a:buFont typeface="Arial"/>
-              <a:buChar char="•"/>
-            </a:pPr>
-            <a:r>
-              <a:rPr lang="en-US" sz="3099" dirty="0">
-                <a:solidFill>
-                  <a:srgbClr val="000000"/>
-                </a:solidFill>
-                <a:latin typeface="Times New Roman"/>
-                <a:ea typeface="Times New Roman"/>
-                <a:cs typeface="Times New Roman"/>
-                <a:sym typeface="Times New Roman"/>
-              </a:rPr>
-              <a:t>The integration of MEC with 5G technology supports emerging applications such as autonomous vehicles, smart cities, and the Internet of Things (IoT), paving the way for reliable and efficient communication infrastructures that drive innovation and technological advancement in the telecommunications industry.</a:t>
-            </a:r>
-          </a:p>
-          <a:p>
-            <a:pPr marL="1049909" lvl="1" indent="-524955" algn="just">
-              <a:lnSpc>
-                <a:spcPts val="5994"/>
-              </a:lnSpc>
-            </a:pPr>
-            <a:endParaRPr lang="en-US" sz="3099" dirty="0">
-              <a:solidFill>
-                <a:srgbClr val="000000"/>
-              </a:solidFill>
-              <a:latin typeface="Times New Roman"/>
-              <a:ea typeface="Times New Roman"/>
-              <a:cs typeface="Times New Roman"/>
-              <a:sym typeface="Times New Roman"/>
-            </a:endParaRPr>
-          </a:p>
-        </p:txBody>
-      </p:sp>
-      <p:grpSp>
-        <p:nvGrpSpPr>
-          <p:cNvPr id="4" name="Group 4"/>
-          <p:cNvGrpSpPr/>
-          <p:nvPr/>
-        </p:nvGrpSpPr>
-        <p:grpSpPr>
-          <a:xfrm>
-            <a:off x="647623" y="2012475"/>
-            <a:ext cx="17026652" cy="52650"/>
-            <a:chOff x="0" y="0"/>
-            <a:chExt cx="22702203" cy="70200"/>
-          </a:xfrm>
-        </p:grpSpPr>
-        <p:sp>
-          <p:nvSpPr>
-            <p:cNvPr id="5" name="Freeform 5"/>
-            <p:cNvSpPr/>
-            <p:nvPr/>
-          </p:nvSpPr>
-          <p:spPr>
-            <a:xfrm>
-              <a:off x="12700" y="12700"/>
-              <a:ext cx="22676865" cy="44831"/>
-            </a:xfrm>
-            <a:custGeom>
-              <a:avLst/>
-              <a:gdLst/>
-              <a:ahLst/>
-              <a:cxnLst/>
-              <a:rect l="l" t="t" r="r" b="b"/>
-              <a:pathLst>
-                <a:path w="22676865" h="44831">
-                  <a:moveTo>
-                    <a:pt x="0" y="0"/>
-                  </a:moveTo>
-                  <a:lnTo>
-                    <a:pt x="22676865" y="0"/>
-                  </a:lnTo>
-                  <a:lnTo>
-                    <a:pt x="22676865" y="44831"/>
-                  </a:lnTo>
-                  <a:lnTo>
-                    <a:pt x="0" y="44831"/>
-                  </a:lnTo>
-                  <a:close/>
-                </a:path>
-              </a:pathLst>
-            </a:custGeom>
-            <a:solidFill>
-              <a:srgbClr val="000000"/>
-            </a:solidFill>
-          </p:spPr>
-        </p:sp>
-        <p:sp>
-          <p:nvSpPr>
-            <p:cNvPr id="6" name="Freeform 6"/>
-            <p:cNvSpPr/>
-            <p:nvPr/>
-          </p:nvSpPr>
-          <p:spPr>
-            <a:xfrm>
-              <a:off x="0" y="0"/>
-              <a:ext cx="22702265" cy="70231"/>
-            </a:xfrm>
-            <a:custGeom>
-              <a:avLst/>
-              <a:gdLst/>
-              <a:ahLst/>
-              <a:cxnLst/>
-              <a:rect l="l" t="t" r="r" b="b"/>
-              <a:pathLst>
-                <a:path w="22702265" h="70231">
-                  <a:moveTo>
-                    <a:pt x="12700" y="0"/>
-                  </a:moveTo>
-                  <a:lnTo>
-                    <a:pt x="22689565" y="0"/>
-                  </a:lnTo>
-                  <a:cubicBezTo>
-                    <a:pt x="22696551" y="0"/>
-                    <a:pt x="22702265" y="5715"/>
-                    <a:pt x="22702265" y="12700"/>
-                  </a:cubicBezTo>
-                  <a:lnTo>
-                    <a:pt x="22702265" y="57531"/>
-                  </a:lnTo>
-                  <a:cubicBezTo>
-                    <a:pt x="22702265" y="64516"/>
-                    <a:pt x="22696551" y="70231"/>
-                    <a:pt x="22689565" y="70231"/>
-                  </a:cubicBezTo>
-                  <a:lnTo>
-                    <a:pt x="12700" y="70231"/>
-                  </a:lnTo>
-                  <a:cubicBezTo>
-                    <a:pt x="5715" y="70231"/>
-                    <a:pt x="0" y="64516"/>
-                    <a:pt x="0" y="57531"/>
-                  </a:cubicBezTo>
-                  <a:lnTo>
-                    <a:pt x="0" y="12700"/>
-                  </a:lnTo>
-                  <a:cubicBezTo>
-                    <a:pt x="0" y="5715"/>
-                    <a:pt x="5715" y="0"/>
-                    <a:pt x="12700" y="0"/>
-                  </a:cubicBezTo>
-                  <a:moveTo>
-                    <a:pt x="12700" y="25400"/>
-                  </a:moveTo>
-                  <a:lnTo>
-                    <a:pt x="12700" y="12700"/>
-                  </a:lnTo>
-                  <a:lnTo>
-                    <a:pt x="25400" y="12700"/>
-                  </a:lnTo>
-                  <a:lnTo>
-                    <a:pt x="25400" y="57531"/>
-                  </a:lnTo>
-                  <a:lnTo>
-                    <a:pt x="12700" y="57531"/>
-                  </a:lnTo>
-                  <a:lnTo>
-                    <a:pt x="12700" y="44831"/>
-                  </a:lnTo>
-                  <a:lnTo>
-                    <a:pt x="22689565" y="44831"/>
-                  </a:lnTo>
-                  <a:lnTo>
-                    <a:pt x="22689565" y="57531"/>
-                  </a:lnTo>
-                  <a:lnTo>
-                    <a:pt x="22676865" y="57531"/>
-                  </a:lnTo>
-                  <a:lnTo>
-                    <a:pt x="22676865" y="12700"/>
-                  </a:lnTo>
-                  <a:lnTo>
-                    <a:pt x="22689565" y="12700"/>
-                  </a:lnTo>
-                  <a:lnTo>
-                    <a:pt x="22689565" y="25400"/>
-                  </a:lnTo>
-                  <a:lnTo>
-                    <a:pt x="12700" y="25400"/>
-                  </a:lnTo>
-                  <a:close/>
-                </a:path>
-              </a:pathLst>
-            </a:custGeom>
-            <a:solidFill>
-              <a:srgbClr val="595959"/>
             </a:solidFill>
           </p:spPr>
         </p:sp>

</xml_diff>